<commit_message>
updated ppt and fixed formatting in Activity1.md
</commit_message>
<xml_diff>
--- a/Chapter12-scripting.pptx
+++ b/Chapter12-scripting.pptx
@@ -149,6 +149,54 @@
 <file path=ppt/changesInfos/changesInfo1.xml><?xml version="1.0" encoding="utf-8"?>
 <pc:chgInfo xmlns:a="http://schemas.openxmlformats.org/drawingml/2006/main" xmlns:r="http://schemas.openxmlformats.org/officeDocument/2006/relationships" xmlns:ac="http://schemas.microsoft.com/office/drawing/2013/main/command" xmlns:pc="http://schemas.microsoft.com/office/powerpoint/2013/main/command">
   <pc:docChgLst>
+    <pc:chgData name="Gansemer, Benjamin M" userId="S::bgansemer@uiowa.edu::e076ebcb-ad87-43f2-8b07-cf86ead81ad8" providerId="AD" clId="Web-{C896E883-EE75-548F-553D-6E302A6BE664}"/>
+    <pc:docChg chg="modSld">
+      <pc:chgData name="Gansemer, Benjamin M" userId="S::bgansemer@uiowa.edu::e076ebcb-ad87-43f2-8b07-cf86ead81ad8" providerId="AD" clId="Web-{C896E883-EE75-548F-553D-6E302A6BE664}" dt="2019-04-02T16:33:17.415" v="34" actId="20577"/>
+      <pc:docMkLst>
+        <pc:docMk/>
+      </pc:docMkLst>
+      <pc:sldChg chg="modSp">
+        <pc:chgData name="Gansemer, Benjamin M" userId="S::bgansemer@uiowa.edu::e076ebcb-ad87-43f2-8b07-cf86ead81ad8" providerId="AD" clId="Web-{C896E883-EE75-548F-553D-6E302A6BE664}" dt="2019-04-02T16:33:15.869" v="32" actId="20577"/>
+        <pc:sldMkLst>
+          <pc:docMk/>
+          <pc:sldMk cId="68954129" sldId="257"/>
+        </pc:sldMkLst>
+        <pc:spChg chg="mod">
+          <ac:chgData name="Gansemer, Benjamin M" userId="S::bgansemer@uiowa.edu::e076ebcb-ad87-43f2-8b07-cf86ead81ad8" providerId="AD" clId="Web-{C896E883-EE75-548F-553D-6E302A6BE664}" dt="2019-04-02T16:33:15.869" v="32" actId="20577"/>
+          <ac:spMkLst>
+            <pc:docMk/>
+            <pc:sldMk cId="68954129" sldId="257"/>
+            <ac:spMk id="3" creationId="{2A50A4FF-ECBE-4692-B309-11C5F8162E0D}"/>
+          </ac:spMkLst>
+        </pc:spChg>
+      </pc:sldChg>
+    </pc:docChg>
+  </pc:docChgLst>
+  <pc:docChgLst>
+    <pc:chgData name="Youngstrom, Christopher E" userId="S::cyoungst@uiowa.edu::23ec1868-ff07-4d2a-a8b3-14c2cdd1ceaf" providerId="AD" clId="Web-{24333E97-B255-464A-9C8D-E05645297AAD}"/>
+    <pc:docChg chg="modSld">
+      <pc:chgData name="Youngstrom, Christopher E" userId="S::cyoungst@uiowa.edu::23ec1868-ff07-4d2a-a8b3-14c2cdd1ceaf" providerId="AD" clId="Web-{24333E97-B255-464A-9C8D-E05645297AAD}" dt="2019-04-01T14:41:32.677" v="14" actId="20577"/>
+      <pc:docMkLst>
+        <pc:docMk/>
+      </pc:docMkLst>
+      <pc:sldChg chg="modSp">
+        <pc:chgData name="Youngstrom, Christopher E" userId="S::cyoungst@uiowa.edu::23ec1868-ff07-4d2a-a8b3-14c2cdd1ceaf" providerId="AD" clId="Web-{24333E97-B255-464A-9C8D-E05645297AAD}" dt="2019-04-01T14:41:30.989" v="12" actId="20577"/>
+        <pc:sldMkLst>
+          <pc:docMk/>
+          <pc:sldMk cId="109857222" sldId="256"/>
+        </pc:sldMkLst>
+        <pc:spChg chg="mod">
+          <ac:chgData name="Youngstrom, Christopher E" userId="S::cyoungst@uiowa.edu::23ec1868-ff07-4d2a-a8b3-14c2cdd1ceaf" providerId="AD" clId="Web-{24333E97-B255-464A-9C8D-E05645297AAD}" dt="2019-04-01T14:41:30.989" v="12" actId="20577"/>
+          <ac:spMkLst>
+            <pc:docMk/>
+            <pc:sldMk cId="109857222" sldId="256"/>
+            <ac:spMk id="2" creationId="{00000000-0000-0000-0000-000000000000}"/>
+          </ac:spMkLst>
+        </pc:spChg>
+      </pc:sldChg>
+    </pc:docChg>
+  </pc:docChgLst>
+  <pc:docChgLst>
     <pc:chgData name="Gansemer, Benjamin M" userId="S::bgansemer@uiowa.edu::e076ebcb-ad87-43f2-8b07-cf86ead81ad8" providerId="AD" clId="Web-{07FB198E-6415-9F65-F684-23115494453F}"/>
     <pc:docChg chg="addSld modSld">
       <pc:chgData name="Gansemer, Benjamin M" userId="S::bgansemer@uiowa.edu::e076ebcb-ad87-43f2-8b07-cf86ead81ad8" providerId="AD" clId="Web-{07FB198E-6415-9F65-F684-23115494453F}" dt="2019-04-01T17:21:56.659" v="630" actId="14100"/>
@@ -299,54 +347,6 @@
             <ac:picMk id="4" creationId="{F5D8EC0C-59C1-4903-B175-83EC35B33205}"/>
           </ac:picMkLst>
         </pc:picChg>
-      </pc:sldChg>
-    </pc:docChg>
-  </pc:docChgLst>
-  <pc:docChgLst>
-    <pc:chgData name="Gansemer, Benjamin M" userId="S::bgansemer@uiowa.edu::e076ebcb-ad87-43f2-8b07-cf86ead81ad8" providerId="AD" clId="Web-{C896E883-EE75-548F-553D-6E302A6BE664}"/>
-    <pc:docChg chg="modSld">
-      <pc:chgData name="Gansemer, Benjamin M" userId="S::bgansemer@uiowa.edu::e076ebcb-ad87-43f2-8b07-cf86ead81ad8" providerId="AD" clId="Web-{C896E883-EE75-548F-553D-6E302A6BE664}" dt="2019-04-02T16:33:17.415" v="34" actId="20577"/>
-      <pc:docMkLst>
-        <pc:docMk/>
-      </pc:docMkLst>
-      <pc:sldChg chg="modSp">
-        <pc:chgData name="Gansemer, Benjamin M" userId="S::bgansemer@uiowa.edu::e076ebcb-ad87-43f2-8b07-cf86ead81ad8" providerId="AD" clId="Web-{C896E883-EE75-548F-553D-6E302A6BE664}" dt="2019-04-02T16:33:15.869" v="32" actId="20577"/>
-        <pc:sldMkLst>
-          <pc:docMk/>
-          <pc:sldMk cId="68954129" sldId="257"/>
-        </pc:sldMkLst>
-        <pc:spChg chg="mod">
-          <ac:chgData name="Gansemer, Benjamin M" userId="S::bgansemer@uiowa.edu::e076ebcb-ad87-43f2-8b07-cf86ead81ad8" providerId="AD" clId="Web-{C896E883-EE75-548F-553D-6E302A6BE664}" dt="2019-04-02T16:33:15.869" v="32" actId="20577"/>
-          <ac:spMkLst>
-            <pc:docMk/>
-            <pc:sldMk cId="68954129" sldId="257"/>
-            <ac:spMk id="3" creationId="{2A50A4FF-ECBE-4692-B309-11C5F8162E0D}"/>
-          </ac:spMkLst>
-        </pc:spChg>
-      </pc:sldChg>
-    </pc:docChg>
-  </pc:docChgLst>
-  <pc:docChgLst>
-    <pc:chgData name="Youngstrom, Christopher E" userId="S::cyoungst@uiowa.edu::23ec1868-ff07-4d2a-a8b3-14c2cdd1ceaf" providerId="AD" clId="Web-{24333E97-B255-464A-9C8D-E05645297AAD}"/>
-    <pc:docChg chg="modSld">
-      <pc:chgData name="Youngstrom, Christopher E" userId="S::cyoungst@uiowa.edu::23ec1868-ff07-4d2a-a8b3-14c2cdd1ceaf" providerId="AD" clId="Web-{24333E97-B255-464A-9C8D-E05645297AAD}" dt="2019-04-01T14:41:32.677" v="14" actId="20577"/>
-      <pc:docMkLst>
-        <pc:docMk/>
-      </pc:docMkLst>
-      <pc:sldChg chg="modSp">
-        <pc:chgData name="Youngstrom, Christopher E" userId="S::cyoungst@uiowa.edu::23ec1868-ff07-4d2a-a8b3-14c2cdd1ceaf" providerId="AD" clId="Web-{24333E97-B255-464A-9C8D-E05645297AAD}" dt="2019-04-01T14:41:30.989" v="12" actId="20577"/>
-        <pc:sldMkLst>
-          <pc:docMk/>
-          <pc:sldMk cId="109857222" sldId="256"/>
-        </pc:sldMkLst>
-        <pc:spChg chg="mod">
-          <ac:chgData name="Youngstrom, Christopher E" userId="S::cyoungst@uiowa.edu::23ec1868-ff07-4d2a-a8b3-14c2cdd1ceaf" providerId="AD" clId="Web-{24333E97-B255-464A-9C8D-E05645297AAD}" dt="2019-04-01T14:41:30.989" v="12" actId="20577"/>
-          <ac:spMkLst>
-            <pc:docMk/>
-            <pc:sldMk cId="109857222" sldId="256"/>
-            <ac:spMk id="2" creationId="{00000000-0000-0000-0000-000000000000}"/>
-          </ac:spMkLst>
-        </pc:spChg>
       </pc:sldChg>
     </pc:docChg>
   </pc:docChgLst>
@@ -1295,22 +1295,22 @@
           <a:lstStyle/>
           <a:p>
             <a:r>
-              <a:rPr lang="en-US" dirty="0" smtClean="0"/>
+              <a:rPr lang="en-US" dirty="0"/>
               <a:t>Can also add script path</a:t>
             </a:r>
             <a:r>
-              <a:rPr lang="en-US" baseline="0" dirty="0" smtClean="0"/>
+              <a:rPr lang="en-US" baseline="0" dirty="0"/>
               <a:t> to $PATH to run from any directory.</a:t>
             </a:r>
-            <a:endParaRPr lang="en-US" dirty="0" smtClean="0"/>
-          </a:p>
-          <a:p>
-            <a:r>
-              <a:rPr lang="en-US" dirty="0" smtClean="0"/>
+            <a:endParaRPr lang="en-US" dirty="0"/>
+          </a:p>
+          <a:p>
+            <a:r>
+              <a:rPr lang="en-US" dirty="0"/>
               <a:t>Can either “hardcode” variables into</a:t>
             </a:r>
             <a:r>
-              <a:rPr lang="en-US" baseline="0" dirty="0" smtClean="0"/>
+              <a:rPr lang="en-US" baseline="0" dirty="0"/>
               <a:t> the script, or read in command line arguments</a:t>
             </a:r>
             <a:endParaRPr lang="en-US" dirty="0"/>
@@ -1398,10 +1398,9 @@
           <a:lstStyle/>
           <a:p>
             <a:r>
-              <a:rPr lang="en-US" dirty="0" smtClean="0"/>
+              <a:rPr lang="en-US" dirty="0"/>
               <a:t>Stop for questions here</a:t>
             </a:r>
-            <a:endParaRPr lang="en-US" dirty="0"/>
           </a:p>
         </p:txBody>
       </p:sp>
@@ -1486,11 +1485,11 @@
           <a:lstStyle/>
           <a:p>
             <a:r>
-              <a:rPr lang="en-US" dirty="0" smtClean="0"/>
+              <a:rPr lang="en-US" dirty="0"/>
               <a:t>Bash command exit status provides</a:t>
             </a:r>
             <a:r>
-              <a:rPr lang="en-US" baseline="0" dirty="0" smtClean="0"/>
+              <a:rPr lang="en-US" baseline="0" dirty="0"/>
               <a:t> true and false – 0 = true/success, and nonzero = false/failure</a:t>
             </a:r>
             <a:endParaRPr lang="en-US" dirty="0"/>
@@ -1578,19 +1577,19 @@
           <a:lstStyle/>
           <a:p>
             <a:r>
-              <a:rPr lang="en-US" dirty="0" smtClean="0"/>
+              <a:rPr lang="en-US" dirty="0"/>
               <a:t>Used to test whether two strings are equal,</a:t>
             </a:r>
             <a:r>
-              <a:rPr lang="en-US" baseline="0" dirty="0" smtClean="0"/>
+              <a:rPr lang="en-US" baseline="0" dirty="0"/>
               <a:t> whether one </a:t>
             </a:r>
             <a:r>
-              <a:rPr lang="en-US" baseline="0" dirty="0" err="1" smtClean="0"/>
+              <a:rPr lang="en-US" baseline="0" dirty="0" err="1"/>
               <a:t>int</a:t>
             </a:r>
             <a:r>
-              <a:rPr lang="en-US" baseline="0" dirty="0" smtClean="0"/>
+              <a:rPr lang="en-US" baseline="0" dirty="0"/>
               <a:t> is greater than/less than another, etc.</a:t>
             </a:r>
             <a:endParaRPr lang="en-US" dirty="0"/>
@@ -1678,10 +1677,9 @@
           <a:lstStyle/>
           <a:p>
             <a:r>
-              <a:rPr lang="en-US" dirty="0" smtClean="0"/>
+              <a:rPr lang="en-US" dirty="0"/>
               <a:t>Will use bash arrays in the activity</a:t>
             </a:r>
-            <a:endParaRPr lang="en-US" dirty="0"/>
           </a:p>
         </p:txBody>
       </p:sp>
@@ -1766,33 +1764,33 @@
           <a:lstStyle/>
           <a:p>
             <a:r>
-              <a:rPr lang="en-US" dirty="0" smtClean="0"/>
+              <a:rPr lang="en-US" dirty="0"/>
               <a:t>could include the part about</a:t>
             </a:r>
             <a:r>
-              <a:rPr lang="en-US" baseline="0" dirty="0" smtClean="0"/>
+              <a:rPr lang="en-US" baseline="0" dirty="0"/>
               <a:t> </a:t>
             </a:r>
             <a:r>
-              <a:rPr lang="en-US" baseline="0" dirty="0" err="1" smtClean="0"/>
+              <a:rPr lang="en-US" baseline="0" dirty="0" err="1"/>
               <a:t>xargs</a:t>
             </a:r>
             <a:r>
-              <a:rPr lang="en-US" baseline="0" dirty="0" smtClean="0"/>
+              <a:rPr lang="en-US" baseline="0" dirty="0"/>
               <a:t>, Pipes, and Redirects (pg. 420) here</a:t>
             </a:r>
           </a:p>
           <a:p>
             <a:r>
-              <a:rPr lang="en-US" baseline="0" dirty="0" smtClean="0"/>
+              <a:rPr lang="en-US" baseline="0" dirty="0"/>
               <a:t>Do we need another discussion point here? (how do find and </a:t>
             </a:r>
             <a:r>
-              <a:rPr lang="en-US" baseline="0" dirty="0" err="1" smtClean="0"/>
+              <a:rPr lang="en-US" baseline="0" dirty="0" err="1"/>
               <a:t>xargs</a:t>
             </a:r>
             <a:r>
-              <a:rPr lang="en-US" baseline="0" dirty="0" smtClean="0"/>
+              <a:rPr lang="en-US" baseline="0" dirty="0"/>
               <a:t> contribute to repro and robust?)</a:t>
             </a:r>
             <a:endParaRPr lang="en-US" dirty="0"/>
@@ -1880,11 +1878,11 @@
           <a:lstStyle/>
           <a:p>
             <a:r>
-              <a:rPr lang="en-US" dirty="0" smtClean="0"/>
+              <a:rPr lang="en-US" dirty="0"/>
               <a:t>don’t know if we want</a:t>
             </a:r>
             <a:r>
-              <a:rPr lang="en-US" baseline="0" dirty="0" smtClean="0"/>
+              <a:rPr lang="en-US" baseline="0" dirty="0"/>
               <a:t> to go into more detail than this. Could use the example from the book.</a:t>
             </a:r>
             <a:endParaRPr lang="en-US" dirty="0"/>
@@ -4874,13 +4872,6 @@
   <p:clrMapOvr>
     <a:masterClrMapping/>
   </p:clrMapOvr>
-  <p:timing>
-    <p:tnLst>
-      <p:par>
-        <p:cTn id="1" dur="indefinite" restart="never" nodeType="tmRoot"/>
-      </p:par>
-    </p:tnLst>
-  </p:timing>
 </p:sld>
 </file>
 
@@ -4956,37 +4947,36 @@
           <a:lstStyle/>
           <a:p>
             <a:r>
-              <a:rPr lang="en-US" dirty="0" smtClean="0"/>
+              <a:rPr lang="en-US" dirty="0"/>
               <a:t>Used to iterate over a number (sometimes 100s-1000s) of files and perform the same command or set of commands</a:t>
             </a:r>
           </a:p>
           <a:p>
             <a:r>
-              <a:rPr lang="en-US" dirty="0" smtClean="0"/>
+              <a:rPr lang="en-US" dirty="0"/>
               <a:t>Three essential parts:</a:t>
             </a:r>
           </a:p>
           <a:p>
             <a:pPr lvl="1"/>
             <a:r>
-              <a:rPr lang="en-US" dirty="0" smtClean="0"/>
+              <a:rPr lang="en-US" dirty="0"/>
               <a:t>Selecting which files to apply commands to</a:t>
             </a:r>
           </a:p>
           <a:p>
             <a:pPr lvl="1"/>
             <a:r>
-              <a:rPr lang="en-US" dirty="0" smtClean="0"/>
+              <a:rPr lang="en-US" dirty="0"/>
               <a:t>Looping over files and performing the commands</a:t>
             </a:r>
           </a:p>
           <a:p>
             <a:pPr lvl="1"/>
             <a:r>
-              <a:rPr lang="en-US" dirty="0" smtClean="0"/>
+              <a:rPr lang="en-US" dirty="0"/>
               <a:t>Keeping track of output file names</a:t>
             </a:r>
-            <a:endParaRPr lang="en-US" dirty="0"/>
           </a:p>
         </p:txBody>
       </p:sp>
@@ -5187,7 +5177,7 @@
               <a:buNone/>
             </a:pPr>
             <a:r>
-              <a:rPr lang="en-US" u="sng" dirty="0" smtClean="0"/>
+              <a:rPr lang="en-US" u="sng" dirty="0"/>
               <a:t>Basic bash syntax</a:t>
             </a:r>
           </a:p>
@@ -5197,7 +5187,7 @@
               <a:buNone/>
             </a:pPr>
             <a:r>
-              <a:rPr lang="en-US" dirty="0" smtClean="0"/>
+              <a:rPr lang="en-US" dirty="0"/>
               <a:t>for file in directory</a:t>
             </a:r>
           </a:p>
@@ -5207,7 +5197,7 @@
               <a:buNone/>
             </a:pPr>
             <a:r>
-              <a:rPr lang="en-US" dirty="0" smtClean="0"/>
+              <a:rPr lang="en-US" dirty="0"/>
               <a:t>do</a:t>
             </a:r>
           </a:p>
@@ -5217,7 +5207,7 @@
               <a:buNone/>
             </a:pPr>
             <a:r>
-              <a:rPr lang="en-US" dirty="0" smtClean="0"/>
+              <a:rPr lang="en-US" dirty="0"/>
               <a:t>	command $file</a:t>
             </a:r>
           </a:p>
@@ -5227,10 +5217,9 @@
               <a:buNone/>
             </a:pPr>
             <a:r>
-              <a:rPr lang="en-US" dirty="0" smtClean="0"/>
+              <a:rPr lang="en-US" dirty="0"/>
               <a:t>done</a:t>
             </a:r>
-            <a:endParaRPr lang="en-US" dirty="0"/>
           </a:p>
         </p:txBody>
       </p:sp>
@@ -5366,10 +5355,9 @@
           <a:lstStyle/>
           <a:p>
             <a:r>
-              <a:rPr lang="en-US" dirty="0" smtClean="0"/>
+              <a:rPr lang="en-US" dirty="0"/>
               <a:t>Selecting files</a:t>
             </a:r>
-            <a:endParaRPr lang="en-US" dirty="0"/>
           </a:p>
         </p:txBody>
       </p:sp>
@@ -5394,15 +5382,15 @@
           <a:lstStyle/>
           <a:p>
             <a:r>
-              <a:rPr lang="en-US" dirty="0" smtClean="0"/>
+              <a:rPr lang="en-US" dirty="0"/>
               <a:t>Can either </a:t>
             </a:r>
             <a:r>
-              <a:rPr lang="en-US" i="1" dirty="0" smtClean="0"/>
+              <a:rPr lang="en-US" i="1" dirty="0"/>
               <a:t>glob </a:t>
             </a:r>
             <a:r>
-              <a:rPr lang="en-US" dirty="0" smtClean="0"/>
+              <a:rPr lang="en-US" dirty="0"/>
               <a:t>files (use wildcards) to loop over</a:t>
             </a:r>
           </a:p>
@@ -5410,21 +5398,21 @@
             <a:endParaRPr lang="en-US" dirty="0"/>
           </a:p>
           <a:p>
-            <a:endParaRPr lang="en-US" dirty="0" smtClean="0"/>
-          </a:p>
-          <a:p>
-            <a:endParaRPr lang="en-US" dirty="0" smtClean="0"/>
-          </a:p>
-          <a:p>
-            <a:r>
-              <a:rPr lang="en-US" dirty="0" smtClean="0"/>
+            <a:endParaRPr lang="en-US" dirty="0"/>
+          </a:p>
+          <a:p>
+            <a:endParaRPr lang="en-US" dirty="0"/>
+          </a:p>
+          <a:p>
+            <a:r>
+              <a:rPr lang="en-US" dirty="0"/>
               <a:t>Or use bash arrays</a:t>
             </a:r>
           </a:p>
           <a:p>
             <a:pPr lvl="1"/>
             <a:r>
-              <a:rPr lang="en-US" dirty="0" smtClean="0"/>
+              <a:rPr lang="en-US" dirty="0"/>
               <a:t>Usually involves using a text file containing information about files</a:t>
             </a:r>
           </a:p>
@@ -5477,42 +5465,41 @@
           <a:lstStyle/>
           <a:p>
             <a:r>
-              <a:rPr lang="en-US" dirty="0" smtClean="0"/>
+              <a:rPr lang="en-US" dirty="0"/>
               <a:t>$</a:t>
             </a:r>
             <a:r>
-              <a:rPr lang="en-US" dirty="0" err="1" smtClean="0"/>
+              <a:rPr lang="en-US" dirty="0" err="1"/>
               <a:t>sample_names</a:t>
             </a:r>
             <a:r>
-              <a:rPr lang="en-US" dirty="0" smtClean="0"/>
+              <a:rPr lang="en-US" dirty="0"/>
               <a:t>=(</a:t>
             </a:r>
             <a:r>
-              <a:rPr lang="en-US" dirty="0" err="1" smtClean="0"/>
+              <a:rPr lang="en-US" dirty="0" err="1"/>
               <a:t>zmaysA</a:t>
             </a:r>
             <a:r>
-              <a:rPr lang="en-US" dirty="0" smtClean="0"/>
+              <a:rPr lang="en-US" dirty="0"/>
               <a:t> </a:t>
             </a:r>
             <a:r>
-              <a:rPr lang="en-US" dirty="0" err="1" smtClean="0"/>
+              <a:rPr lang="en-US" dirty="0" err="1"/>
               <a:t>zmaysB</a:t>
             </a:r>
             <a:r>
-              <a:rPr lang="en-US" dirty="0" smtClean="0"/>
+              <a:rPr lang="en-US" dirty="0"/>
               <a:t> </a:t>
             </a:r>
             <a:r>
-              <a:rPr lang="en-US" dirty="0" err="1" smtClean="0"/>
+              <a:rPr lang="en-US" dirty="0" err="1"/>
               <a:t>zmaysC</a:t>
             </a:r>
             <a:r>
-              <a:rPr lang="en-US" dirty="0" smtClean="0"/>
+              <a:rPr lang="en-US" dirty="0"/>
               <a:t>)</a:t>
             </a:r>
-            <a:endParaRPr lang="en-US" dirty="0"/>
           </a:p>
         </p:txBody>
       </p:sp>
@@ -5526,13 +5513,6 @@
   <p:clrMapOvr>
     <a:masterClrMapping/>
   </p:clrMapOvr>
-  <p:timing>
-    <p:tnLst>
-      <p:par>
-        <p:cTn id="1" dur="indefinite" restart="never" nodeType="tmRoot"/>
-      </p:par>
-    </p:tnLst>
-  </p:timing>
 </p:sld>
 </file>
 
@@ -5569,10 +5549,9 @@
           <a:lstStyle/>
           <a:p>
             <a:r>
-              <a:rPr lang="en-US" dirty="0" smtClean="0"/>
+              <a:rPr lang="en-US" dirty="0"/>
               <a:t>Notes on selecting files</a:t>
             </a:r>
-            <a:endParaRPr lang="en-US" dirty="0"/>
           </a:p>
         </p:txBody>
       </p:sp>
@@ -5599,21 +5578,21 @@
           <a:lstStyle/>
           <a:p>
             <a:r>
-              <a:rPr lang="en-US" dirty="0" smtClean="0"/>
+              <a:rPr lang="en-US" dirty="0"/>
               <a:t>We assume filenames do not have whitespaces in them!</a:t>
             </a:r>
           </a:p>
           <a:p>
             <a:pPr lvl="1"/>
             <a:r>
-              <a:rPr lang="en-US" dirty="0" smtClean="0"/>
+              <a:rPr lang="en-US" dirty="0"/>
               <a:t>Bash splits fields into array elements using characters in the internal field separator (IFS) (‘ ‘, ‘\t’, and ‘\n’)</a:t>
             </a:r>
           </a:p>
           <a:p>
             <a:pPr lvl="1"/>
             <a:r>
-              <a:rPr lang="en-US" dirty="0" smtClean="0"/>
+              <a:rPr lang="en-US" dirty="0"/>
               <a:t>If a filename has a whitespace, bash will split that name into to values!</a:t>
             </a:r>
           </a:p>
@@ -5623,42 +5602,42 @@
           </a:p>
           <a:p>
             <a:r>
-              <a:rPr lang="en-US" dirty="0" smtClean="0"/>
+              <a:rPr lang="en-US" dirty="0"/>
               <a:t>We can use </a:t>
             </a:r>
             <a:r>
-              <a:rPr lang="en-US" i="1" dirty="0" err="1" smtClean="0"/>
+              <a:rPr lang="en-US" i="1" dirty="0" err="1"/>
               <a:t>basename</a:t>
             </a:r>
             <a:r>
-              <a:rPr lang="en-US" dirty="0" smtClean="0"/>
+              <a:rPr lang="en-US" dirty="0"/>
               <a:t> to strip the path and extension from each filename</a:t>
             </a:r>
           </a:p>
           <a:p>
             <a:pPr lvl="1"/>
             <a:r>
-              <a:rPr lang="en-US" dirty="0" smtClean="0"/>
+              <a:rPr lang="en-US" dirty="0"/>
               <a:t>$ </a:t>
             </a:r>
             <a:r>
-              <a:rPr lang="en-US" dirty="0" err="1" smtClean="0"/>
+              <a:rPr lang="en-US" dirty="0" err="1"/>
               <a:t>basename</a:t>
             </a:r>
             <a:r>
-              <a:rPr lang="en-US" dirty="0" smtClean="0"/>
+              <a:rPr lang="en-US" dirty="0"/>
               <a:t> </a:t>
             </a:r>
             <a:r>
-              <a:rPr lang="en-US" dirty="0" err="1" smtClean="0"/>
+              <a:rPr lang="en-US" dirty="0" err="1"/>
               <a:t>seqs</a:t>
             </a:r>
             <a:r>
-              <a:rPr lang="en-US" dirty="0" smtClean="0"/>
+              <a:rPr lang="en-US" dirty="0"/>
               <a:t>/zmaysA_R1.fastq </a:t>
             </a:r>
             <a:r>
-              <a:rPr lang="en-US" dirty="0" smtClean="0">
+              <a:rPr lang="en-US" dirty="0">
                 <a:sym typeface="Wingdings" panose="05000000000000000000" pitchFamily="2" charset="2"/>
               </a:rPr>
               <a:t> zmaysA_R1.fastq</a:t>
@@ -5667,31 +5646,31 @@
           <a:p>
             <a:pPr lvl="1"/>
             <a:r>
-              <a:rPr lang="en-US" dirty="0" smtClean="0">
+              <a:rPr lang="en-US" dirty="0">
                 <a:sym typeface="Wingdings" panose="05000000000000000000" pitchFamily="2" charset="2"/>
               </a:rPr>
               <a:t>$ </a:t>
             </a:r>
             <a:r>
-              <a:rPr lang="en-US" dirty="0" err="1" smtClean="0">
+              <a:rPr lang="en-US" dirty="0" err="1">
                 <a:sym typeface="Wingdings" panose="05000000000000000000" pitchFamily="2" charset="2"/>
               </a:rPr>
               <a:t>basename</a:t>
             </a:r>
             <a:r>
-              <a:rPr lang="en-US" dirty="0" smtClean="0">
+              <a:rPr lang="en-US" dirty="0">
                 <a:sym typeface="Wingdings" panose="05000000000000000000" pitchFamily="2" charset="2"/>
               </a:rPr>
               <a:t> –s </a:t>
             </a:r>
             <a:r>
-              <a:rPr lang="en-US" dirty="0" err="1" smtClean="0">
+              <a:rPr lang="en-US" dirty="0" err="1">
                 <a:sym typeface="Wingdings" panose="05000000000000000000" pitchFamily="2" charset="2"/>
               </a:rPr>
               <a:t>seqs</a:t>
             </a:r>
             <a:r>
-              <a:rPr lang="en-US" dirty="0" smtClean="0">
+              <a:rPr lang="en-US" dirty="0">
                 <a:sym typeface="Wingdings" panose="05000000000000000000" pitchFamily="2" charset="2"/>
               </a:rPr>
               <a:t>/zmaysA_R1.fastq  zmaysA_R1</a:t>
@@ -5700,12 +5679,12 @@
           <a:p>
             <a:pPr lvl="1"/>
             <a:r>
-              <a:rPr lang="en-US" dirty="0" smtClean="0">
+              <a:rPr lang="en-US" dirty="0">
                 <a:sym typeface="Wingdings" panose="05000000000000000000" pitchFamily="2" charset="2"/>
               </a:rPr>
               <a:t>This can be used to get the essential part of filenames to then create output filenames</a:t>
             </a:r>
-            <a:endParaRPr lang="en-US" dirty="0" smtClean="0"/>
+            <a:endParaRPr lang="en-US" dirty="0"/>
           </a:p>
         </p:txBody>
       </p:sp>
@@ -5719,13 +5698,6 @@
   <p:clrMapOvr>
     <a:masterClrMapping/>
   </p:clrMapOvr>
-  <p:timing>
-    <p:tnLst>
-      <p:par>
-        <p:cTn id="1" dur="indefinite" restart="never" nodeType="tmRoot"/>
-      </p:par>
-    </p:tnLst>
-  </p:timing>
 </p:sld>
 </file>
 
@@ -5762,10 +5734,9 @@
           <a:lstStyle/>
           <a:p>
             <a:r>
-              <a:rPr lang="en-US" dirty="0" smtClean="0"/>
+              <a:rPr lang="en-US" dirty="0"/>
               <a:t>Looping, output, and other considerations</a:t>
             </a:r>
-            <a:endParaRPr lang="en-US" dirty="0"/>
           </a:p>
         </p:txBody>
       </p:sp>
@@ -5820,11 +5791,11 @@
               <a:buChar char="•"/>
             </a:pPr>
             <a:r>
-              <a:rPr lang="en-US" sz="2000" dirty="0" smtClean="0"/>
+              <a:rPr lang="en-US" sz="2000" dirty="0"/>
               <a:t>This is a fairly straightforward example: 1 input file </a:t>
             </a:r>
             <a:r>
-              <a:rPr lang="en-US" sz="2000" dirty="0" smtClean="0">
+              <a:rPr lang="en-US" sz="2000" dirty="0">
                 <a:sym typeface="Wingdings" panose="05000000000000000000" pitchFamily="2" charset="2"/>
               </a:rPr>
               <a:t> 1 output file</a:t>
@@ -5836,14 +5807,11 @@
               <a:buChar char="•"/>
             </a:pPr>
             <a:r>
-              <a:rPr lang="en-US" sz="2000" dirty="0" smtClean="0">
+              <a:rPr lang="en-US" sz="2000" dirty="0">
                 <a:sym typeface="Wingdings" panose="05000000000000000000" pitchFamily="2" charset="2"/>
               </a:rPr>
               <a:t>What if we have 2 input files  1 output file (ex. paired-end sequencing alignment)?</a:t>
             </a:r>
-            <a:endParaRPr lang="en-US" sz="2000" dirty="0">
-              <a:sym typeface="Wingdings" panose="05000000000000000000" pitchFamily="2" charset="2"/>
-            </a:endParaRPr>
           </a:p>
         </p:txBody>
       </p:sp>
@@ -5881,13 +5849,6 @@
   <p:clrMapOvr>
     <a:masterClrMapping/>
   </p:clrMapOvr>
-  <p:timing>
-    <p:tnLst>
-      <p:par>
-        <p:cTn id="1" dur="indefinite" restart="never" nodeType="tmRoot"/>
-      </p:par>
-    </p:tnLst>
-  </p:timing>
 </p:sld>
 </file>
 
@@ -6036,13 +5997,6 @@
   <p:clrMapOvr>
     <a:masterClrMapping/>
   </p:clrMapOvr>
-  <p:timing>
-    <p:tnLst>
-      <p:par>
-        <p:cTn id="1" dur="indefinite" restart="never" nodeType="tmRoot"/>
-      </p:par>
-    </p:tnLst>
-  </p:timing>
 </p:sld>
 </file>
 
@@ -6197,13 +6151,6 @@
   <p:clrMapOvr>
     <a:masterClrMapping/>
   </p:clrMapOvr>
-  <p:timing>
-    <p:tnLst>
-      <p:par>
-        <p:cTn id="1" dur="indefinite" restart="never" nodeType="tmRoot"/>
-      </p:par>
-    </p:tnLst>
-  </p:timing>
 </p:sld>
 </file>
 
@@ -6291,18 +6238,14 @@
           <a:lstStyle/>
           <a:p>
             <a:r>
-              <a:rPr lang="en-US" sz="2800" dirty="0" smtClean="0"/>
+              <a:rPr lang="en-US" sz="2800" dirty="0"/>
               <a:t>Do Activity 1 (10-15 minutes)</a:t>
             </a:r>
           </a:p>
           <a:p>
             <a:r>
               <a:rPr lang="en-US" sz="2800" dirty="0"/>
-              <a:t>	</a:t>
-            </a:r>
-            <a:r>
-              <a:rPr lang="en-US" sz="2800" dirty="0" smtClean="0"/>
-              <a:t>Follow Activity1.md</a:t>
+              <a:t>	Follow Activity1.md</a:t>
             </a:r>
           </a:p>
           <a:p>
@@ -6312,7 +6255,7 @@
             </a:r>
           </a:p>
           <a:p>
-            <a:endParaRPr lang="en-US" sz="2800" dirty="0" smtClean="0"/>
+            <a:endParaRPr lang="en-US" sz="2800" dirty="0"/>
           </a:p>
           <a:p>
             <a:r>
@@ -6454,19 +6397,19 @@
           <a:lstStyle/>
           <a:p>
             <a:r>
-              <a:rPr lang="en-US" dirty="0" smtClean="0"/>
+              <a:rPr lang="en-US" dirty="0"/>
               <a:t>Automating processes with </a:t>
             </a:r>
             <a:r>
-              <a:rPr lang="en-US" i="1" dirty="0" smtClean="0"/>
+              <a:rPr lang="en-US" i="1" dirty="0"/>
               <a:t>find</a:t>
             </a:r>
             <a:r>
-              <a:rPr lang="en-US" dirty="0" smtClean="0"/>
+              <a:rPr lang="en-US" dirty="0"/>
               <a:t> and </a:t>
             </a:r>
             <a:r>
-              <a:rPr lang="en-US" i="1" dirty="0" err="1" smtClean="0"/>
+              <a:rPr lang="en-US" i="1" dirty="0" err="1"/>
               <a:t>xargs</a:t>
             </a:r>
             <a:endParaRPr lang="en-US" dirty="0"/>
@@ -6489,32 +6432,32 @@
           <a:lstStyle/>
           <a:p>
             <a:r>
-              <a:rPr lang="en-US" dirty="0" smtClean="0"/>
+              <a:rPr lang="en-US" dirty="0"/>
               <a:t>find is used to specify files that match some criteria</a:t>
             </a:r>
           </a:p>
           <a:p>
             <a:pPr lvl="1"/>
             <a:r>
-              <a:rPr lang="en-US" dirty="0" smtClean="0"/>
+              <a:rPr lang="en-US" dirty="0"/>
               <a:t>Why use it when we can glob?</a:t>
             </a:r>
           </a:p>
           <a:p>
             <a:pPr lvl="2"/>
             <a:r>
-              <a:rPr lang="en-US" dirty="0" smtClean="0"/>
+              <a:rPr lang="en-US" dirty="0"/>
               <a:t>ls and wildcards is fragile – if a filename has a space, it gets interpreted as two files</a:t>
             </a:r>
           </a:p>
           <a:p>
             <a:pPr lvl="3"/>
             <a:r>
-              <a:rPr lang="en-US" dirty="0" smtClean="0"/>
+              <a:rPr lang="en-US" dirty="0"/>
               <a:t>I.e. treatment 02.fq </a:t>
             </a:r>
             <a:r>
-              <a:rPr lang="en-US" dirty="0" smtClean="0">
+              <a:rPr lang="en-US" dirty="0">
                 <a:sym typeface="Wingdings" panose="05000000000000000000" pitchFamily="2" charset="2"/>
               </a:rPr>
               <a:t> treatment, 02.fq</a:t>
@@ -6523,25 +6466,25 @@
           <a:p>
             <a:pPr lvl="2"/>
             <a:r>
-              <a:rPr lang="en-US" dirty="0" smtClean="0">
+              <a:rPr lang="en-US" dirty="0">
                 <a:sym typeface="Wingdings" panose="05000000000000000000" pitchFamily="2" charset="2"/>
               </a:rPr>
               <a:t>could use $ command *.</a:t>
             </a:r>
             <a:r>
-              <a:rPr lang="en-US" dirty="0" err="1" smtClean="0">
+              <a:rPr lang="en-US" dirty="0" err="1">
                 <a:sym typeface="Wingdings" panose="05000000000000000000" pitchFamily="2" charset="2"/>
               </a:rPr>
               <a:t>fq</a:t>
             </a:r>
-            <a:endParaRPr lang="en-US" dirty="0" smtClean="0">
+            <a:endParaRPr lang="en-US" dirty="0">
               <a:sym typeface="Wingdings" panose="05000000000000000000" pitchFamily="2" charset="2"/>
             </a:endParaRPr>
           </a:p>
           <a:p>
             <a:pPr lvl="3"/>
             <a:r>
-              <a:rPr lang="en-US" dirty="0" smtClean="0">
+              <a:rPr lang="en-US" dirty="0">
                 <a:sym typeface="Wingdings" panose="05000000000000000000" pitchFamily="2" charset="2"/>
               </a:rPr>
               <a:t>but there’s a limit to the number of files that can be specified as arguments</a:t>
@@ -6550,7 +6493,7 @@
           <a:p>
             <a:pPr lvl="2"/>
             <a:r>
-              <a:rPr lang="en-US" dirty="0" smtClean="0">
+              <a:rPr lang="en-US" dirty="0">
                 <a:sym typeface="Wingdings" panose="05000000000000000000" pitchFamily="2" charset="2"/>
               </a:rPr>
               <a:t>find is recursive</a:t>
@@ -6564,36 +6507,36 @@
           </a:p>
           <a:p>
             <a:r>
-              <a:rPr lang="en-US" dirty="0" err="1" smtClean="0">
+              <a:rPr lang="en-US" dirty="0" err="1">
                 <a:sym typeface="Wingdings" panose="05000000000000000000" pitchFamily="2" charset="2"/>
               </a:rPr>
               <a:t>xargs</a:t>
             </a:r>
             <a:r>
-              <a:rPr lang="en-US" dirty="0" smtClean="0">
+              <a:rPr lang="en-US" dirty="0">
                 <a:sym typeface="Wingdings" panose="05000000000000000000" pitchFamily="2" charset="2"/>
               </a:rPr>
               <a:t> takes input from </a:t>
             </a:r>
             <a:r>
-              <a:rPr lang="en-US" i="1" dirty="0" err="1" smtClean="0">
+              <a:rPr lang="en-US" i="1" dirty="0" err="1">
                 <a:sym typeface="Wingdings" panose="05000000000000000000" pitchFamily="2" charset="2"/>
               </a:rPr>
               <a:t>stdin</a:t>
             </a:r>
             <a:r>
-              <a:rPr lang="en-US" i="1" dirty="0" smtClean="0">
+              <a:rPr lang="en-US" i="1" dirty="0">
                 <a:sym typeface="Wingdings" panose="05000000000000000000" pitchFamily="2" charset="2"/>
               </a:rPr>
               <a:t> </a:t>
             </a:r>
             <a:r>
-              <a:rPr lang="en-US" dirty="0" smtClean="0">
+              <a:rPr lang="en-US" dirty="0">
                 <a:sym typeface="Wingdings" panose="05000000000000000000" pitchFamily="2" charset="2"/>
               </a:rPr>
               <a:t>and passes it as arguments to another program</a:t>
             </a:r>
-            <a:endParaRPr lang="en-US" dirty="0" smtClean="0"/>
+            <a:endParaRPr lang="en-US" dirty="0"/>
           </a:p>
         </p:txBody>
       </p:sp>
@@ -6607,13 +6550,6 @@
   <p:clrMapOvr>
     <a:masterClrMapping/>
   </p:clrMapOvr>
-  <p:timing>
-    <p:tnLst>
-      <p:par>
-        <p:cTn id="1" dur="indefinite" restart="never" nodeType="tmRoot"/>
-      </p:par>
-    </p:tnLst>
-  </p:timing>
 </p:sld>
 </file>
 
@@ -6655,10 +6591,9 @@
           <a:lstStyle/>
           <a:p>
             <a:r>
-              <a:rPr lang="en-US" dirty="0" smtClean="0"/>
+              <a:rPr lang="en-US" dirty="0"/>
               <a:t>Let’s find some stuff</a:t>
             </a:r>
-            <a:endParaRPr lang="en-US" dirty="0"/>
           </a:p>
         </p:txBody>
       </p:sp>
@@ -6685,16 +6620,15 @@
           <a:lstStyle/>
           <a:p>
             <a:r>
-              <a:rPr lang="en-US" sz="2400" u="sng" dirty="0" smtClean="0"/>
+              <a:rPr lang="en-US" sz="2400" u="sng" dirty="0"/>
               <a:t>Basic bash syntax</a:t>
             </a:r>
           </a:p>
           <a:p>
             <a:r>
-              <a:rPr lang="en-US" sz="2400" dirty="0" smtClean="0"/>
+              <a:rPr lang="en-US" sz="2400" dirty="0"/>
               <a:t>$ find path expression</a:t>
             </a:r>
-            <a:endParaRPr lang="en-US" sz="2400" dirty="0"/>
           </a:p>
         </p:txBody>
       </p:sp>
@@ -6721,32 +6655,32 @@
           <a:lstStyle/>
           <a:p>
             <a:r>
-              <a:rPr lang="en-US" sz="2000" u="sng" dirty="0" smtClean="0"/>
+              <a:rPr lang="en-US" sz="2000" u="sng" dirty="0"/>
               <a:t>additional options:</a:t>
             </a:r>
           </a:p>
           <a:p>
             <a:r>
-              <a:rPr lang="en-US" sz="2000" dirty="0" smtClean="0"/>
+              <a:rPr lang="en-US" sz="2000" dirty="0"/>
               <a:t>specify predicates (see table) </a:t>
             </a:r>
           </a:p>
           <a:p>
             <a:r>
-              <a:rPr lang="en-US" sz="2000" dirty="0" smtClean="0"/>
+              <a:rPr lang="en-US" sz="2000" dirty="0"/>
               <a:t>can chain together expression using logical operators</a:t>
             </a:r>
           </a:p>
           <a:p>
             <a:r>
-              <a:rPr lang="en-US" sz="2000" dirty="0" smtClean="0"/>
+              <a:rPr lang="en-US" sz="2000" dirty="0"/>
               <a:t>limit recursive depth using –</a:t>
             </a:r>
             <a:r>
-              <a:rPr lang="en-US" sz="2000" dirty="0" err="1" smtClean="0"/>
+              <a:rPr lang="en-US" sz="2000" dirty="0" err="1"/>
               <a:t>maxdepth</a:t>
             </a:r>
-            <a:endParaRPr lang="en-US" sz="2000" dirty="0" smtClean="0"/>
+            <a:endParaRPr lang="en-US" sz="2000" dirty="0"/>
           </a:p>
           <a:p>
             <a:endParaRPr lang="en-US" sz="2000" dirty="0"/>
@@ -6850,13 +6784,6 @@
   <p:clrMapOvr>
     <a:masterClrMapping/>
   </p:clrMapOvr>
-  <p:timing>
-    <p:tnLst>
-      <p:par>
-        <p:cTn id="1" dur="indefinite" restart="never" nodeType="tmRoot"/>
-      </p:par>
-    </p:tnLst>
-  </p:timing>
 </p:sld>
 </file>
 
@@ -6893,10 +6820,9 @@
           <a:lstStyle/>
           <a:p>
             <a:r>
-              <a:rPr lang="en-US" dirty="0" smtClean="0"/>
+              <a:rPr lang="en-US" dirty="0"/>
               <a:t>find -exec</a:t>
             </a:r>
-            <a:endParaRPr lang="en-US" dirty="0"/>
           </a:p>
         </p:txBody>
       </p:sp>
@@ -6921,7 +6847,7 @@
           <a:lstStyle/>
           <a:p>
             <a:r>
-              <a:rPr lang="en-US" dirty="0" smtClean="0"/>
+              <a:rPr lang="en-US" dirty="0"/>
               <a:t>using –exec runs commands on the results of find</a:t>
             </a:r>
           </a:p>
@@ -7001,13 +6927,13 @@
           <a:lstStyle/>
           <a:p>
             <a:r>
-              <a:rPr lang="en-US" sz="2000" dirty="0" smtClean="0"/>
+              <a:rPr lang="en-US" sz="2000" dirty="0"/>
               <a:t>Important thing to keep in mind:</a:t>
             </a:r>
           </a:p>
           <a:p>
             <a:r>
-              <a:rPr lang="en-US" sz="2000" dirty="0" smtClean="0"/>
+              <a:rPr lang="en-US" sz="2000" dirty="0"/>
               <a:t>check your expression first to make sure it is returning the files you want prior to running commands on them</a:t>
             </a:r>
           </a:p>
@@ -7275,13 +7201,8 @@
           <a:p>
             <a:r>
               <a:rPr lang="en-US" dirty="0"/>
-              <a:t>git clone </a:t>
-            </a:r>
-            <a:r>
-              <a:rPr lang="en-US" dirty="0"/>
-              <a:t>https://github.com/Cfernz/Chapter12-challenge</a:t>
-            </a:r>
-            <a:endParaRPr lang="en-US" dirty="0"/>
+              <a:t>git clone https://github.com/Cfernz/Chapter12-challenge</a:t>
+            </a:r>
           </a:p>
         </p:txBody>
       </p:sp>
@@ -7417,7 +7338,7 @@
           <a:lstStyle/>
           <a:p>
             <a:r>
-              <a:rPr lang="en-US" dirty="0" err="1" smtClean="0"/>
+              <a:rPr lang="en-US" dirty="0" err="1"/>
               <a:t>xargs</a:t>
             </a:r>
             <a:endParaRPr lang="en-US" dirty="0"/>
@@ -7445,37 +7366,37 @@
           <a:lstStyle/>
           <a:p>
             <a:r>
-              <a:rPr lang="en-US" dirty="0" smtClean="0"/>
+              <a:rPr lang="en-US" dirty="0"/>
               <a:t>better for larger tasks (compared to find –exec)</a:t>
             </a:r>
           </a:p>
           <a:p>
             <a:r>
-              <a:rPr lang="en-US" dirty="0" smtClean="0"/>
+              <a:rPr lang="en-US" dirty="0"/>
               <a:t>basically splits the output from find into arguments and places them after the command</a:t>
             </a:r>
           </a:p>
           <a:p>
             <a:r>
-              <a:rPr lang="en-US" dirty="0" smtClean="0"/>
+              <a:rPr lang="en-US" dirty="0"/>
               <a:t>can set the number of arguments passed to the command using the -n option</a:t>
             </a:r>
           </a:p>
           <a:p>
             <a:r>
-              <a:rPr lang="en-US" dirty="0" smtClean="0"/>
+              <a:rPr lang="en-US" dirty="0"/>
               <a:t>can take input from other bash commands, such as </a:t>
             </a:r>
             <a:r>
-              <a:rPr lang="en-US" i="1" dirty="0" smtClean="0"/>
+              <a:rPr lang="en-US" i="1" dirty="0"/>
               <a:t>cat</a:t>
             </a:r>
             <a:r>
-              <a:rPr lang="en-US" dirty="0" smtClean="0"/>
+              <a:rPr lang="en-US" dirty="0"/>
               <a:t> or </a:t>
             </a:r>
             <a:r>
-              <a:rPr lang="en-US" i="1" dirty="0" err="1" smtClean="0"/>
+              <a:rPr lang="en-US" i="1" dirty="0" err="1"/>
               <a:t>grep</a:t>
             </a:r>
             <a:endParaRPr lang="en-US" dirty="0"/>
@@ -7529,24 +7450,23 @@
           <a:lstStyle/>
           <a:p>
             <a:r>
-              <a:rPr lang="en-US" sz="2400" u="sng" dirty="0" smtClean="0"/>
+              <a:rPr lang="en-US" sz="2400" u="sng" dirty="0"/>
               <a:t>Basic bash syntax (with find)</a:t>
             </a:r>
           </a:p>
           <a:p>
             <a:r>
-              <a:rPr lang="en-US" sz="2400" dirty="0" smtClean="0"/>
+              <a:rPr lang="en-US" sz="2400" dirty="0"/>
               <a:t>$ find path expression | </a:t>
             </a:r>
             <a:r>
-              <a:rPr lang="en-US" sz="2400" dirty="0" err="1" smtClean="0"/>
+              <a:rPr lang="en-US" sz="2400" dirty="0" err="1"/>
               <a:t>xargs</a:t>
             </a:r>
             <a:r>
-              <a:rPr lang="en-US" sz="2400" dirty="0" smtClean="0"/>
+              <a:rPr lang="en-US" sz="2400" dirty="0"/>
               <a:t> command</a:t>
             </a:r>
-            <a:endParaRPr lang="en-US" sz="2400" dirty="0"/>
           </a:p>
         </p:txBody>
       </p:sp>
@@ -7879,18 +7799,17 @@
           <a:lstStyle/>
           <a:p>
             <a:r>
-              <a:rPr lang="en-US" dirty="0" smtClean="0"/>
+              <a:rPr lang="en-US" dirty="0"/>
               <a:t>Other </a:t>
             </a:r>
             <a:r>
-              <a:rPr lang="en-US" dirty="0" err="1" smtClean="0"/>
+              <a:rPr lang="en-US" dirty="0" err="1"/>
               <a:t>xargs</a:t>
             </a:r>
             <a:r>
-              <a:rPr lang="en-US" dirty="0" smtClean="0"/>
+              <a:rPr lang="en-US" dirty="0"/>
               <a:t> tricks</a:t>
             </a:r>
-            <a:endParaRPr lang="en-US" dirty="0"/>
           </a:p>
         </p:txBody>
       </p:sp>
@@ -7910,52 +7829,51 @@
           <a:lstStyle/>
           <a:p>
             <a:r>
-              <a:rPr lang="en-US" dirty="0" smtClean="0"/>
+              <a:rPr lang="en-US" dirty="0"/>
               <a:t>can use it to build commands that are written to simple bash scripts</a:t>
             </a:r>
           </a:p>
           <a:p>
             <a:pPr lvl="1"/>
             <a:r>
-              <a:rPr lang="en-US" dirty="0" smtClean="0"/>
+              <a:rPr lang="en-US" dirty="0"/>
               <a:t>allows for inspection of commands before running them</a:t>
             </a:r>
           </a:p>
           <a:p>
             <a:r>
-              <a:rPr lang="en-US" dirty="0" smtClean="0"/>
+              <a:rPr lang="en-US" dirty="0"/>
               <a:t>Can combine with </a:t>
             </a:r>
             <a:r>
-              <a:rPr lang="en-US" i="1" dirty="0" err="1" smtClean="0"/>
+              <a:rPr lang="en-US" i="1" dirty="0" err="1"/>
               <a:t>basename</a:t>
             </a:r>
             <a:r>
-              <a:rPr lang="en-US" dirty="0" smtClean="0"/>
+              <a:rPr lang="en-US" dirty="0"/>
               <a:t> to help with looping</a:t>
             </a:r>
           </a:p>
           <a:p>
             <a:r>
-              <a:rPr lang="en-US" dirty="0" smtClean="0"/>
+              <a:rPr lang="en-US" dirty="0"/>
               <a:t>can use the -I option to control placement of arguments</a:t>
             </a:r>
           </a:p>
           <a:p>
             <a:pPr lvl="1"/>
             <a:r>
-              <a:rPr lang="en-US" dirty="0" smtClean="0"/>
+              <a:rPr lang="en-US" dirty="0"/>
               <a:t>$find path expression | </a:t>
             </a:r>
             <a:r>
-              <a:rPr lang="en-US" dirty="0" err="1" smtClean="0"/>
+              <a:rPr lang="en-US" dirty="0" err="1"/>
               <a:t>xargs</a:t>
             </a:r>
             <a:r>
-              <a:rPr lang="en-US" dirty="0" smtClean="0"/>
+              <a:rPr lang="en-US" dirty="0"/>
               <a:t> -I{} command --option1 {} --option2{}</a:t>
             </a:r>
-            <a:endParaRPr lang="en-US" dirty="0"/>
           </a:p>
         </p:txBody>
       </p:sp>
@@ -8112,14 +8030,13 @@
           <a:lstStyle/>
           <a:p>
             <a:r>
-              <a:rPr lang="en-US" dirty="0" err="1" smtClean="0"/>
+              <a:rPr lang="en-US" dirty="0" err="1"/>
               <a:t>xargs</a:t>
             </a:r>
             <a:r>
-              <a:rPr lang="en-US" dirty="0" smtClean="0"/>
+              <a:rPr lang="en-US" dirty="0"/>
               <a:t> and parallelization</a:t>
             </a:r>
-            <a:endParaRPr lang="en-US" dirty="0"/>
           </a:p>
         </p:txBody>
       </p:sp>
@@ -8144,40 +8061,35 @@
           <a:lstStyle/>
           <a:p>
             <a:r>
-              <a:rPr lang="en-US" dirty="0" err="1" smtClean="0"/>
+              <a:rPr lang="en-US" dirty="0" err="1"/>
               <a:t>xargs</a:t>
             </a:r>
             <a:r>
               <a:rPr lang="en-US" dirty="0"/>
-              <a:t> </a:t>
-            </a:r>
-            <a:r>
-              <a:rPr lang="en-US" dirty="0" smtClean="0"/>
-              <a:t>allows you to limit the number of background processes running simultaneously</a:t>
+              <a:t> allows you to limit the number of background processes running simultaneously</a:t>
             </a:r>
           </a:p>
           <a:p>
             <a:pPr lvl="1"/>
             <a:r>
-              <a:rPr lang="en-US" dirty="0" smtClean="0"/>
+              <a:rPr lang="en-US" dirty="0"/>
               <a:t>you cannot do this with a simple for loop</a:t>
             </a:r>
           </a:p>
           <a:p>
             <a:pPr lvl="1"/>
             <a:r>
-              <a:rPr lang="en-US" dirty="0" smtClean="0"/>
+              <a:rPr lang="en-US" dirty="0"/>
               <a:t>use the -P &lt;</a:t>
             </a:r>
             <a:r>
-              <a:rPr lang="en-US" dirty="0" err="1" smtClean="0"/>
+              <a:rPr lang="en-US" dirty="0" err="1"/>
               <a:t>num</a:t>
             </a:r>
             <a:r>
-              <a:rPr lang="en-US" dirty="0" smtClean="0"/>
+              <a:rPr lang="en-US" dirty="0"/>
               <a:t>&gt; option</a:t>
             </a:r>
-            <a:endParaRPr lang="en-US" dirty="0"/>
           </a:p>
         </p:txBody>
       </p:sp>
@@ -8191,13 +8103,6 @@
   <p:clrMapOvr>
     <a:masterClrMapping/>
   </p:clrMapOvr>
-  <p:timing>
-    <p:tnLst>
-      <p:par>
-        <p:cTn id="1" dur="indefinite" restart="never" nodeType="tmRoot"/>
-      </p:par>
-    </p:tnLst>
-  </p:timing>
 </p:sld>
 </file>
 
@@ -8234,10 +8139,9 @@
           <a:lstStyle/>
           <a:p>
             <a:r>
-              <a:rPr lang="en-US" dirty="0" smtClean="0"/>
+              <a:rPr lang="en-US" dirty="0"/>
               <a:t>A quick note about Make</a:t>
             </a:r>
-            <a:endParaRPr lang="en-US" dirty="0"/>
           </a:p>
         </p:txBody>
       </p:sp>
@@ -8262,53 +8166,53 @@
           <a:lstStyle/>
           <a:p>
             <a:r>
-              <a:rPr lang="en-US" dirty="0" smtClean="0"/>
+              <a:rPr lang="en-US" dirty="0"/>
               <a:t>Make is used to interpret </a:t>
             </a:r>
             <a:r>
-              <a:rPr lang="en-US" dirty="0" err="1" smtClean="0"/>
+              <a:rPr lang="en-US" dirty="0" err="1"/>
               <a:t>makefiles</a:t>
             </a:r>
             <a:r>
-              <a:rPr lang="en-US" dirty="0" smtClean="0"/>
+              <a:rPr lang="en-US" dirty="0"/>
               <a:t> to compile software.</a:t>
             </a:r>
           </a:p>
           <a:p>
             <a:r>
-              <a:rPr lang="en-US" dirty="0" err="1" smtClean="0"/>
+              <a:rPr lang="en-US" dirty="0" err="1"/>
               <a:t>makefiles</a:t>
             </a:r>
             <a:r>
-              <a:rPr lang="en-US" dirty="0" smtClean="0"/>
+              <a:rPr lang="en-US" dirty="0"/>
               <a:t> have their own language</a:t>
             </a:r>
           </a:p>
           <a:p>
             <a:pPr lvl="1"/>
             <a:r>
-              <a:rPr lang="en-US" dirty="0" smtClean="0"/>
+              <a:rPr lang="en-US" dirty="0"/>
               <a:t>are set of rules, with each rule having three parts</a:t>
             </a:r>
           </a:p>
           <a:p>
             <a:pPr lvl="2"/>
             <a:r>
-              <a:rPr lang="en-US" dirty="0" smtClean="0"/>
+              <a:rPr lang="en-US" dirty="0"/>
               <a:t>target - the file that is being built</a:t>
             </a:r>
           </a:p>
           <a:p>
             <a:pPr lvl="2"/>
             <a:r>
-              <a:rPr lang="en-US" dirty="0" smtClean="0"/>
+              <a:rPr lang="en-US" dirty="0"/>
               <a:t>prerequisites - specifies which files are needed to build the target</a:t>
             </a:r>
           </a:p>
           <a:p>
             <a:pPr lvl="2"/>
             <a:r>
-              <a:rPr lang="en-US" dirty="0" smtClean="0"/>
+              <a:rPr lang="en-US" dirty="0"/>
               <a:t>recipe - set of commands used to build the target</a:t>
             </a:r>
           </a:p>
@@ -8324,13 +8228,6 @@
   <p:clrMapOvr>
     <a:masterClrMapping/>
   </p:clrMapOvr>
-  <p:timing>
-    <p:tnLst>
-      <p:par>
-        <p:cTn id="1" dur="indefinite" restart="never" nodeType="tmRoot"/>
-      </p:par>
-    </p:tnLst>
-  </p:timing>
 </p:sld>
 </file>
 
@@ -8372,10 +8269,9 @@
           <a:lstStyle/>
           <a:p>
             <a:r>
-              <a:rPr lang="en-US" dirty="0" smtClean="0"/>
+              <a:rPr lang="en-US" dirty="0"/>
               <a:t>Activity 2 and BLAST Challenge</a:t>
             </a:r>
-            <a:endParaRPr lang="en-US" dirty="0"/>
           </a:p>
         </p:txBody>
       </p:sp>
@@ -8389,13 +8285,6 @@
   <p:clrMapOvr>
     <a:masterClrMapping/>
   </p:clrMapOvr>
-  <p:timing>
-    <p:tnLst>
-      <p:par>
-        <p:cTn id="1" dur="indefinite" restart="never" nodeType="tmRoot"/>
-      </p:par>
-    </p:tnLst>
-  </p:timing>
 </p:sld>
 </file>
 
@@ -10130,13 +10019,7 @@
               <a:rPr lang="en-US" dirty="0">
                 <a:cs typeface="Calibri Light"/>
               </a:rPr>
-              <a:t>Running </a:t>
-            </a:r>
-            <a:r>
-              <a:rPr lang="en-US" dirty="0" smtClean="0">
-                <a:cs typeface="Calibri Light"/>
-              </a:rPr>
-              <a:t>scripts and variables</a:t>
+              <a:t>Running scripts and variables</a:t>
             </a:r>
             <a:endParaRPr lang="en-US" dirty="0"/>
           </a:p>
@@ -10171,50 +10054,50 @@
           <a:lstStyle/>
           <a:p>
             <a:r>
-              <a:rPr lang="en-US" dirty="0" smtClean="0"/>
+              <a:rPr lang="en-US" dirty="0"/>
               <a:t>Two ways to run scripts</a:t>
             </a:r>
           </a:p>
           <a:p>
             <a:pPr lvl="1"/>
             <a:r>
-              <a:rPr lang="en-US" dirty="0" smtClean="0"/>
+              <a:rPr lang="en-US" dirty="0"/>
               <a:t>$ ./script.sh</a:t>
             </a:r>
           </a:p>
           <a:p>
             <a:pPr lvl="1"/>
             <a:r>
-              <a:rPr lang="en-US" dirty="0" smtClean="0"/>
+              <a:rPr lang="en-US" dirty="0"/>
               <a:t>$ bash script.sh</a:t>
             </a:r>
           </a:p>
           <a:p>
             <a:r>
-              <a:rPr lang="en-US" dirty="0" smtClean="0"/>
+              <a:rPr lang="en-US" dirty="0"/>
               <a:t>Script must be executable</a:t>
             </a:r>
           </a:p>
           <a:p>
             <a:pPr lvl="1"/>
             <a:r>
-              <a:rPr lang="en-US" dirty="0" smtClean="0"/>
+              <a:rPr lang="en-US" dirty="0"/>
               <a:t>$ </a:t>
             </a:r>
             <a:r>
-              <a:rPr lang="en-US" dirty="0" err="1" smtClean="0"/>
+              <a:rPr lang="en-US" dirty="0" err="1"/>
               <a:t>chmod</a:t>
             </a:r>
             <a:r>
-              <a:rPr lang="en-US" dirty="0" smtClean="0"/>
+              <a:rPr lang="en-US" dirty="0"/>
               <a:t> </a:t>
             </a:r>
             <a:r>
-              <a:rPr lang="en-US" dirty="0" err="1" smtClean="0"/>
+              <a:rPr lang="en-US" dirty="0" err="1"/>
               <a:t>u+x</a:t>
             </a:r>
             <a:r>
-              <a:rPr lang="en-US" dirty="0" smtClean="0"/>
+              <a:rPr lang="en-US" dirty="0"/>
               <a:t> script.sh</a:t>
             </a:r>
           </a:p>
@@ -10413,53 +10296,52 @@
           </a:lstStyle>
           <a:p>
             <a:r>
-              <a:rPr lang="en-US" dirty="0" smtClean="0"/>
+              <a:rPr lang="en-US" dirty="0"/>
               <a:t>Variables</a:t>
             </a:r>
           </a:p>
           <a:p>
             <a:pPr lvl="1"/>
             <a:r>
-              <a:rPr lang="en-US" dirty="0" smtClean="0"/>
+              <a:rPr lang="en-US" dirty="0"/>
               <a:t>Variables can be used to store settings/parameters</a:t>
             </a:r>
           </a:p>
           <a:p>
             <a:pPr lvl="1"/>
             <a:r>
-              <a:rPr lang="en-US" dirty="0" smtClean="0"/>
+              <a:rPr lang="en-US" dirty="0"/>
               <a:t>Allow you to change one value rather than many hardcoded values</a:t>
             </a:r>
           </a:p>
           <a:p>
             <a:pPr lvl="1"/>
             <a:r>
-              <a:rPr lang="en-US" dirty="0" smtClean="0"/>
+              <a:rPr lang="en-US" dirty="0"/>
               <a:t>Bash variables do not have data types (i.e., string, </a:t>
             </a:r>
             <a:r>
-              <a:rPr lang="en-US" dirty="0" err="1" smtClean="0"/>
+              <a:rPr lang="en-US" dirty="0" err="1"/>
               <a:t>int</a:t>
             </a:r>
             <a:r>
-              <a:rPr lang="en-US" dirty="0" smtClean="0"/>
+              <a:rPr lang="en-US" dirty="0"/>
               <a:t>, character)</a:t>
             </a:r>
           </a:p>
           <a:p>
             <a:pPr lvl="1"/>
             <a:r>
-              <a:rPr lang="en-US" dirty="0" smtClean="0"/>
+              <a:rPr lang="en-US" dirty="0"/>
               <a:t>Variables are accessed by using ‘$’ in front of the variable name</a:t>
             </a:r>
           </a:p>
           <a:p>
             <a:pPr lvl="1"/>
             <a:r>
-              <a:rPr lang="en-US" dirty="0" smtClean="0"/>
+              <a:rPr lang="en-US" dirty="0"/>
               <a:t>Remember, no spaces!!</a:t>
             </a:r>
-            <a:endParaRPr lang="en-US" dirty="0" smtClean="0"/>
           </a:p>
         </p:txBody>
       </p:sp>
@@ -10473,13 +10355,6 @@
   <p:clrMapOvr>
     <a:masterClrMapping/>
   </p:clrMapOvr>
-  <p:timing>
-    <p:tnLst>
-      <p:par>
-        <p:cTn id="1" dur="indefinite" restart="never" nodeType="tmRoot"/>
-      </p:par>
-    </p:tnLst>
-  </p:timing>
 </p:sld>
 </file>
 
@@ -10521,10 +10396,9 @@
           <a:lstStyle/>
           <a:p>
             <a:r>
-              <a:rPr lang="en-US" dirty="0" smtClean="0"/>
+              <a:rPr lang="en-US" dirty="0"/>
               <a:t>Arguments</a:t>
             </a:r>
-            <a:endParaRPr lang="en-US" dirty="0"/>
           </a:p>
         </p:txBody>
       </p:sp>
@@ -10549,34 +10423,34 @@
           <a:lstStyle/>
           <a:p>
             <a:r>
-              <a:rPr lang="en-US" dirty="0" smtClean="0"/>
+              <a:rPr lang="en-US" dirty="0"/>
               <a:t>Arguments are used to pass information to a script at run-time</a:t>
             </a:r>
           </a:p>
           <a:p>
             <a:r>
-              <a:rPr lang="en-US" dirty="0" smtClean="0"/>
+              <a:rPr lang="en-US" dirty="0"/>
               <a:t>Assigned to a value ($1, $2, $3, etc.)</a:t>
             </a:r>
           </a:p>
           <a:p>
             <a:pPr lvl="1"/>
             <a:r>
-              <a:rPr lang="en-US" dirty="0" smtClean="0"/>
+              <a:rPr lang="en-US" dirty="0"/>
               <a:t>$0 stores the script name</a:t>
             </a:r>
           </a:p>
           <a:p>
             <a:pPr lvl="1"/>
             <a:r>
-              <a:rPr lang="en-US" dirty="0" smtClean="0"/>
+              <a:rPr lang="en-US" dirty="0"/>
               <a:t>The rest are assign based on order</a:t>
             </a:r>
           </a:p>
           <a:p>
             <a:pPr lvl="1"/>
             <a:r>
-              <a:rPr lang="en-US" dirty="0" smtClean="0"/>
+              <a:rPr lang="en-US" dirty="0"/>
               <a:t>$# stores the number of arguments</a:t>
             </a:r>
           </a:p>
@@ -10586,7 +10460,7 @@
           </a:p>
           <a:p>
             <a:r>
-              <a:rPr lang="en-US" dirty="0" smtClean="0"/>
+              <a:rPr lang="en-US" dirty="0"/>
               <a:t>Usage: </a:t>
             </a:r>
           </a:p>
@@ -10878,22 +10752,10 @@
           <a:p>
             <a:pPr lvl="1"/>
             <a:r>
-              <a:rPr lang="en-US" dirty="0" smtClean="0">
-                <a:cs typeface="Calibri"/>
-              </a:rPr>
-              <a:t>What </a:t>
-            </a:r>
-            <a:r>
               <a:rPr lang="en-US" dirty="0">
                 <a:cs typeface="Calibri"/>
               </a:rPr>
-              <a:t>can we use these for</a:t>
-            </a:r>
-            <a:r>
-              <a:rPr lang="en-US" dirty="0" smtClean="0">
-                <a:cs typeface="Calibri"/>
-              </a:rPr>
-              <a:t>?</a:t>
+              <a:t>What can we use these for?</a:t>
             </a:r>
           </a:p>
           <a:p>
@@ -10930,7 +10792,7 @@
           <a:p>
             <a:pPr lvl="1"/>
             <a:r>
-              <a:rPr lang="en-US" dirty="0" smtClean="0">
+              <a:rPr lang="en-US" dirty="0">
                 <a:cs typeface="Calibri"/>
               </a:rPr>
               <a:t>What can we use these for?</a:t>
@@ -10942,21 +10804,12 @@
               <a:rPr lang="en-US" dirty="0">
                 <a:cs typeface="Calibri"/>
               </a:rPr>
-              <a:t>Used to perform the same command or set of commands many </a:t>
-            </a:r>
-            <a:r>
-              <a:rPr lang="en-US" dirty="0" smtClean="0">
-                <a:cs typeface="Calibri"/>
-              </a:rPr>
-              <a:t>times</a:t>
-            </a:r>
-            <a:endParaRPr lang="en-US" dirty="0" smtClean="0">
-              <a:cs typeface="Calibri"/>
-            </a:endParaRPr>
+              <a:t>Used to perform the same command or set of commands many times</a:t>
+            </a:r>
           </a:p>
           <a:p>
             <a:pPr lvl="1"/>
-            <a:endParaRPr lang="en-US" dirty="0" smtClean="0">
+            <a:endParaRPr lang="en-US" dirty="0">
               <a:cs typeface="Calibri"/>
             </a:endParaRPr>
           </a:p>
@@ -11426,15 +11279,7 @@
           <a:p>
             <a:r>
               <a:rPr lang="en-US" sz="2000" dirty="0"/>
-              <a:t>	echo “found ‘pattern’ in </a:t>
-            </a:r>
-            <a:r>
-              <a:rPr lang="en-US" sz="2000" dirty="0" smtClean="0"/>
-              <a:t>‘</a:t>
-            </a:r>
-            <a:r>
-              <a:rPr lang="en-US" sz="2000" dirty="0"/>
-              <a:t>some_file.txt’”</a:t>
+              <a:t>	echo “found ‘pattern’ in ‘some_file.txt’”</a:t>
             </a:r>
           </a:p>
           <a:p>
@@ -11585,10 +11430,9 @@
           <a:lstStyle/>
           <a:p>
             <a:r>
-              <a:rPr lang="en-US" dirty="0" smtClean="0"/>
+              <a:rPr lang="en-US" dirty="0"/>
               <a:t>Any command, pipeline, or test condition to evaluate</a:t>
             </a:r>
-            <a:endParaRPr lang="en-US" dirty="0"/>
           </a:p>
         </p:txBody>
       </p:sp>
@@ -11615,10 +11459,9 @@
           <a:lstStyle/>
           <a:p>
             <a:r>
-              <a:rPr lang="en-US" dirty="0" smtClean="0"/>
+              <a:rPr lang="en-US" dirty="0"/>
               <a:t>all statements/commands executed of [commands] evaluates to true/0</a:t>
             </a:r>
-            <a:endParaRPr lang="en-US" dirty="0"/>
           </a:p>
         </p:txBody>
       </p:sp>
@@ -11645,16 +11488,15 @@
           <a:lstStyle/>
           <a:p>
             <a:r>
-              <a:rPr lang="en-US" dirty="0" smtClean="0"/>
+              <a:rPr lang="en-US" dirty="0"/>
               <a:t>all statements/commands executed of [commands] evaluates to false/!0</a:t>
             </a:r>
           </a:p>
           <a:p>
             <a:r>
-              <a:rPr lang="en-US" dirty="0" smtClean="0"/>
+              <a:rPr lang="en-US" dirty="0"/>
               <a:t>This is optional</a:t>
             </a:r>
-            <a:endParaRPr lang="en-US" dirty="0"/>
           </a:p>
         </p:txBody>
       </p:sp>
@@ -11681,10 +11523,9 @@
           <a:lstStyle/>
           <a:p>
             <a:r>
-              <a:rPr lang="en-US" dirty="0" smtClean="0"/>
+              <a:rPr lang="en-US" dirty="0"/>
               <a:t>Can also chain commands with logical operators (&amp;&amp; and ||)</a:t>
             </a:r>
-            <a:endParaRPr lang="en-US" dirty="0"/>
           </a:p>
         </p:txBody>
       </p:sp>
@@ -12177,24 +12018,24 @@
         <p:spPr>
           <a:xfrm>
             <a:off x="485774" y="1350963"/>
-            <a:ext cx="4448175" cy="4351338"/>
+            <a:ext cx="4448175" cy="4941682"/>
           </a:xfrm>
         </p:spPr>
         <p:txBody>
           <a:bodyPr>
-            <a:normAutofit lnSpcReduction="10000"/>
+            <a:normAutofit/>
           </a:bodyPr>
           <a:lstStyle/>
           <a:p>
             <a:r>
-              <a:rPr lang="en-US" dirty="0" smtClean="0"/>
+              <a:rPr lang="en-US" dirty="0"/>
               <a:t>Indicates return value of the test specified through its arguments</a:t>
             </a:r>
           </a:p>
           <a:p>
             <a:r>
-              <a:rPr lang="en-US" dirty="0" smtClean="0"/>
-              <a:t>Most common use is to check whether a file or directory exists</a:t>
+              <a:rPr lang="en-US" dirty="0"/>
+              <a:t>Most common use is to check whether input is a file or a directory or whether something exists.</a:t>
             </a:r>
           </a:p>
           <a:p>
@@ -12202,15 +12043,15 @@
               <a:buNone/>
             </a:pPr>
             <a:r>
-              <a:rPr lang="en-US" dirty="0" smtClean="0"/>
+              <a:rPr lang="en-US" dirty="0"/>
               <a:t>$ test –d </a:t>
             </a:r>
             <a:r>
-              <a:rPr lang="en-US" dirty="0" err="1" smtClean="0"/>
+              <a:rPr lang="en-US" dirty="0" err="1"/>
               <a:t>some_dir</a:t>
             </a:r>
             <a:r>
-              <a:rPr lang="en-US" dirty="0" smtClean="0"/>
+              <a:rPr lang="en-US" dirty="0"/>
               <a:t> ; echo $?</a:t>
             </a:r>
           </a:p>
@@ -12222,10 +12063,9 @@
           </a:p>
           <a:p>
             <a:r>
-              <a:rPr lang="en-US" dirty="0" smtClean="0"/>
+              <a:rPr lang="en-US" dirty="0"/>
               <a:t>Can combine with if statements</a:t>
             </a:r>
-            <a:endParaRPr lang="en-US" dirty="0"/>
           </a:p>
         </p:txBody>
       </p:sp>
@@ -12286,13 +12126,6 @@
   <p:clrMapOvr>
     <a:masterClrMapping/>
   </p:clrMapOvr>
-  <p:timing>
-    <p:tnLst>
-      <p:par>
-        <p:cTn id="1" dur="indefinite" restart="never" nodeType="tmRoot"/>
-      </p:par>
-    </p:tnLst>
-  </p:timing>
 </p:sld>
 </file>
 

</xml_diff>

<commit_message>
updated ppt and add activity files
</commit_message>
<xml_diff>
--- a/Chapter12-scripting.pptx
+++ b/Chapter12-scripting.pptx
@@ -5,7 +5,7 @@
     <p:sldMasterId id="2147483660" r:id="rId1"/>
   </p:sldMasterIdLst>
   <p:notesMasterIdLst>
-    <p:notesMasterId r:id="rId26"/>
+    <p:notesMasterId r:id="rId27"/>
   </p:notesMasterIdLst>
   <p:sldIdLst>
     <p:sldId id="256" r:id="rId2"/>
@@ -18,20 +18,21 @@
     <p:sldId id="263" r:id="rId9"/>
     <p:sldId id="264" r:id="rId10"/>
     <p:sldId id="265" r:id="rId11"/>
-    <p:sldId id="271" r:id="rId12"/>
-    <p:sldId id="272" r:id="rId13"/>
-    <p:sldId id="273" r:id="rId14"/>
+    <p:sldId id="281" r:id="rId12"/>
+    <p:sldId id="271" r:id="rId13"/>
+    <p:sldId id="272" r:id="rId14"/>
     <p:sldId id="266" r:id="rId15"/>
-    <p:sldId id="262" r:id="rId16"/>
-    <p:sldId id="267" r:id="rId17"/>
-    <p:sldId id="270" r:id="rId18"/>
-    <p:sldId id="274" r:id="rId19"/>
-    <p:sldId id="275" r:id="rId20"/>
-    <p:sldId id="276" r:id="rId21"/>
-    <p:sldId id="277" r:id="rId22"/>
-    <p:sldId id="278" r:id="rId23"/>
-    <p:sldId id="279" r:id="rId24"/>
-    <p:sldId id="280" r:id="rId25"/>
+    <p:sldId id="273" r:id="rId16"/>
+    <p:sldId id="262" r:id="rId17"/>
+    <p:sldId id="267" r:id="rId18"/>
+    <p:sldId id="270" r:id="rId19"/>
+    <p:sldId id="274" r:id="rId20"/>
+    <p:sldId id="275" r:id="rId21"/>
+    <p:sldId id="276" r:id="rId22"/>
+    <p:sldId id="277" r:id="rId23"/>
+    <p:sldId id="278" r:id="rId24"/>
+    <p:sldId id="279" r:id="rId25"/>
+    <p:sldId id="280" r:id="rId26"/>
   </p:sldIdLst>
   <p:sldSz cx="12192000" cy="6858000"/>
   <p:notesSz cx="6858000" cy="9144000"/>
@@ -896,7 +897,7 @@
           <a:p>
             <a:fld id="{60BAC664-0E1A-4630-9E6F-FAC90CE96519}" type="datetimeFigureOut">
               <a:rPr lang="en-US" smtClean="0"/>
-              <a:t>4/3/2019</a:t>
+              <a:t>4/4/2019</a:t>
             </a:fld>
             <a:endParaRPr lang="en-US"/>
           </a:p>
@@ -1250,6 +1251,304 @@
 </p:notes>
 </file>
 
+<file path=ppt/notesSlides/notesSlide10.xml><?xml version="1.0" encoding="utf-8"?>
+<p:notes xmlns:a="http://schemas.openxmlformats.org/drawingml/2006/main" xmlns:r="http://schemas.openxmlformats.org/officeDocument/2006/relationships" xmlns:p="http://schemas.openxmlformats.org/presentationml/2006/main">
+  <p:cSld>
+    <p:spTree>
+      <p:nvGrpSpPr>
+        <p:cNvPr id="1" name=""/>
+        <p:cNvGrpSpPr/>
+        <p:nvPr/>
+      </p:nvGrpSpPr>
+      <p:grpSpPr>
+        <a:xfrm>
+          <a:off x="0" y="0"/>
+          <a:ext cx="0" cy="0"/>
+          <a:chOff x="0" y="0"/>
+          <a:chExt cx="0" cy="0"/>
+        </a:xfrm>
+      </p:grpSpPr>
+      <p:sp>
+        <p:nvSpPr>
+          <p:cNvPr id="2" name="Slide Image Placeholder 1"/>
+          <p:cNvSpPr>
+            <a:spLocks noGrp="1" noRot="1" noChangeAspect="1"/>
+          </p:cNvSpPr>
+          <p:nvPr>
+            <p:ph type="sldImg"/>
+          </p:nvPr>
+        </p:nvSpPr>
+        <p:spPr/>
+      </p:sp>
+      <p:sp>
+        <p:nvSpPr>
+          <p:cNvPr id="3" name="Notes Placeholder 2"/>
+          <p:cNvSpPr>
+            <a:spLocks noGrp="1"/>
+          </p:cNvSpPr>
+          <p:nvPr>
+            <p:ph type="body" idx="1"/>
+          </p:nvPr>
+        </p:nvSpPr>
+        <p:spPr/>
+        <p:txBody>
+          <a:bodyPr/>
+          <a:lstStyle/>
+          <a:p>
+            <a:r>
+              <a:rPr lang="en-US" dirty="0" smtClean="0"/>
+              <a:t>also note that you can nest</a:t>
+            </a:r>
+            <a:r>
+              <a:rPr lang="en-US" baseline="0" dirty="0" smtClean="0"/>
+              <a:t> loops and conditionals</a:t>
+            </a:r>
+            <a:endParaRPr lang="en-US" dirty="0"/>
+          </a:p>
+        </p:txBody>
+      </p:sp>
+      <p:sp>
+        <p:nvSpPr>
+          <p:cNvPr id="4" name="Slide Number Placeholder 3"/>
+          <p:cNvSpPr>
+            <a:spLocks noGrp="1"/>
+          </p:cNvSpPr>
+          <p:nvPr>
+            <p:ph type="sldNum" sz="quarter" idx="10"/>
+          </p:nvPr>
+        </p:nvSpPr>
+        <p:spPr/>
+        <p:txBody>
+          <a:bodyPr/>
+          <a:lstStyle/>
+          <a:p>
+            <a:fld id="{C9872400-0B8F-4302-A91E-1A1598B0382E}" type="slidenum">
+              <a:rPr lang="en-US" smtClean="0"/>
+              <a:t>16</a:t>
+            </a:fld>
+            <a:endParaRPr lang="en-US"/>
+          </a:p>
+        </p:txBody>
+      </p:sp>
+    </p:spTree>
+    <p:extLst>
+      <p:ext uri="{BB962C8B-B14F-4D97-AF65-F5344CB8AC3E}">
+        <p14:creationId xmlns:p14="http://schemas.microsoft.com/office/powerpoint/2010/main" val="4223825975"/>
+      </p:ext>
+    </p:extLst>
+  </p:cSld>
+  <p:clrMapOvr>
+    <a:masterClrMapping/>
+  </p:clrMapOvr>
+</p:notes>
+</file>
+
+<file path=ppt/notesSlides/notesSlide11.xml><?xml version="1.0" encoding="utf-8"?>
+<p:notes xmlns:a="http://schemas.openxmlformats.org/drawingml/2006/main" xmlns:r="http://schemas.openxmlformats.org/officeDocument/2006/relationships" xmlns:p="http://schemas.openxmlformats.org/presentationml/2006/main">
+  <p:cSld>
+    <p:spTree>
+      <p:nvGrpSpPr>
+        <p:cNvPr id="1" name=""/>
+        <p:cNvGrpSpPr/>
+        <p:nvPr/>
+      </p:nvGrpSpPr>
+      <p:grpSpPr>
+        <a:xfrm>
+          <a:off x="0" y="0"/>
+          <a:ext cx="0" cy="0"/>
+          <a:chOff x="0" y="0"/>
+          <a:chExt cx="0" cy="0"/>
+        </a:xfrm>
+      </p:grpSpPr>
+      <p:sp>
+        <p:nvSpPr>
+          <p:cNvPr id="2" name="Slide Image Placeholder 1"/>
+          <p:cNvSpPr>
+            <a:spLocks noGrp="1" noRot="1" noChangeAspect="1"/>
+          </p:cNvSpPr>
+          <p:nvPr>
+            <p:ph type="sldImg"/>
+          </p:nvPr>
+        </p:nvSpPr>
+        <p:spPr/>
+      </p:sp>
+      <p:sp>
+        <p:nvSpPr>
+          <p:cNvPr id="3" name="Notes Placeholder 2"/>
+          <p:cNvSpPr>
+            <a:spLocks noGrp="1"/>
+          </p:cNvSpPr>
+          <p:nvPr>
+            <p:ph type="body" idx="1"/>
+          </p:nvPr>
+        </p:nvSpPr>
+        <p:spPr/>
+        <p:txBody>
+          <a:bodyPr/>
+          <a:lstStyle/>
+          <a:p>
+            <a:r>
+              <a:rPr lang="en-US" dirty="0"/>
+              <a:t>could include the part about</a:t>
+            </a:r>
+            <a:r>
+              <a:rPr lang="en-US" baseline="0" dirty="0"/>
+              <a:t> </a:t>
+            </a:r>
+            <a:r>
+              <a:rPr lang="en-US" baseline="0" dirty="0" err="1"/>
+              <a:t>xargs</a:t>
+            </a:r>
+            <a:r>
+              <a:rPr lang="en-US" baseline="0" dirty="0"/>
+              <a:t>, Pipes, and Redirects (pg. 420) here</a:t>
+            </a:r>
+          </a:p>
+          <a:p>
+            <a:r>
+              <a:rPr lang="en-US" baseline="0" dirty="0"/>
+              <a:t>Do we need another discussion point here? (how do find and </a:t>
+            </a:r>
+            <a:r>
+              <a:rPr lang="en-US" baseline="0" dirty="0" err="1"/>
+              <a:t>xargs</a:t>
+            </a:r>
+            <a:r>
+              <a:rPr lang="en-US" baseline="0" dirty="0"/>
+              <a:t> contribute to repro and robust?)</a:t>
+            </a:r>
+            <a:endParaRPr lang="en-US" dirty="0"/>
+          </a:p>
+        </p:txBody>
+      </p:sp>
+      <p:sp>
+        <p:nvSpPr>
+          <p:cNvPr id="4" name="Slide Number Placeholder 3"/>
+          <p:cNvSpPr>
+            <a:spLocks noGrp="1"/>
+          </p:cNvSpPr>
+          <p:nvPr>
+            <p:ph type="sldNum" sz="quarter" idx="10"/>
+          </p:nvPr>
+        </p:nvSpPr>
+        <p:spPr/>
+        <p:txBody>
+          <a:bodyPr/>
+          <a:lstStyle/>
+          <a:p>
+            <a:fld id="{C9872400-0B8F-4302-A91E-1A1598B0382E}" type="slidenum">
+              <a:rPr lang="en-US" smtClean="0"/>
+              <a:t>23</a:t>
+            </a:fld>
+            <a:endParaRPr lang="en-US"/>
+          </a:p>
+        </p:txBody>
+      </p:sp>
+    </p:spTree>
+    <p:extLst>
+      <p:ext uri="{BB962C8B-B14F-4D97-AF65-F5344CB8AC3E}">
+        <p14:creationId xmlns:p14="http://schemas.microsoft.com/office/powerpoint/2010/main" val="2405818309"/>
+      </p:ext>
+    </p:extLst>
+  </p:cSld>
+  <p:clrMapOvr>
+    <a:masterClrMapping/>
+  </p:clrMapOvr>
+</p:notes>
+</file>
+
+<file path=ppt/notesSlides/notesSlide12.xml><?xml version="1.0" encoding="utf-8"?>
+<p:notes xmlns:a="http://schemas.openxmlformats.org/drawingml/2006/main" xmlns:r="http://schemas.openxmlformats.org/officeDocument/2006/relationships" xmlns:p="http://schemas.openxmlformats.org/presentationml/2006/main">
+  <p:cSld>
+    <p:spTree>
+      <p:nvGrpSpPr>
+        <p:cNvPr id="1" name=""/>
+        <p:cNvGrpSpPr/>
+        <p:nvPr/>
+      </p:nvGrpSpPr>
+      <p:grpSpPr>
+        <a:xfrm>
+          <a:off x="0" y="0"/>
+          <a:ext cx="0" cy="0"/>
+          <a:chOff x="0" y="0"/>
+          <a:chExt cx="0" cy="0"/>
+        </a:xfrm>
+      </p:grpSpPr>
+      <p:sp>
+        <p:nvSpPr>
+          <p:cNvPr id="2" name="Slide Image Placeholder 1"/>
+          <p:cNvSpPr>
+            <a:spLocks noGrp="1" noRot="1" noChangeAspect="1"/>
+          </p:cNvSpPr>
+          <p:nvPr>
+            <p:ph type="sldImg"/>
+          </p:nvPr>
+        </p:nvSpPr>
+        <p:spPr/>
+      </p:sp>
+      <p:sp>
+        <p:nvSpPr>
+          <p:cNvPr id="3" name="Notes Placeholder 2"/>
+          <p:cNvSpPr>
+            <a:spLocks noGrp="1"/>
+          </p:cNvSpPr>
+          <p:nvPr>
+            <p:ph type="body" idx="1"/>
+          </p:nvPr>
+        </p:nvSpPr>
+        <p:spPr/>
+        <p:txBody>
+          <a:bodyPr/>
+          <a:lstStyle/>
+          <a:p>
+            <a:r>
+              <a:rPr lang="en-US" dirty="0"/>
+              <a:t>don’t know if we want</a:t>
+            </a:r>
+            <a:r>
+              <a:rPr lang="en-US" baseline="0" dirty="0"/>
+              <a:t> to go into more detail than this. Could use the example from the book.</a:t>
+            </a:r>
+            <a:endParaRPr lang="en-US" dirty="0"/>
+          </a:p>
+        </p:txBody>
+      </p:sp>
+      <p:sp>
+        <p:nvSpPr>
+          <p:cNvPr id="4" name="Slide Number Placeholder 3"/>
+          <p:cNvSpPr>
+            <a:spLocks noGrp="1"/>
+          </p:cNvSpPr>
+          <p:nvPr>
+            <p:ph type="sldNum" sz="quarter" idx="10"/>
+          </p:nvPr>
+        </p:nvSpPr>
+        <p:spPr/>
+        <p:txBody>
+          <a:bodyPr/>
+          <a:lstStyle/>
+          <a:p>
+            <a:fld id="{C9872400-0B8F-4302-A91E-1A1598B0382E}" type="slidenum">
+              <a:rPr lang="en-US" smtClean="0"/>
+              <a:t>24</a:t>
+            </a:fld>
+            <a:endParaRPr lang="en-US"/>
+          </a:p>
+        </p:txBody>
+      </p:sp>
+    </p:spTree>
+    <p:extLst>
+      <p:ext uri="{BB962C8B-B14F-4D97-AF65-F5344CB8AC3E}">
+        <p14:creationId xmlns:p14="http://schemas.microsoft.com/office/powerpoint/2010/main" val="1877235520"/>
+      </p:ext>
+    </p:extLst>
+  </p:cSld>
+  <p:clrMapOvr>
+    <a:masterClrMapping/>
+  </p:clrMapOvr>
+</p:notes>
+</file>
+
 <file path=ppt/notesSlides/notesSlide2.xml><?xml version="1.0" encoding="utf-8"?>
 <p:notes xmlns:a="http://schemas.openxmlformats.org/drawingml/2006/main" xmlns:r="http://schemas.openxmlformats.org/officeDocument/2006/relationships" xmlns:p="http://schemas.openxmlformats.org/presentationml/2006/main">
   <p:cSld>
@@ -1398,8 +1697,29 @@
           <a:lstStyle/>
           <a:p>
             <a:r>
+              <a:rPr lang="en-US" dirty="0" smtClean="0"/>
+              <a:t>Ask to discuss</a:t>
+            </a:r>
+            <a:r>
+              <a:rPr lang="en-US" baseline="0" dirty="0" smtClean="0"/>
+              <a:t> what $0, $1, $2, etc. mean</a:t>
+            </a:r>
+          </a:p>
+          <a:p>
+            <a:r>
+              <a:rPr lang="en-US" baseline="0" dirty="0" smtClean="0"/>
+              <a:t>Script is on repo, so you can execute the script at the command line.</a:t>
+            </a:r>
+            <a:endParaRPr lang="en-US" dirty="0" smtClean="0"/>
+          </a:p>
+          <a:p>
+            <a:r>
+              <a:rPr lang="en-US" dirty="0" smtClean="0"/>
+              <a:t>Stop </a:t>
+            </a:r>
+            <a:r>
               <a:rPr lang="en-US" dirty="0"/>
-              <a:t>Stop for questions here</a:t>
+              <a:t>for questions here</a:t>
             </a:r>
           </a:p>
         </p:txBody>
@@ -1590,7 +1910,33 @@
             </a:r>
             <a:r>
               <a:rPr lang="en-US" baseline="0" dirty="0"/>
-              <a:t> is greater than/less than another, etc.</a:t>
+              <a:t> is greater than/less than another, etc</a:t>
+            </a:r>
+            <a:r>
+              <a:rPr lang="en-US" baseline="0" dirty="0" smtClean="0"/>
+              <a:t>.</a:t>
+            </a:r>
+          </a:p>
+          <a:p>
+            <a:r>
+              <a:rPr lang="en-US" baseline="0" dirty="0" smtClean="0"/>
+              <a:t>Another example from Bin: have 20 </a:t>
+            </a:r>
+            <a:r>
+              <a:rPr lang="en-US" baseline="0" dirty="0" err="1" smtClean="0"/>
+              <a:t>fq</a:t>
+            </a:r>
+            <a:r>
+              <a:rPr lang="en-US" baseline="0" dirty="0" smtClean="0"/>
+              <a:t> files to map and you submit the job. 10 finish and 10 fail due to some issue. You can resubmit the job and use test to test for existing bam files to indicate that mapping worked for the corresponding </a:t>
+            </a:r>
+            <a:r>
+              <a:rPr lang="en-US" baseline="0" dirty="0" err="1" smtClean="0"/>
+              <a:t>fastq</a:t>
+            </a:r>
+            <a:r>
+              <a:rPr lang="en-US" baseline="0" dirty="0" smtClean="0"/>
+              <a:t>, that way you only run mapping on the ones that failed.</a:t>
             </a:r>
             <a:endParaRPr lang="en-US" dirty="0"/>
           </a:p>
@@ -1678,7 +2024,7 @@
           <a:p>
             <a:r>
               <a:rPr lang="en-US" dirty="0"/>
-              <a:t>Will use bash arrays in the activity</a:t>
+              <a:t>shebang = path to interpreter used to execute the script</a:t>
             </a:r>
           </a:p>
         </p:txBody>
@@ -1690,7 +2036,7 @@
             <a:spLocks noGrp="1"/>
           </p:cNvSpPr>
           <p:nvPr>
-            <p:ph type="sldNum" sz="quarter" idx="10"/>
+            <p:ph type="sldNum" sz="quarter" idx="5"/>
           </p:nvPr>
         </p:nvSpPr>
         <p:spPr/>
@@ -1698,18 +2044,78 @@
           <a:bodyPr/>
           <a:lstStyle/>
           <a:p>
+            <a:pPr marL="0" marR="0" lvl="0" indent="0" algn="r" defTabSz="914400" rtl="0" eaLnBrk="1" fontAlgn="auto" latinLnBrk="0" hangingPunct="1">
+              <a:lnSpc>
+                <a:spcPct val="100000"/>
+              </a:lnSpc>
+              <a:spcBef>
+                <a:spcPts val="0"/>
+              </a:spcBef>
+              <a:spcAft>
+                <a:spcPts val="0"/>
+              </a:spcAft>
+              <a:buClrTx/>
+              <a:buSzTx/>
+              <a:buFontTx/>
+              <a:buNone/>
+              <a:tabLst/>
+              <a:defRPr/>
+            </a:pPr>
             <a:fld id="{C9872400-0B8F-4302-A91E-1A1598B0382E}" type="slidenum">
-              <a:rPr lang="en-US" smtClean="0"/>
+              <a:rPr kumimoji="0" lang="en-US" sz="1200" b="0" i="0" u="none" strike="noStrike" kern="1200" cap="none" spc="0" normalizeH="0" baseline="0" noProof="0" smtClean="0">
+                <a:ln>
+                  <a:noFill/>
+                </a:ln>
+                <a:solidFill>
+                  <a:prstClr val="black"/>
+                </a:solidFill>
+                <a:effectLst/>
+                <a:uLnTx/>
+                <a:uFillTx/>
+                <a:latin typeface="Calibri" panose="020F0502020204030204"/>
+                <a:ea typeface="+mn-ea"/>
+                <a:cs typeface="+mn-cs"/>
+              </a:rPr>
+              <a:pPr marL="0" marR="0" lvl="0" indent="0" algn="r" defTabSz="914400" rtl="0" eaLnBrk="1" fontAlgn="auto" latinLnBrk="0" hangingPunct="1">
+                <a:lnSpc>
+                  <a:spcPct val="100000"/>
+                </a:lnSpc>
+                <a:spcBef>
+                  <a:spcPts val="0"/>
+                </a:spcBef>
+                <a:spcAft>
+                  <a:spcPts val="0"/>
+                </a:spcAft>
+                <a:buClrTx/>
+                <a:buSzTx/>
+                <a:buFontTx/>
+                <a:buNone/>
+                <a:tabLst/>
+                <a:defRPr/>
+              </a:pPr>
               <a:t>11</a:t>
             </a:fld>
-            <a:endParaRPr lang="en-US"/>
+            <a:endParaRPr kumimoji="0" lang="en-US" sz="1200" b="0" i="0" u="none" strike="noStrike" kern="1200" cap="none" spc="0" normalizeH="0" baseline="0" noProof="0">
+              <a:ln>
+                <a:noFill/>
+              </a:ln>
+              <a:solidFill>
+                <a:prstClr val="black"/>
+              </a:solidFill>
+              <a:effectLst/>
+              <a:uLnTx/>
+              <a:uFillTx/>
+              <a:latin typeface="Calibri" panose="020F0502020204030204"/>
+              <a:ea typeface="+mn-ea"/>
+              <a:cs typeface="+mn-cs"/>
+            </a:endParaRPr>
           </a:p>
         </p:txBody>
       </p:sp>
     </p:spTree>
     <p:extLst>
       <p:ext uri="{BB962C8B-B14F-4D97-AF65-F5344CB8AC3E}">
-        <p14:creationId xmlns:p14="http://schemas.microsoft.com/office/powerpoint/2010/main" val="812400667"/>
+        <p14:creationId xmlns:p14="http://schemas.microsoft.com/office/powerpoint/2010/main" val="3083926640"/>
       </p:ext>
     </p:extLst>
   </p:cSld>
@@ -1765,35 +2171,8 @@
           <a:p>
             <a:r>
               <a:rPr lang="en-US" dirty="0"/>
-              <a:t>could include the part about</a:t>
-            </a:r>
-            <a:r>
-              <a:rPr lang="en-US" baseline="0" dirty="0"/>
-              <a:t> </a:t>
-            </a:r>
-            <a:r>
-              <a:rPr lang="en-US" baseline="0" dirty="0" err="1"/>
-              <a:t>xargs</a:t>
-            </a:r>
-            <a:r>
-              <a:rPr lang="en-US" baseline="0" dirty="0"/>
-              <a:t>, Pipes, and Redirects (pg. 420) here</a:t>
-            </a:r>
-          </a:p>
-          <a:p>
-            <a:r>
-              <a:rPr lang="en-US" baseline="0" dirty="0"/>
-              <a:t>Do we need another discussion point here? (how do find and </a:t>
-            </a:r>
-            <a:r>
-              <a:rPr lang="en-US" baseline="0" dirty="0" err="1"/>
-              <a:t>xargs</a:t>
-            </a:r>
-            <a:r>
-              <a:rPr lang="en-US" baseline="0" dirty="0"/>
-              <a:t> contribute to repro and robust?)</a:t>
-            </a:r>
-            <a:endParaRPr lang="en-US" dirty="0"/>
+              <a:t>Will use bash arrays in the activity</a:t>
+            </a:r>
           </a:p>
         </p:txBody>
       </p:sp>
@@ -1814,7 +2193,7 @@
           <a:p>
             <a:fld id="{C9872400-0B8F-4302-A91E-1A1598B0382E}" type="slidenum">
               <a:rPr lang="en-US" smtClean="0"/>
-              <a:t>22</a:t>
+              <a:t>12</a:t>
             </a:fld>
             <a:endParaRPr lang="en-US"/>
           </a:p>
@@ -1823,7 +2202,7 @@
     </p:spTree>
     <p:extLst>
       <p:ext uri="{BB962C8B-B14F-4D97-AF65-F5344CB8AC3E}">
-        <p14:creationId xmlns:p14="http://schemas.microsoft.com/office/powerpoint/2010/main" val="2405818309"/>
+        <p14:creationId xmlns:p14="http://schemas.microsoft.com/office/powerpoint/2010/main" val="812400667"/>
       </p:ext>
     </p:extLst>
   </p:cSld>
@@ -1878,12 +2257,12 @@
           <a:lstStyle/>
           <a:p>
             <a:r>
-              <a:rPr lang="en-US" dirty="0"/>
-              <a:t>don’t know if we want</a:t>
-            </a:r>
-            <a:r>
-              <a:rPr lang="en-US" baseline="0" dirty="0"/>
-              <a:t> to go into more detail than this. Could use the example from the book.</a:t>
+              <a:rPr lang="en-US" dirty="0" smtClean="0"/>
+              <a:t>test files are</a:t>
+            </a:r>
+            <a:r>
+              <a:rPr lang="en-US" baseline="0" dirty="0" smtClean="0"/>
+              <a:t> on repo, can demonstrate in class</a:t>
             </a:r>
             <a:endParaRPr lang="en-US" dirty="0"/>
           </a:p>
@@ -1906,7 +2285,7 @@
           <a:p>
             <a:fld id="{C9872400-0B8F-4302-A91E-1A1598B0382E}" type="slidenum">
               <a:rPr lang="en-US" smtClean="0"/>
-              <a:t>23</a:t>
+              <a:t>13</a:t>
             </a:fld>
             <a:endParaRPr lang="en-US"/>
           </a:p>
@@ -1915,7 +2294,99 @@
     </p:spTree>
     <p:extLst>
       <p:ext uri="{BB962C8B-B14F-4D97-AF65-F5344CB8AC3E}">
-        <p14:creationId xmlns:p14="http://schemas.microsoft.com/office/powerpoint/2010/main" val="1877235520"/>
+        <p14:creationId xmlns:p14="http://schemas.microsoft.com/office/powerpoint/2010/main" val="4289778561"/>
+      </p:ext>
+    </p:extLst>
+  </p:cSld>
+  <p:clrMapOvr>
+    <a:masterClrMapping/>
+  </p:clrMapOvr>
+</p:notes>
+</file>
+
+<file path=ppt/notesSlides/notesSlide9.xml><?xml version="1.0" encoding="utf-8"?>
+<p:notes xmlns:a="http://schemas.openxmlformats.org/drawingml/2006/main" xmlns:r="http://schemas.openxmlformats.org/officeDocument/2006/relationships" xmlns:p="http://schemas.openxmlformats.org/presentationml/2006/main">
+  <p:cSld>
+    <p:spTree>
+      <p:nvGrpSpPr>
+        <p:cNvPr id="1" name=""/>
+        <p:cNvGrpSpPr/>
+        <p:nvPr/>
+      </p:nvGrpSpPr>
+      <p:grpSpPr>
+        <a:xfrm>
+          <a:off x="0" y="0"/>
+          <a:ext cx="0" cy="0"/>
+          <a:chOff x="0" y="0"/>
+          <a:chExt cx="0" cy="0"/>
+        </a:xfrm>
+      </p:grpSpPr>
+      <p:sp>
+        <p:nvSpPr>
+          <p:cNvPr id="2" name="Slide Image Placeholder 1"/>
+          <p:cNvSpPr>
+            <a:spLocks noGrp="1" noRot="1" noChangeAspect="1"/>
+          </p:cNvSpPr>
+          <p:nvPr>
+            <p:ph type="sldImg"/>
+          </p:nvPr>
+        </p:nvSpPr>
+        <p:spPr/>
+      </p:sp>
+      <p:sp>
+        <p:nvSpPr>
+          <p:cNvPr id="3" name="Notes Placeholder 2"/>
+          <p:cNvSpPr>
+            <a:spLocks noGrp="1"/>
+          </p:cNvSpPr>
+          <p:nvPr>
+            <p:ph type="body" idx="1"/>
+          </p:nvPr>
+        </p:nvSpPr>
+        <p:spPr/>
+        <p:txBody>
+          <a:bodyPr/>
+          <a:lstStyle/>
+          <a:p>
+            <a:r>
+              <a:rPr lang="en-US" dirty="0" smtClean="0"/>
+              <a:t>demonstrate</a:t>
+            </a:r>
+            <a:r>
+              <a:rPr lang="en-US" baseline="0" dirty="0" smtClean="0"/>
+              <a:t> using examples from previous slide</a:t>
+            </a:r>
+            <a:endParaRPr lang="en-US" dirty="0"/>
+          </a:p>
+        </p:txBody>
+      </p:sp>
+      <p:sp>
+        <p:nvSpPr>
+          <p:cNvPr id="4" name="Slide Number Placeholder 3"/>
+          <p:cNvSpPr>
+            <a:spLocks noGrp="1"/>
+          </p:cNvSpPr>
+          <p:nvPr>
+            <p:ph type="sldNum" sz="quarter" idx="10"/>
+          </p:nvPr>
+        </p:nvSpPr>
+        <p:spPr/>
+        <p:txBody>
+          <a:bodyPr/>
+          <a:lstStyle/>
+          <a:p>
+            <a:fld id="{C9872400-0B8F-4302-A91E-1A1598B0382E}" type="slidenum">
+              <a:rPr lang="en-US" smtClean="0"/>
+              <a:t>14</a:t>
+            </a:fld>
+            <a:endParaRPr lang="en-US"/>
+          </a:p>
+        </p:txBody>
+      </p:sp>
+    </p:spTree>
+    <p:extLst>
+      <p:ext uri="{BB962C8B-B14F-4D97-AF65-F5344CB8AC3E}">
+        <p14:creationId xmlns:p14="http://schemas.microsoft.com/office/powerpoint/2010/main" val="2327093101"/>
       </p:ext>
     </p:extLst>
   </p:cSld>
@@ -2056,7 +2527,7 @@
           <a:p>
             <a:fld id="{846CE7D5-CF57-46EF-B807-FDD0502418D4}" type="datetimeFigureOut">
               <a:rPr lang="en-US" smtClean="0"/>
-              <a:t>4/3/2019</a:t>
+              <a:t>4/4/2019</a:t>
             </a:fld>
             <a:endParaRPr lang="en-US"/>
           </a:p>
@@ -2226,7 +2697,7 @@
           <a:p>
             <a:fld id="{846CE7D5-CF57-46EF-B807-FDD0502418D4}" type="datetimeFigureOut">
               <a:rPr lang="en-US" smtClean="0"/>
-              <a:t>4/3/2019</a:t>
+              <a:t>4/4/2019</a:t>
             </a:fld>
             <a:endParaRPr lang="en-US"/>
           </a:p>
@@ -2406,7 +2877,7 @@
           <a:p>
             <a:fld id="{846CE7D5-CF57-46EF-B807-FDD0502418D4}" type="datetimeFigureOut">
               <a:rPr lang="en-US" smtClean="0"/>
-              <a:t>4/3/2019</a:t>
+              <a:t>4/4/2019</a:t>
             </a:fld>
             <a:endParaRPr lang="en-US"/>
           </a:p>
@@ -2576,7 +3047,7 @@
           <a:p>
             <a:fld id="{846CE7D5-CF57-46EF-B807-FDD0502418D4}" type="datetimeFigureOut">
               <a:rPr lang="en-US" smtClean="0"/>
-              <a:t>4/3/2019</a:t>
+              <a:t>4/4/2019</a:t>
             </a:fld>
             <a:endParaRPr lang="en-US"/>
           </a:p>
@@ -2822,7 +3293,7 @@
           <a:p>
             <a:fld id="{846CE7D5-CF57-46EF-B807-FDD0502418D4}" type="datetimeFigureOut">
               <a:rPr lang="en-US" smtClean="0"/>
-              <a:t>4/3/2019</a:t>
+              <a:t>4/4/2019</a:t>
             </a:fld>
             <a:endParaRPr lang="en-US"/>
           </a:p>
@@ -3054,7 +3525,7 @@
           <a:p>
             <a:fld id="{846CE7D5-CF57-46EF-B807-FDD0502418D4}" type="datetimeFigureOut">
               <a:rPr lang="en-US" smtClean="0"/>
-              <a:t>4/3/2019</a:t>
+              <a:t>4/4/2019</a:t>
             </a:fld>
             <a:endParaRPr lang="en-US"/>
           </a:p>
@@ -3421,7 +3892,7 @@
           <a:p>
             <a:fld id="{846CE7D5-CF57-46EF-B807-FDD0502418D4}" type="datetimeFigureOut">
               <a:rPr lang="en-US" smtClean="0"/>
-              <a:t>4/3/2019</a:t>
+              <a:t>4/4/2019</a:t>
             </a:fld>
             <a:endParaRPr lang="en-US"/>
           </a:p>
@@ -3539,7 +4010,7 @@
           <a:p>
             <a:fld id="{846CE7D5-CF57-46EF-B807-FDD0502418D4}" type="datetimeFigureOut">
               <a:rPr lang="en-US" smtClean="0"/>
-              <a:t>4/3/2019</a:t>
+              <a:t>4/4/2019</a:t>
             </a:fld>
             <a:endParaRPr lang="en-US"/>
           </a:p>
@@ -3634,7 +4105,7 @@
           <a:p>
             <a:fld id="{846CE7D5-CF57-46EF-B807-FDD0502418D4}" type="datetimeFigureOut">
               <a:rPr lang="en-US" smtClean="0"/>
-              <a:t>4/3/2019</a:t>
+              <a:t>4/4/2019</a:t>
             </a:fld>
             <a:endParaRPr lang="en-US"/>
           </a:p>
@@ -3911,7 +4382,7 @@
           <a:p>
             <a:fld id="{846CE7D5-CF57-46EF-B807-FDD0502418D4}" type="datetimeFigureOut">
               <a:rPr lang="en-US" smtClean="0"/>
-              <a:t>4/3/2019</a:t>
+              <a:t>4/4/2019</a:t>
             </a:fld>
             <a:endParaRPr lang="en-US"/>
           </a:p>
@@ -4168,7 +4639,7 @@
           <a:p>
             <a:fld id="{846CE7D5-CF57-46EF-B807-FDD0502418D4}" type="datetimeFigureOut">
               <a:rPr lang="en-US" smtClean="0"/>
-              <a:t>4/3/2019</a:t>
+              <a:t>4/4/2019</a:t>
             </a:fld>
             <a:endParaRPr lang="en-US"/>
           </a:p>
@@ -4381,7 +4852,7 @@
           <a:p>
             <a:fld id="{846CE7D5-CF57-46EF-B807-FDD0502418D4}" type="datetimeFigureOut">
               <a:rPr lang="en-US" smtClean="0"/>
-              <a:t>4/3/2019</a:t>
+              <a:t>4/4/2019</a:t>
             </a:fld>
             <a:endParaRPr lang="en-US"/>
           </a:p>
@@ -5339,6 +5810,73 @@
           <a:chExt cx="0" cy="0"/>
         </a:xfrm>
       </p:grpSpPr>
+      <p:pic>
+        <p:nvPicPr>
+          <p:cNvPr id="16" name="Picture 15">
+            <a:extLst>
+              <a:ext uri="{FF2B5EF4-FFF2-40B4-BE49-F238E27FC236}">
+                <a16:creationId xmlns:a16="http://schemas.microsoft.com/office/drawing/2014/main" id="{88181309-BC45-4974-B5C3-18C51AD37EFA}"/>
+              </a:ext>
+            </a:extLst>
+          </p:cNvPr>
+          <p:cNvPicPr>
+            <a:picLocks noChangeAspect="1"/>
+          </p:cNvPicPr>
+          <p:nvPr/>
+        </p:nvPicPr>
+        <p:blipFill>
+          <a:blip r:embed="rId3"/>
+          <a:stretch>
+            <a:fillRect/>
+          </a:stretch>
+        </p:blipFill>
+        <p:spPr>
+          <a:xfrm>
+            <a:off x="1945257" y="479237"/>
+            <a:ext cx="7483630" cy="5724859"/>
+          </a:xfrm>
+          <a:prstGeom prst="rect">
+            <a:avLst/>
+          </a:prstGeom>
+        </p:spPr>
+      </p:pic>
+    </p:spTree>
+    <p:extLst>
+      <p:ext uri="{BB962C8B-B14F-4D97-AF65-F5344CB8AC3E}">
+        <p14:creationId xmlns:p14="http://schemas.microsoft.com/office/powerpoint/2010/main" val="1852803977"/>
+      </p:ext>
+    </p:extLst>
+  </p:cSld>
+  <p:clrMapOvr>
+    <a:masterClrMapping/>
+  </p:clrMapOvr>
+  <p:timing>
+    <p:tnLst>
+      <p:par>
+        <p:cTn id="1" dur="indefinite" restart="never" nodeType="tmRoot"/>
+      </p:par>
+    </p:tnLst>
+  </p:timing>
+</p:sld>
+</file>
+
+<file path=ppt/slides/slide12.xml><?xml version="1.0" encoding="utf-8"?>
+<p:sld xmlns:a="http://schemas.openxmlformats.org/drawingml/2006/main" xmlns:r="http://schemas.openxmlformats.org/officeDocument/2006/relationships" xmlns:p="http://schemas.openxmlformats.org/presentationml/2006/main">
+  <p:cSld>
+    <p:spTree>
+      <p:nvGrpSpPr>
+        <p:cNvPr id="1" name=""/>
+        <p:cNvGrpSpPr/>
+        <p:nvPr/>
+      </p:nvGrpSpPr>
+      <p:grpSpPr>
+        <a:xfrm>
+          <a:off x="0" y="0"/>
+          <a:ext cx="0" cy="0"/>
+          <a:chOff x="0" y="0"/>
+          <a:chExt cx="0" cy="0"/>
+        </a:xfrm>
+      </p:grpSpPr>
       <p:sp>
         <p:nvSpPr>
           <p:cNvPr id="2" name="Title 1"/>
@@ -5513,10 +6051,17 @@
   <p:clrMapOvr>
     <a:masterClrMapping/>
   </p:clrMapOvr>
+  <p:timing>
+    <p:tnLst>
+      <p:par>
+        <p:cTn id="1" dur="indefinite" restart="never" nodeType="tmRoot"/>
+      </p:par>
+    </p:tnLst>
+  </p:timing>
 </p:sld>
 </file>
 
-<file path=ppt/slides/slide12.xml><?xml version="1.0" encoding="utf-8"?>
+<file path=ppt/slides/slide13.xml><?xml version="1.0" encoding="utf-8"?>
 <p:sld xmlns:a="http://schemas.openxmlformats.org/drawingml/2006/main" xmlns:r="http://schemas.openxmlformats.org/officeDocument/2006/relationships" xmlns:p="http://schemas.openxmlformats.org/presentationml/2006/main">
   <p:cSld>
     <p:spTree>
@@ -5543,7 +6088,12 @@
             <p:ph type="title"/>
           </p:nvPr>
         </p:nvSpPr>
-        <p:spPr/>
+        <p:spPr>
+          <a:xfrm>
+            <a:off x="323850" y="42138"/>
+            <a:ext cx="10515600" cy="1325563"/>
+          </a:xfrm>
+        </p:spPr>
         <p:txBody>
           <a:bodyPr/>
           <a:lstStyle/>
@@ -5567,13 +6117,13 @@
         </p:nvSpPr>
         <p:spPr>
           <a:xfrm>
-            <a:off x="838200" y="1825625"/>
-            <a:ext cx="9782175" cy="4351338"/>
+            <a:off x="323850" y="1367701"/>
+            <a:ext cx="7581900" cy="2509837"/>
           </a:xfrm>
         </p:spPr>
         <p:txBody>
           <a:bodyPr>
-            <a:normAutofit lnSpcReduction="10000"/>
+            <a:normAutofit/>
           </a:bodyPr>
           <a:lstStyle/>
           <a:p>
@@ -5600,89 +6150,212 @@
             <a:pPr lvl="1"/>
             <a:endParaRPr lang="en-US" dirty="0"/>
           </a:p>
-          <a:p>
-            <a:r>
-              <a:rPr lang="en-US" dirty="0"/>
+        </p:txBody>
+      </p:sp>
+      <p:sp>
+        <p:nvSpPr>
+          <p:cNvPr id="4" name="Rectangle 3"/>
+          <p:cNvSpPr/>
+          <p:nvPr/>
+        </p:nvSpPr>
+        <p:spPr>
+          <a:xfrm>
+            <a:off x="323851" y="4123462"/>
+            <a:ext cx="7905750" cy="2431435"/>
+          </a:xfrm>
+          <a:prstGeom prst="rect">
+            <a:avLst/>
+          </a:prstGeom>
+        </p:spPr>
+        <p:txBody>
+          <a:bodyPr wrap="square">
+            <a:spAutoFit/>
+          </a:bodyPr>
+          <a:lstStyle/>
+          <a:p>
+            <a:pPr marL="285750" indent="-285750">
+              <a:buFont typeface="Arial" panose="020B0604020202020204" pitchFamily="34" charset="0"/>
+              <a:buChar char="•"/>
+            </a:pPr>
+            <a:r>
+              <a:rPr lang="en-US" sz="2800" dirty="0"/>
               <a:t>We can use </a:t>
             </a:r>
             <a:r>
-              <a:rPr lang="en-US" i="1" dirty="0" err="1"/>
+              <a:rPr lang="en-US" sz="2800" i="1" dirty="0" err="1"/>
               <a:t>basename</a:t>
             </a:r>
             <a:r>
-              <a:rPr lang="en-US" dirty="0"/>
+              <a:rPr lang="en-US" sz="2800" dirty="0"/>
               <a:t> to strip the path and extension from each filename</a:t>
             </a:r>
           </a:p>
           <a:p>
-            <a:pPr lvl="1"/>
-            <a:r>
-              <a:rPr lang="en-US" dirty="0"/>
+            <a:pPr marL="742950" lvl="1" indent="-285750">
+              <a:buFont typeface="Arial" panose="020B0604020202020204" pitchFamily="34" charset="0"/>
+              <a:buChar char="•"/>
+            </a:pPr>
+            <a:r>
+              <a:rPr lang="en-US" sz="2400" dirty="0"/>
               <a:t>$ </a:t>
             </a:r>
             <a:r>
-              <a:rPr lang="en-US" dirty="0" err="1"/>
+              <a:rPr lang="en-US" sz="2400" dirty="0" err="1"/>
               <a:t>basename</a:t>
             </a:r>
             <a:r>
-              <a:rPr lang="en-US" dirty="0"/>
+              <a:rPr lang="en-US" sz="2400" dirty="0"/>
               <a:t> </a:t>
             </a:r>
             <a:r>
-              <a:rPr lang="en-US" dirty="0" err="1"/>
+              <a:rPr lang="en-US" sz="2400" dirty="0" err="1"/>
               <a:t>seqs</a:t>
             </a:r>
             <a:r>
-              <a:rPr lang="en-US" dirty="0"/>
+              <a:rPr lang="en-US" sz="2400" dirty="0"/>
               <a:t>/zmaysA_R1.fastq </a:t>
             </a:r>
             <a:r>
-              <a:rPr lang="en-US" dirty="0">
+              <a:rPr lang="en-US" sz="2400" dirty="0">
                 <a:sym typeface="Wingdings" panose="05000000000000000000" pitchFamily="2" charset="2"/>
               </a:rPr>
               <a:t> zmaysA_R1.fastq</a:t>
             </a:r>
           </a:p>
           <a:p>
-            <a:pPr lvl="1"/>
-            <a:r>
-              <a:rPr lang="en-US" dirty="0">
+            <a:pPr marL="742950" lvl="1" indent="-285750">
+              <a:buFont typeface="Arial" panose="020B0604020202020204" pitchFamily="34" charset="0"/>
+              <a:buChar char="•"/>
+            </a:pPr>
+            <a:r>
+              <a:rPr lang="en-US" sz="2400" dirty="0">
                 <a:sym typeface="Wingdings" panose="05000000000000000000" pitchFamily="2" charset="2"/>
               </a:rPr>
               <a:t>$ </a:t>
             </a:r>
             <a:r>
-              <a:rPr lang="en-US" dirty="0" err="1">
+              <a:rPr lang="en-US" sz="2400" dirty="0" err="1">
                 <a:sym typeface="Wingdings" panose="05000000000000000000" pitchFamily="2" charset="2"/>
               </a:rPr>
               <a:t>basename</a:t>
             </a:r>
             <a:r>
-              <a:rPr lang="en-US" dirty="0">
+              <a:rPr lang="en-US" sz="2400" dirty="0">
                 <a:sym typeface="Wingdings" panose="05000000000000000000" pitchFamily="2" charset="2"/>
               </a:rPr>
               <a:t> –s </a:t>
             </a:r>
             <a:r>
-              <a:rPr lang="en-US" dirty="0" err="1">
+              <a:rPr lang="en-US" sz="2400" dirty="0" err="1">
                 <a:sym typeface="Wingdings" panose="05000000000000000000" pitchFamily="2" charset="2"/>
               </a:rPr>
               <a:t>seqs</a:t>
             </a:r>
             <a:r>
-              <a:rPr lang="en-US" dirty="0">
+              <a:rPr lang="en-US" sz="2400" dirty="0">
                 <a:sym typeface="Wingdings" panose="05000000000000000000" pitchFamily="2" charset="2"/>
               </a:rPr>
               <a:t>/zmaysA_R1.fastq  zmaysA_R1</a:t>
             </a:r>
           </a:p>
           <a:p>
-            <a:pPr lvl="1"/>
-            <a:r>
-              <a:rPr lang="en-US" dirty="0">
+            <a:pPr marL="742950" lvl="1" indent="-285750">
+              <a:buFont typeface="Arial" panose="020B0604020202020204" pitchFamily="34" charset="0"/>
+              <a:buChar char="•"/>
+            </a:pPr>
+            <a:r>
+              <a:rPr lang="en-US" sz="2400" dirty="0">
                 <a:sym typeface="Wingdings" panose="05000000000000000000" pitchFamily="2" charset="2"/>
               </a:rPr>
               <a:t>This can be used to get the essential part of filenames to then create output filenames</a:t>
+            </a:r>
+            <a:endParaRPr lang="en-US" sz="2400" dirty="0"/>
+          </a:p>
+        </p:txBody>
+      </p:sp>
+      <p:sp>
+        <p:nvSpPr>
+          <p:cNvPr id="5" name="TextBox 4"/>
+          <p:cNvSpPr txBox="1"/>
+          <p:nvPr/>
+        </p:nvSpPr>
+        <p:spPr>
+          <a:xfrm>
+            <a:off x="8391525" y="1175921"/>
+            <a:ext cx="3448051" cy="3139321"/>
+          </a:xfrm>
+          <a:prstGeom prst="rect">
+            <a:avLst/>
+          </a:prstGeom>
+          <a:noFill/>
+        </p:spPr>
+        <p:txBody>
+          <a:bodyPr wrap="square" rtlCol="0">
+            <a:spAutoFit/>
+          </a:bodyPr>
+          <a:lstStyle/>
+          <a:p>
+            <a:r>
+              <a:rPr lang="en-US" dirty="0" smtClean="0"/>
+              <a:t>Have the following files:</a:t>
+            </a:r>
+          </a:p>
+          <a:p>
+            <a:r>
+              <a:rPr lang="en-US" dirty="0" smtClean="0"/>
+              <a:t>file a.txt</a:t>
+            </a:r>
+          </a:p>
+          <a:p>
+            <a:r>
+              <a:rPr lang="en-US" dirty="0" smtClean="0"/>
+              <a:t>file b.txt</a:t>
+            </a:r>
+          </a:p>
+          <a:p>
+            <a:r>
+              <a:rPr lang="en-US" dirty="0" smtClean="0"/>
+              <a:t>file c.txt</a:t>
+            </a:r>
+          </a:p>
+          <a:p>
+            <a:endParaRPr lang="en-US" dirty="0"/>
+          </a:p>
+          <a:p>
+            <a:r>
+              <a:rPr lang="en-US" dirty="0" smtClean="0"/>
+              <a:t>for f in file a.txt file b.txt file c.txt</a:t>
+            </a:r>
+          </a:p>
+          <a:p>
+            <a:r>
+              <a:rPr lang="en-US" dirty="0" smtClean="0"/>
+              <a:t>do</a:t>
+            </a:r>
+          </a:p>
+          <a:p>
+            <a:r>
+              <a:rPr lang="en-US" dirty="0" smtClean="0"/>
+              <a:t>cat $f</a:t>
+            </a:r>
+          </a:p>
+          <a:p>
+            <a:r>
+              <a:rPr lang="en-US" dirty="0" smtClean="0"/>
+              <a:t>done</a:t>
+            </a:r>
+          </a:p>
+          <a:p>
+            <a:endParaRPr lang="en-US" dirty="0"/>
+          </a:p>
+          <a:p>
+            <a:r>
+              <a:rPr lang="en-US" dirty="0"/>
+              <a:t>W</a:t>
+            </a:r>
+            <a:r>
+              <a:rPr lang="en-US" dirty="0" smtClean="0"/>
+              <a:t>hat will happen?</a:t>
             </a:r>
             <a:endParaRPr lang="en-US" dirty="0"/>
           </a:p>
@@ -5698,10 +6371,305 @@
   <p:clrMapOvr>
     <a:masterClrMapping/>
   </p:clrMapOvr>
+  <p:timing>
+    <p:tnLst>
+      <p:par>
+        <p:cTn id="1" dur="indefinite" restart="never" nodeType="tmRoot">
+          <p:childTnLst>
+            <p:seq concurrent="1" nextAc="seek">
+              <p:cTn id="2" dur="indefinite" nodeType="mainSeq">
+                <p:childTnLst>
+                  <p:par>
+                    <p:cTn id="3" fill="hold">
+                      <p:stCondLst>
+                        <p:cond delay="indefinite"/>
+                      </p:stCondLst>
+                      <p:childTnLst>
+                        <p:par>
+                          <p:cTn id="4" fill="hold">
+                            <p:stCondLst>
+                              <p:cond delay="0"/>
+                            </p:stCondLst>
+                            <p:childTnLst>
+                              <p:par>
+                                <p:cTn id="5" presetID="10" presetClass="entr" presetSubtype="0" fill="hold" grpId="0" nodeType="clickEffect">
+                                  <p:stCondLst>
+                                    <p:cond delay="0"/>
+                                  </p:stCondLst>
+                                  <p:childTnLst>
+                                    <p:set>
+                                      <p:cBhvr>
+                                        <p:cTn id="6" dur="1" fill="hold">
+                                          <p:stCondLst>
+                                            <p:cond delay="0"/>
+                                          </p:stCondLst>
+                                        </p:cTn>
+                                        <p:tgtEl>
+                                          <p:spTgt spid="5"/>
+                                        </p:tgtEl>
+                                        <p:attrNameLst>
+                                          <p:attrName>style.visibility</p:attrName>
+                                        </p:attrNameLst>
+                                      </p:cBhvr>
+                                      <p:to>
+                                        <p:strVal val="visible"/>
+                                      </p:to>
+                                    </p:set>
+                                    <p:animEffect transition="in" filter="fade">
+                                      <p:cBhvr>
+                                        <p:cTn id="7" dur="250"/>
+                                        <p:tgtEl>
+                                          <p:spTgt spid="5"/>
+                                        </p:tgtEl>
+                                      </p:cBhvr>
+                                    </p:animEffect>
+                                  </p:childTnLst>
+                                </p:cTn>
+                              </p:par>
+                            </p:childTnLst>
+                          </p:cTn>
+                        </p:par>
+                      </p:childTnLst>
+                    </p:cTn>
+                  </p:par>
+                  <p:par>
+                    <p:cTn id="8" fill="hold">
+                      <p:stCondLst>
+                        <p:cond delay="indefinite"/>
+                      </p:stCondLst>
+                      <p:childTnLst>
+                        <p:par>
+                          <p:cTn id="9" fill="hold">
+                            <p:stCondLst>
+                              <p:cond delay="0"/>
+                            </p:stCondLst>
+                            <p:childTnLst>
+                              <p:par>
+                                <p:cTn id="10" presetID="10" presetClass="entr" presetSubtype="0" fill="hold" grpId="0" nodeType="clickEffect">
+                                  <p:stCondLst>
+                                    <p:cond delay="0"/>
+                                  </p:stCondLst>
+                                  <p:childTnLst>
+                                    <p:set>
+                                      <p:cBhvr>
+                                        <p:cTn id="11" dur="1" fill="hold">
+                                          <p:stCondLst>
+                                            <p:cond delay="0"/>
+                                          </p:stCondLst>
+                                        </p:cTn>
+                                        <p:tgtEl>
+                                          <p:spTgt spid="4"/>
+                                        </p:tgtEl>
+                                        <p:attrNameLst>
+                                          <p:attrName>style.visibility</p:attrName>
+                                        </p:attrNameLst>
+                                      </p:cBhvr>
+                                      <p:to>
+                                        <p:strVal val="visible"/>
+                                      </p:to>
+                                    </p:set>
+                                    <p:animEffect transition="in" filter="fade">
+                                      <p:cBhvr>
+                                        <p:cTn id="12" dur="250"/>
+                                        <p:tgtEl>
+                                          <p:spTgt spid="4"/>
+                                        </p:tgtEl>
+                                      </p:cBhvr>
+                                    </p:animEffect>
+                                  </p:childTnLst>
+                                </p:cTn>
+                              </p:par>
+                            </p:childTnLst>
+                          </p:cTn>
+                        </p:par>
+                      </p:childTnLst>
+                    </p:cTn>
+                  </p:par>
+                </p:childTnLst>
+              </p:cTn>
+              <p:prevCondLst>
+                <p:cond evt="onPrev" delay="0">
+                  <p:tgtEl>
+                    <p:sldTgt/>
+                  </p:tgtEl>
+                </p:cond>
+              </p:prevCondLst>
+              <p:nextCondLst>
+                <p:cond evt="onNext" delay="0">
+                  <p:tgtEl>
+                    <p:sldTgt/>
+                  </p:tgtEl>
+                </p:cond>
+              </p:nextCondLst>
+            </p:seq>
+          </p:childTnLst>
+        </p:cTn>
+      </p:par>
+    </p:tnLst>
+    <p:bldLst>
+      <p:bldP spid="4" grpId="0"/>
+      <p:bldP spid="5" grpId="0"/>
+    </p:bldLst>
+  </p:timing>
 </p:sld>
 </file>
 
-<file path=ppt/slides/slide13.xml><?xml version="1.0" encoding="utf-8"?>
+<file path=ppt/slides/slide14.xml><?xml version="1.0" encoding="utf-8"?>
+<p:sld xmlns:a="http://schemas.openxmlformats.org/drawingml/2006/main" xmlns:r="http://schemas.openxmlformats.org/officeDocument/2006/relationships" xmlns:p="http://schemas.openxmlformats.org/presentationml/2006/main">
+  <p:cSld>
+    <p:spTree>
+      <p:nvGrpSpPr>
+        <p:cNvPr id="1" name=""/>
+        <p:cNvGrpSpPr/>
+        <p:nvPr/>
+      </p:nvGrpSpPr>
+      <p:grpSpPr>
+        <a:xfrm>
+          <a:off x="0" y="0"/>
+          <a:ext cx="0" cy="0"/>
+          <a:chOff x="0" y="0"/>
+          <a:chExt cx="0" cy="0"/>
+        </a:xfrm>
+      </p:grpSpPr>
+      <p:sp>
+        <p:nvSpPr>
+          <p:cNvPr id="2" name="Title 1">
+            <a:extLst>
+              <a:ext uri="{FF2B5EF4-FFF2-40B4-BE49-F238E27FC236}">
+                <a16:creationId xmlns:a16="http://schemas.microsoft.com/office/drawing/2014/main" id="{7D0C7FED-B36A-4D61-A280-815F48832573}"/>
+              </a:ext>
+            </a:extLst>
+          </p:cNvPr>
+          <p:cNvSpPr>
+            <a:spLocks noGrp="1"/>
+          </p:cNvSpPr>
+          <p:nvPr>
+            <p:ph type="title"/>
+          </p:nvPr>
+        </p:nvSpPr>
+        <p:spPr/>
+        <p:txBody>
+          <a:bodyPr/>
+          <a:lstStyle/>
+          <a:p>
+            <a:r>
+              <a:rPr lang="en-US" dirty="0"/>
+              <a:t>How can we test scripts/loops before running them?</a:t>
+            </a:r>
+          </a:p>
+        </p:txBody>
+      </p:sp>
+      <p:sp>
+        <p:nvSpPr>
+          <p:cNvPr id="3" name="Content Placeholder 2">
+            <a:extLst>
+              <a:ext uri="{FF2B5EF4-FFF2-40B4-BE49-F238E27FC236}">
+                <a16:creationId xmlns:a16="http://schemas.microsoft.com/office/drawing/2014/main" id="{4C1E32AB-F9E1-4E5A-AC70-15061F3CC2D9}"/>
+              </a:ext>
+            </a:extLst>
+          </p:cNvPr>
+          <p:cNvSpPr>
+            <a:spLocks noGrp="1"/>
+          </p:cNvSpPr>
+          <p:nvPr>
+            <p:ph idx="1"/>
+          </p:nvPr>
+        </p:nvSpPr>
+        <p:spPr/>
+        <p:txBody>
+          <a:bodyPr>
+            <a:normAutofit/>
+          </a:bodyPr>
+          <a:lstStyle/>
+          <a:p>
+            <a:r>
+              <a:rPr lang="en-US" sz="4800" dirty="0"/>
+              <a:t>ECHO!!!!</a:t>
+            </a:r>
+          </a:p>
+        </p:txBody>
+      </p:sp>
+      <p:pic>
+        <p:nvPicPr>
+          <p:cNvPr id="4" name="Picture 3">
+            <a:extLst>
+              <a:ext uri="{FF2B5EF4-FFF2-40B4-BE49-F238E27FC236}">
+                <a16:creationId xmlns:a16="http://schemas.microsoft.com/office/drawing/2014/main" id="{65342F73-2E4C-43E1-8FEA-26834FB0E2A1}"/>
+              </a:ext>
+            </a:extLst>
+          </p:cNvPr>
+          <p:cNvPicPr>
+            <a:picLocks noChangeAspect="1"/>
+          </p:cNvPicPr>
+          <p:nvPr/>
+        </p:nvPicPr>
+        <p:blipFill>
+          <a:blip r:embed="rId3"/>
+          <a:stretch>
+            <a:fillRect/>
+          </a:stretch>
+        </p:blipFill>
+        <p:spPr>
+          <a:xfrm>
+            <a:off x="4478790" y="1329677"/>
+            <a:ext cx="6405071" cy="2209994"/>
+          </a:xfrm>
+          <a:prstGeom prst="rect">
+            <a:avLst/>
+          </a:prstGeom>
+        </p:spPr>
+      </p:pic>
+      <p:pic>
+        <p:nvPicPr>
+          <p:cNvPr id="5" name="Picture 4">
+            <a:extLst>
+              <a:ext uri="{FF2B5EF4-FFF2-40B4-BE49-F238E27FC236}">
+                <a16:creationId xmlns:a16="http://schemas.microsoft.com/office/drawing/2014/main" id="{4F0B07A7-821D-4C32-B749-67C57ECFD053}"/>
+              </a:ext>
+            </a:extLst>
+          </p:cNvPr>
+          <p:cNvPicPr>
+            <a:picLocks noChangeAspect="1"/>
+          </p:cNvPicPr>
+          <p:nvPr/>
+        </p:nvPicPr>
+        <p:blipFill>
+          <a:blip r:embed="rId4"/>
+          <a:stretch>
+            <a:fillRect/>
+          </a:stretch>
+        </p:blipFill>
+        <p:spPr>
+          <a:xfrm>
+            <a:off x="4478790" y="4001294"/>
+            <a:ext cx="6877050" cy="1962150"/>
+          </a:xfrm>
+          <a:prstGeom prst="rect">
+            <a:avLst/>
+          </a:prstGeom>
+        </p:spPr>
+      </p:pic>
+    </p:spTree>
+    <p:extLst>
+      <p:ext uri="{BB962C8B-B14F-4D97-AF65-F5344CB8AC3E}">
+        <p14:creationId xmlns:p14="http://schemas.microsoft.com/office/powerpoint/2010/main" val="1003070219"/>
+      </p:ext>
+    </p:extLst>
+  </p:cSld>
+  <p:clrMapOvr>
+    <a:masterClrMapping/>
+  </p:clrMapOvr>
+  <p:timing>
+    <p:tnLst>
+      <p:par>
+        <p:cTn id="1" dur="indefinite" restart="never" nodeType="tmRoot"/>
+      </p:par>
+    </p:tnLst>
+  </p:timing>
+</p:sld>
+</file>
+
+<file path=ppt/slides/slide15.xml><?xml version="1.0" encoding="utf-8"?>
 <p:sld xmlns:a="http://schemas.openxmlformats.org/drawingml/2006/main" xmlns:r="http://schemas.openxmlformats.org/officeDocument/2006/relationships" xmlns:p="http://schemas.openxmlformats.org/presentationml/2006/main">
   <p:cSld>
     <p:spTree>
@@ -5849,10 +6817,154 @@
   <p:clrMapOvr>
     <a:masterClrMapping/>
   </p:clrMapOvr>
+  <p:timing>
+    <p:tnLst>
+      <p:par>
+        <p:cTn id="1" dur="indefinite" restart="never" nodeType="tmRoot">
+          <p:childTnLst>
+            <p:seq concurrent="1" nextAc="seek">
+              <p:cTn id="2" dur="indefinite" nodeType="mainSeq">
+                <p:childTnLst>
+                  <p:par>
+                    <p:cTn id="3" fill="hold">
+                      <p:stCondLst>
+                        <p:cond delay="indefinite"/>
+                      </p:stCondLst>
+                      <p:childTnLst>
+                        <p:par>
+                          <p:cTn id="4" fill="hold">
+                            <p:stCondLst>
+                              <p:cond delay="0"/>
+                            </p:stCondLst>
+                            <p:childTnLst>
+                              <p:par>
+                                <p:cTn id="5" presetID="10" presetClass="entr" presetSubtype="0" fill="hold" nodeType="clickEffect">
+                                  <p:stCondLst>
+                                    <p:cond delay="0"/>
+                                  </p:stCondLst>
+                                  <p:childTnLst>
+                                    <p:set>
+                                      <p:cBhvr>
+                                        <p:cTn id="6" dur="1" fill="hold">
+                                          <p:stCondLst>
+                                            <p:cond delay="0"/>
+                                          </p:stCondLst>
+                                        </p:cTn>
+                                        <p:tgtEl>
+                                          <p:spTgt spid="6">
+                                            <p:txEl>
+                                              <p:pRg st="1" end="1"/>
+                                            </p:txEl>
+                                          </p:spTgt>
+                                        </p:tgtEl>
+                                        <p:attrNameLst>
+                                          <p:attrName>style.visibility</p:attrName>
+                                        </p:attrNameLst>
+                                      </p:cBhvr>
+                                      <p:to>
+                                        <p:strVal val="visible"/>
+                                      </p:to>
+                                    </p:set>
+                                    <p:animEffect transition="in" filter="fade">
+                                      <p:cBhvr>
+                                        <p:cTn id="7" dur="250"/>
+                                        <p:tgtEl>
+                                          <p:spTgt spid="6">
+                                            <p:txEl>
+                                              <p:pRg st="1" end="1"/>
+                                            </p:txEl>
+                                          </p:spTgt>
+                                        </p:tgtEl>
+                                      </p:cBhvr>
+                                    </p:animEffect>
+                                  </p:childTnLst>
+                                </p:cTn>
+                              </p:par>
+                            </p:childTnLst>
+                          </p:cTn>
+                        </p:par>
+                      </p:childTnLst>
+                    </p:cTn>
+                  </p:par>
+                  <p:par>
+                    <p:cTn id="8" fill="hold">
+                      <p:stCondLst>
+                        <p:cond delay="indefinite"/>
+                      </p:stCondLst>
+                      <p:childTnLst>
+                        <p:par>
+                          <p:cTn id="9" fill="hold">
+                            <p:stCondLst>
+                              <p:cond delay="0"/>
+                            </p:stCondLst>
+                            <p:childTnLst>
+                              <p:par>
+                                <p:cTn id="10" presetID="10" presetClass="entr" presetSubtype="0" fill="hold" nodeType="clickEffect">
+                                  <p:stCondLst>
+                                    <p:cond delay="0"/>
+                                  </p:stCondLst>
+                                  <p:childTnLst>
+                                    <p:set>
+                                      <p:cBhvr>
+                                        <p:cTn id="11" dur="1" fill="hold">
+                                          <p:stCondLst>
+                                            <p:cond delay="0"/>
+                                          </p:stCondLst>
+                                        </p:cTn>
+                                        <p:tgtEl>
+                                          <p:spTgt spid="8"/>
+                                        </p:tgtEl>
+                                        <p:attrNameLst>
+                                          <p:attrName>style.visibility</p:attrName>
+                                        </p:attrNameLst>
+                                      </p:cBhvr>
+                                      <p:to>
+                                        <p:strVal val="visible"/>
+                                      </p:to>
+                                    </p:set>
+                                    <p:animEffect transition="in" filter="fade">
+                                      <p:cBhvr>
+                                        <p:cTn id="12" dur="250"/>
+                                        <p:tgtEl>
+                                          <p:spTgt spid="8"/>
+                                        </p:tgtEl>
+                                      </p:cBhvr>
+                                    </p:animEffect>
+                                  </p:childTnLst>
+                                </p:cTn>
+                              </p:par>
+                            </p:childTnLst>
+                          </p:cTn>
+                        </p:par>
+                      </p:childTnLst>
+                    </p:cTn>
+                  </p:par>
+                </p:childTnLst>
+              </p:cTn>
+              <p:prevCondLst>
+                <p:cond evt="onPrev" delay="0">
+                  <p:tgtEl>
+                    <p:sldTgt/>
+                  </p:tgtEl>
+                </p:cond>
+              </p:prevCondLst>
+              <p:nextCondLst>
+                <p:cond evt="onNext" delay="0">
+                  <p:tgtEl>
+                    <p:sldTgt/>
+                  </p:tgtEl>
+                </p:cond>
+              </p:nextCondLst>
+            </p:seq>
+          </p:childTnLst>
+        </p:cTn>
+      </p:par>
+    </p:tnLst>
+  </p:timing>
 </p:sld>
 </file>
 
-<file path=ppt/slides/slide14.xml><?xml version="1.0" encoding="utf-8"?>
+<file path=ppt/slides/slide16.xml><?xml version="1.0" encoding="utf-8"?>
 <p:sld xmlns:a="http://schemas.openxmlformats.org/drawingml/2006/main" xmlns:r="http://schemas.openxmlformats.org/officeDocument/2006/relationships" xmlns:p="http://schemas.openxmlformats.org/presentationml/2006/main">
   <p:cSld>
     <p:spTree>
@@ -5874,154 +6986,6 @@
           <p:cNvPr id="2" name="Title 1">
             <a:extLst>
               <a:ext uri="{FF2B5EF4-FFF2-40B4-BE49-F238E27FC236}">
-                <a16:creationId xmlns:a16="http://schemas.microsoft.com/office/drawing/2014/main" id="{7D0C7FED-B36A-4D61-A280-815F48832573}"/>
-              </a:ext>
-            </a:extLst>
-          </p:cNvPr>
-          <p:cNvSpPr>
-            <a:spLocks noGrp="1"/>
-          </p:cNvSpPr>
-          <p:nvPr>
-            <p:ph type="title"/>
-          </p:nvPr>
-        </p:nvSpPr>
-        <p:spPr/>
-        <p:txBody>
-          <a:bodyPr/>
-          <a:lstStyle/>
-          <a:p>
-            <a:r>
-              <a:rPr lang="en-US" dirty="0"/>
-              <a:t>How can we test scripts/loops before running them?</a:t>
-            </a:r>
-          </a:p>
-        </p:txBody>
-      </p:sp>
-      <p:sp>
-        <p:nvSpPr>
-          <p:cNvPr id="3" name="Content Placeholder 2">
-            <a:extLst>
-              <a:ext uri="{FF2B5EF4-FFF2-40B4-BE49-F238E27FC236}">
-                <a16:creationId xmlns:a16="http://schemas.microsoft.com/office/drawing/2014/main" id="{4C1E32AB-F9E1-4E5A-AC70-15061F3CC2D9}"/>
-              </a:ext>
-            </a:extLst>
-          </p:cNvPr>
-          <p:cNvSpPr>
-            <a:spLocks noGrp="1"/>
-          </p:cNvSpPr>
-          <p:nvPr>
-            <p:ph idx="1"/>
-          </p:nvPr>
-        </p:nvSpPr>
-        <p:spPr/>
-        <p:txBody>
-          <a:bodyPr>
-            <a:normAutofit/>
-          </a:bodyPr>
-          <a:lstStyle/>
-          <a:p>
-            <a:r>
-              <a:rPr lang="en-US" sz="4800" dirty="0"/>
-              <a:t>ECHO!!!!</a:t>
-            </a:r>
-          </a:p>
-        </p:txBody>
-      </p:sp>
-      <p:pic>
-        <p:nvPicPr>
-          <p:cNvPr id="4" name="Picture 3">
-            <a:extLst>
-              <a:ext uri="{FF2B5EF4-FFF2-40B4-BE49-F238E27FC236}">
-                <a16:creationId xmlns:a16="http://schemas.microsoft.com/office/drawing/2014/main" id="{65342F73-2E4C-43E1-8FEA-26834FB0E2A1}"/>
-              </a:ext>
-            </a:extLst>
-          </p:cNvPr>
-          <p:cNvPicPr>
-            <a:picLocks noChangeAspect="1"/>
-          </p:cNvPicPr>
-          <p:nvPr/>
-        </p:nvPicPr>
-        <p:blipFill>
-          <a:blip r:embed="rId2"/>
-          <a:stretch>
-            <a:fillRect/>
-          </a:stretch>
-        </p:blipFill>
-        <p:spPr>
-          <a:xfrm>
-            <a:off x="4478790" y="1329677"/>
-            <a:ext cx="6405071" cy="2209994"/>
-          </a:xfrm>
-          <a:prstGeom prst="rect">
-            <a:avLst/>
-          </a:prstGeom>
-        </p:spPr>
-      </p:pic>
-      <p:pic>
-        <p:nvPicPr>
-          <p:cNvPr id="5" name="Picture 4">
-            <a:extLst>
-              <a:ext uri="{FF2B5EF4-FFF2-40B4-BE49-F238E27FC236}">
-                <a16:creationId xmlns:a16="http://schemas.microsoft.com/office/drawing/2014/main" id="{4F0B07A7-821D-4C32-B749-67C57ECFD053}"/>
-              </a:ext>
-            </a:extLst>
-          </p:cNvPr>
-          <p:cNvPicPr>
-            <a:picLocks noChangeAspect="1"/>
-          </p:cNvPicPr>
-          <p:nvPr/>
-        </p:nvPicPr>
-        <p:blipFill>
-          <a:blip r:embed="rId3"/>
-          <a:stretch>
-            <a:fillRect/>
-          </a:stretch>
-        </p:blipFill>
-        <p:spPr>
-          <a:xfrm>
-            <a:off x="4478790" y="4001294"/>
-            <a:ext cx="6877050" cy="1962150"/>
-          </a:xfrm>
-          <a:prstGeom prst="rect">
-            <a:avLst/>
-          </a:prstGeom>
-        </p:spPr>
-      </p:pic>
-    </p:spTree>
-    <p:extLst>
-      <p:ext uri="{BB962C8B-B14F-4D97-AF65-F5344CB8AC3E}">
-        <p14:creationId xmlns:p14="http://schemas.microsoft.com/office/powerpoint/2010/main" val="1003070219"/>
-      </p:ext>
-    </p:extLst>
-  </p:cSld>
-  <p:clrMapOvr>
-    <a:masterClrMapping/>
-  </p:clrMapOvr>
-</p:sld>
-</file>
-
-<file path=ppt/slides/slide15.xml><?xml version="1.0" encoding="utf-8"?>
-<p:sld xmlns:a="http://schemas.openxmlformats.org/drawingml/2006/main" xmlns:r="http://schemas.openxmlformats.org/officeDocument/2006/relationships" xmlns:p="http://schemas.openxmlformats.org/presentationml/2006/main">
-  <p:cSld>
-    <p:spTree>
-      <p:nvGrpSpPr>
-        <p:cNvPr id="1" name=""/>
-        <p:cNvGrpSpPr/>
-        <p:nvPr/>
-      </p:nvGrpSpPr>
-      <p:grpSpPr>
-        <a:xfrm>
-          <a:off x="0" y="0"/>
-          <a:ext cx="0" cy="0"/>
-          <a:chOff x="0" y="0"/>
-          <a:chExt cx="0" cy="0"/>
-        </a:xfrm>
-      </p:grpSpPr>
-      <p:sp>
-        <p:nvSpPr>
-          <p:cNvPr id="2" name="Title 1">
-            <a:extLst>
-              <a:ext uri="{FF2B5EF4-FFF2-40B4-BE49-F238E27FC236}">
                 <a16:creationId xmlns:a16="http://schemas.microsoft.com/office/drawing/2014/main" id="{9C163588-312B-48CF-84BF-5E65ED0230B2}"/>
               </a:ext>
             </a:extLst>
@@ -6070,7 +7034,7 @@
           </p:nvPr>
         </p:nvPicPr>
         <p:blipFill>
-          <a:blip r:embed="rId2"/>
+          <a:blip r:embed="rId3"/>
           <a:stretch>
             <a:fillRect/>
           </a:stretch>
@@ -6151,10 +7115,17 @@
   <p:clrMapOvr>
     <a:masterClrMapping/>
   </p:clrMapOvr>
+  <p:timing>
+    <p:tnLst>
+      <p:par>
+        <p:cTn id="1" dur="indefinite" restart="never" nodeType="tmRoot"/>
+      </p:par>
+    </p:tnLst>
+  </p:timing>
 </p:sld>
 </file>
 
-<file path=ppt/slides/slide16.xml><?xml version="1.0" encoding="utf-8"?>
+<file path=ppt/slides/slide17.xml><?xml version="1.0" encoding="utf-8"?>
 <p:sld xmlns:a="http://schemas.openxmlformats.org/drawingml/2006/main" xmlns:r="http://schemas.openxmlformats.org/officeDocument/2006/relationships" xmlns:p="http://schemas.openxmlformats.org/presentationml/2006/main">
   <p:cSld>
     <p:spTree>
@@ -6364,7 +7335,7 @@
 </p:sld>
 </file>
 
-<file path=ppt/slides/slide17.xml><?xml version="1.0" encoding="utf-8"?>
+<file path=ppt/slides/slide18.xml><?xml version="1.0" encoding="utf-8"?>
 <p:sld xmlns:a="http://schemas.openxmlformats.org/drawingml/2006/main" xmlns:r="http://schemas.openxmlformats.org/officeDocument/2006/relationships" xmlns:p="http://schemas.openxmlformats.org/presentationml/2006/main">
   <p:cSld>
     <p:spTree>
@@ -6550,10 +7521,17 @@
   <p:clrMapOvr>
     <a:masterClrMapping/>
   </p:clrMapOvr>
+  <p:timing>
+    <p:tnLst>
+      <p:par>
+        <p:cTn id="1" dur="indefinite" restart="never" nodeType="tmRoot"/>
+      </p:par>
+    </p:tnLst>
+  </p:timing>
 </p:sld>
 </file>
 
-<file path=ppt/slides/slide18.xml><?xml version="1.0" encoding="utf-8"?>
+<file path=ppt/slides/slide19.xml><?xml version="1.0" encoding="utf-8"?>
 <p:sld xmlns:a="http://schemas.openxmlformats.org/drawingml/2006/main" xmlns:r="http://schemas.openxmlformats.org/officeDocument/2006/relationships" xmlns:p="http://schemas.openxmlformats.org/presentationml/2006/main">
   <p:cSld>
     <p:spTree>
@@ -6787,257 +7765,6 @@
 </p:sld>
 </file>
 
-<file path=ppt/slides/slide19.xml><?xml version="1.0" encoding="utf-8"?>
-<p:sld xmlns:a="http://schemas.openxmlformats.org/drawingml/2006/main" xmlns:r="http://schemas.openxmlformats.org/officeDocument/2006/relationships" xmlns:p="http://schemas.openxmlformats.org/presentationml/2006/main">
-  <p:cSld>
-    <p:spTree>
-      <p:nvGrpSpPr>
-        <p:cNvPr id="1" name=""/>
-        <p:cNvGrpSpPr/>
-        <p:nvPr/>
-      </p:nvGrpSpPr>
-      <p:grpSpPr>
-        <a:xfrm>
-          <a:off x="0" y="0"/>
-          <a:ext cx="0" cy="0"/>
-          <a:chOff x="0" y="0"/>
-          <a:chExt cx="0" cy="0"/>
-        </a:xfrm>
-      </p:grpSpPr>
-      <p:sp>
-        <p:nvSpPr>
-          <p:cNvPr id="2" name="Title 1"/>
-          <p:cNvSpPr>
-            <a:spLocks noGrp="1"/>
-          </p:cNvSpPr>
-          <p:nvPr>
-            <p:ph type="title"/>
-          </p:nvPr>
-        </p:nvSpPr>
-        <p:spPr/>
-        <p:txBody>
-          <a:bodyPr/>
-          <a:lstStyle/>
-          <a:p>
-            <a:r>
-              <a:rPr lang="en-US" dirty="0"/>
-              <a:t>find -exec</a:t>
-            </a:r>
-          </a:p>
-        </p:txBody>
-      </p:sp>
-      <p:sp>
-        <p:nvSpPr>
-          <p:cNvPr id="3" name="Content Placeholder 2"/>
-          <p:cNvSpPr>
-            <a:spLocks noGrp="1"/>
-          </p:cNvSpPr>
-          <p:nvPr>
-            <p:ph idx="1"/>
-          </p:nvPr>
-        </p:nvSpPr>
-        <p:spPr>
-          <a:xfrm>
-            <a:off x="514350" y="1639888"/>
-            <a:ext cx="7772400" cy="4351338"/>
-          </a:xfrm>
-        </p:spPr>
-        <p:txBody>
-          <a:bodyPr/>
-          <a:lstStyle/>
-          <a:p>
-            <a:r>
-              <a:rPr lang="en-US" dirty="0"/>
-              <a:t>using –exec runs commands on the results of find</a:t>
-            </a:r>
-          </a:p>
-          <a:p>
-            <a:endParaRPr lang="en-US" dirty="0"/>
-          </a:p>
-        </p:txBody>
-      </p:sp>
-      <p:pic>
-        <p:nvPicPr>
-          <p:cNvPr id="4" name="Picture 3"/>
-          <p:cNvPicPr>
-            <a:picLocks noChangeAspect="1"/>
-          </p:cNvPicPr>
-          <p:nvPr/>
-        </p:nvPicPr>
-        <p:blipFill>
-          <a:blip r:embed="rId2"/>
-          <a:stretch>
-            <a:fillRect/>
-          </a:stretch>
-        </p:blipFill>
-        <p:spPr>
-          <a:xfrm>
-            <a:off x="1166812" y="2289175"/>
-            <a:ext cx="5934075" cy="1228725"/>
-          </a:xfrm>
-          <a:prstGeom prst="rect">
-            <a:avLst/>
-          </a:prstGeom>
-        </p:spPr>
-      </p:pic>
-      <p:pic>
-        <p:nvPicPr>
-          <p:cNvPr id="5" name="Picture 4"/>
-          <p:cNvPicPr>
-            <a:picLocks noChangeAspect="1"/>
-          </p:cNvPicPr>
-          <p:nvPr/>
-        </p:nvPicPr>
-        <p:blipFill>
-          <a:blip r:embed="rId3"/>
-          <a:stretch>
-            <a:fillRect/>
-          </a:stretch>
-        </p:blipFill>
-        <p:spPr>
-          <a:xfrm>
-            <a:off x="1166812" y="3815557"/>
-            <a:ext cx="4610100" cy="1438275"/>
-          </a:xfrm>
-          <a:prstGeom prst="rect">
-            <a:avLst/>
-          </a:prstGeom>
-        </p:spPr>
-      </p:pic>
-      <p:sp>
-        <p:nvSpPr>
-          <p:cNvPr id="6" name="TextBox 5"/>
-          <p:cNvSpPr txBox="1"/>
-          <p:nvPr/>
-        </p:nvSpPr>
-        <p:spPr>
-          <a:xfrm>
-            <a:off x="7870032" y="2965451"/>
-            <a:ext cx="3343275" cy="1938992"/>
-          </a:xfrm>
-          <a:prstGeom prst="rect">
-            <a:avLst/>
-          </a:prstGeom>
-          <a:noFill/>
-        </p:spPr>
-        <p:txBody>
-          <a:bodyPr wrap="square" rtlCol="0">
-            <a:spAutoFit/>
-          </a:bodyPr>
-          <a:lstStyle/>
-          <a:p>
-            <a:r>
-              <a:rPr lang="en-US" sz="2000" dirty="0"/>
-              <a:t>Important thing to keep in mind:</a:t>
-            </a:r>
-          </a:p>
-          <a:p>
-            <a:r>
-              <a:rPr lang="en-US" sz="2000" dirty="0"/>
-              <a:t>check your expression first to make sure it is returning the files you want prior to running commands on them</a:t>
-            </a:r>
-          </a:p>
-        </p:txBody>
-      </p:sp>
-    </p:spTree>
-    <p:extLst>
-      <p:ext uri="{BB962C8B-B14F-4D97-AF65-F5344CB8AC3E}">
-        <p14:creationId xmlns:p14="http://schemas.microsoft.com/office/powerpoint/2010/main" val="2361189829"/>
-      </p:ext>
-    </p:extLst>
-  </p:cSld>
-  <p:clrMapOvr>
-    <a:masterClrMapping/>
-  </p:clrMapOvr>
-  <p:timing>
-    <p:tnLst>
-      <p:par>
-        <p:cTn id="1" dur="indefinite" restart="never" nodeType="tmRoot">
-          <p:childTnLst>
-            <p:seq concurrent="1" nextAc="seek">
-              <p:cTn id="2" dur="indefinite" nodeType="mainSeq">
-                <p:childTnLst>
-                  <p:par>
-                    <p:cTn id="3" fill="hold">
-                      <p:stCondLst>
-                        <p:cond delay="indefinite"/>
-                      </p:stCondLst>
-                      <p:childTnLst>
-                        <p:par>
-                          <p:cTn id="4" fill="hold">
-                            <p:stCondLst>
-                              <p:cond delay="0"/>
-                            </p:stCondLst>
-                            <p:childTnLst>
-                              <p:par>
-                                <p:cTn id="5" presetID="10" presetClass="entr" presetSubtype="0" fill="hold" grpId="0" nodeType="clickEffect">
-                                  <p:stCondLst>
-                                    <p:cond delay="0"/>
-                                  </p:stCondLst>
-                                  <p:childTnLst>
-                                    <p:set>
-                                      <p:cBhvr>
-                                        <p:cTn id="6" dur="1" fill="hold">
-                                          <p:stCondLst>
-                                            <p:cond delay="0"/>
-                                          </p:stCondLst>
-                                        </p:cTn>
-                                        <p:tgtEl>
-                                          <p:spTgt spid="6"/>
-                                        </p:tgtEl>
-                                        <p:attrNameLst>
-                                          <p:attrName>style.visibility</p:attrName>
-                                        </p:attrNameLst>
-                                      </p:cBhvr>
-                                      <p:to>
-                                        <p:strVal val="visible"/>
-                                      </p:to>
-                                    </p:set>
-                                    <p:animEffect transition="in" filter="fade">
-                                      <p:cBhvr>
-                                        <p:cTn id="7" dur="250"/>
-                                        <p:tgtEl>
-                                          <p:spTgt spid="6"/>
-                                        </p:tgtEl>
-                                      </p:cBhvr>
-                                    </p:animEffect>
-                                  </p:childTnLst>
-                                </p:cTn>
-                              </p:par>
-                            </p:childTnLst>
-                          </p:cTn>
-                        </p:par>
-                      </p:childTnLst>
-                    </p:cTn>
-                  </p:par>
-                </p:childTnLst>
-              </p:cTn>
-              <p:prevCondLst>
-                <p:cond evt="onPrev" delay="0">
-                  <p:tgtEl>
-                    <p:sldTgt/>
-                  </p:tgtEl>
-                </p:cond>
-              </p:prevCondLst>
-              <p:nextCondLst>
-                <p:cond evt="onNext" delay="0">
-                  <p:tgtEl>
-                    <p:sldTgt/>
-                  </p:tgtEl>
-                </p:cond>
-              </p:nextCondLst>
-            </p:seq>
-          </p:childTnLst>
-        </p:cTn>
-      </p:par>
-    </p:tnLst>
-    <p:bldLst>
-      <p:bldP spid="6" grpId="0"/>
-    </p:bldLst>
-  </p:timing>
-</p:sld>
-</file>
-
 <file path=ppt/slides/slide2.xml><?xml version="1.0" encoding="utf-8"?>
 <p:sld xmlns:a="http://schemas.openxmlformats.org/drawingml/2006/main" xmlns:r="http://schemas.openxmlformats.org/officeDocument/2006/relationships" xmlns:p="http://schemas.openxmlformats.org/presentationml/2006/main">
   <p:cSld>
@@ -7306,6 +8033,257 @@
 </file>
 
 <file path=ppt/slides/slide20.xml><?xml version="1.0" encoding="utf-8"?>
+<p:sld xmlns:a="http://schemas.openxmlformats.org/drawingml/2006/main" xmlns:r="http://schemas.openxmlformats.org/officeDocument/2006/relationships" xmlns:p="http://schemas.openxmlformats.org/presentationml/2006/main">
+  <p:cSld>
+    <p:spTree>
+      <p:nvGrpSpPr>
+        <p:cNvPr id="1" name=""/>
+        <p:cNvGrpSpPr/>
+        <p:nvPr/>
+      </p:nvGrpSpPr>
+      <p:grpSpPr>
+        <a:xfrm>
+          <a:off x="0" y="0"/>
+          <a:ext cx="0" cy="0"/>
+          <a:chOff x="0" y="0"/>
+          <a:chExt cx="0" cy="0"/>
+        </a:xfrm>
+      </p:grpSpPr>
+      <p:sp>
+        <p:nvSpPr>
+          <p:cNvPr id="2" name="Title 1"/>
+          <p:cNvSpPr>
+            <a:spLocks noGrp="1"/>
+          </p:cNvSpPr>
+          <p:nvPr>
+            <p:ph type="title"/>
+          </p:nvPr>
+        </p:nvSpPr>
+        <p:spPr/>
+        <p:txBody>
+          <a:bodyPr/>
+          <a:lstStyle/>
+          <a:p>
+            <a:r>
+              <a:rPr lang="en-US" dirty="0"/>
+              <a:t>find -exec</a:t>
+            </a:r>
+          </a:p>
+        </p:txBody>
+      </p:sp>
+      <p:sp>
+        <p:nvSpPr>
+          <p:cNvPr id="3" name="Content Placeholder 2"/>
+          <p:cNvSpPr>
+            <a:spLocks noGrp="1"/>
+          </p:cNvSpPr>
+          <p:nvPr>
+            <p:ph idx="1"/>
+          </p:nvPr>
+        </p:nvSpPr>
+        <p:spPr>
+          <a:xfrm>
+            <a:off x="514350" y="1639888"/>
+            <a:ext cx="7772400" cy="4351338"/>
+          </a:xfrm>
+        </p:spPr>
+        <p:txBody>
+          <a:bodyPr/>
+          <a:lstStyle/>
+          <a:p>
+            <a:r>
+              <a:rPr lang="en-US" dirty="0"/>
+              <a:t>using –exec runs commands on the results of find</a:t>
+            </a:r>
+          </a:p>
+          <a:p>
+            <a:endParaRPr lang="en-US" dirty="0"/>
+          </a:p>
+        </p:txBody>
+      </p:sp>
+      <p:pic>
+        <p:nvPicPr>
+          <p:cNvPr id="4" name="Picture 3"/>
+          <p:cNvPicPr>
+            <a:picLocks noChangeAspect="1"/>
+          </p:cNvPicPr>
+          <p:nvPr/>
+        </p:nvPicPr>
+        <p:blipFill>
+          <a:blip r:embed="rId2"/>
+          <a:stretch>
+            <a:fillRect/>
+          </a:stretch>
+        </p:blipFill>
+        <p:spPr>
+          <a:xfrm>
+            <a:off x="1166812" y="2289175"/>
+            <a:ext cx="5934075" cy="1228725"/>
+          </a:xfrm>
+          <a:prstGeom prst="rect">
+            <a:avLst/>
+          </a:prstGeom>
+        </p:spPr>
+      </p:pic>
+      <p:pic>
+        <p:nvPicPr>
+          <p:cNvPr id="5" name="Picture 4"/>
+          <p:cNvPicPr>
+            <a:picLocks noChangeAspect="1"/>
+          </p:cNvPicPr>
+          <p:nvPr/>
+        </p:nvPicPr>
+        <p:blipFill>
+          <a:blip r:embed="rId3"/>
+          <a:stretch>
+            <a:fillRect/>
+          </a:stretch>
+        </p:blipFill>
+        <p:spPr>
+          <a:xfrm>
+            <a:off x="1166812" y="3815557"/>
+            <a:ext cx="4610100" cy="1438275"/>
+          </a:xfrm>
+          <a:prstGeom prst="rect">
+            <a:avLst/>
+          </a:prstGeom>
+        </p:spPr>
+      </p:pic>
+      <p:sp>
+        <p:nvSpPr>
+          <p:cNvPr id="6" name="TextBox 5"/>
+          <p:cNvSpPr txBox="1"/>
+          <p:nvPr/>
+        </p:nvSpPr>
+        <p:spPr>
+          <a:xfrm>
+            <a:off x="7870032" y="2965451"/>
+            <a:ext cx="3343275" cy="1938992"/>
+          </a:xfrm>
+          <a:prstGeom prst="rect">
+            <a:avLst/>
+          </a:prstGeom>
+          <a:noFill/>
+        </p:spPr>
+        <p:txBody>
+          <a:bodyPr wrap="square" rtlCol="0">
+            <a:spAutoFit/>
+          </a:bodyPr>
+          <a:lstStyle/>
+          <a:p>
+            <a:r>
+              <a:rPr lang="en-US" sz="2000" dirty="0"/>
+              <a:t>Important thing to keep in mind:</a:t>
+            </a:r>
+          </a:p>
+          <a:p>
+            <a:r>
+              <a:rPr lang="en-US" sz="2000" dirty="0"/>
+              <a:t>check your expression first to make sure it is returning the files you want prior to running commands on them</a:t>
+            </a:r>
+          </a:p>
+        </p:txBody>
+      </p:sp>
+    </p:spTree>
+    <p:extLst>
+      <p:ext uri="{BB962C8B-B14F-4D97-AF65-F5344CB8AC3E}">
+        <p14:creationId xmlns:p14="http://schemas.microsoft.com/office/powerpoint/2010/main" val="2361189829"/>
+      </p:ext>
+    </p:extLst>
+  </p:cSld>
+  <p:clrMapOvr>
+    <a:masterClrMapping/>
+  </p:clrMapOvr>
+  <p:timing>
+    <p:tnLst>
+      <p:par>
+        <p:cTn id="1" dur="indefinite" restart="never" nodeType="tmRoot">
+          <p:childTnLst>
+            <p:seq concurrent="1" nextAc="seek">
+              <p:cTn id="2" dur="indefinite" nodeType="mainSeq">
+                <p:childTnLst>
+                  <p:par>
+                    <p:cTn id="3" fill="hold">
+                      <p:stCondLst>
+                        <p:cond delay="indefinite"/>
+                      </p:stCondLst>
+                      <p:childTnLst>
+                        <p:par>
+                          <p:cTn id="4" fill="hold">
+                            <p:stCondLst>
+                              <p:cond delay="0"/>
+                            </p:stCondLst>
+                            <p:childTnLst>
+                              <p:par>
+                                <p:cTn id="5" presetID="10" presetClass="entr" presetSubtype="0" fill="hold" grpId="0" nodeType="clickEffect">
+                                  <p:stCondLst>
+                                    <p:cond delay="0"/>
+                                  </p:stCondLst>
+                                  <p:childTnLst>
+                                    <p:set>
+                                      <p:cBhvr>
+                                        <p:cTn id="6" dur="1" fill="hold">
+                                          <p:stCondLst>
+                                            <p:cond delay="0"/>
+                                          </p:stCondLst>
+                                        </p:cTn>
+                                        <p:tgtEl>
+                                          <p:spTgt spid="6"/>
+                                        </p:tgtEl>
+                                        <p:attrNameLst>
+                                          <p:attrName>style.visibility</p:attrName>
+                                        </p:attrNameLst>
+                                      </p:cBhvr>
+                                      <p:to>
+                                        <p:strVal val="visible"/>
+                                      </p:to>
+                                    </p:set>
+                                    <p:animEffect transition="in" filter="fade">
+                                      <p:cBhvr>
+                                        <p:cTn id="7" dur="250"/>
+                                        <p:tgtEl>
+                                          <p:spTgt spid="6"/>
+                                        </p:tgtEl>
+                                      </p:cBhvr>
+                                    </p:animEffect>
+                                  </p:childTnLst>
+                                </p:cTn>
+                              </p:par>
+                            </p:childTnLst>
+                          </p:cTn>
+                        </p:par>
+                      </p:childTnLst>
+                    </p:cTn>
+                  </p:par>
+                </p:childTnLst>
+              </p:cTn>
+              <p:prevCondLst>
+                <p:cond evt="onPrev" delay="0">
+                  <p:tgtEl>
+                    <p:sldTgt/>
+                  </p:tgtEl>
+                </p:cond>
+              </p:prevCondLst>
+              <p:nextCondLst>
+                <p:cond evt="onNext" delay="0">
+                  <p:tgtEl>
+                    <p:sldTgt/>
+                  </p:tgtEl>
+                </p:cond>
+              </p:nextCondLst>
+            </p:seq>
+          </p:childTnLst>
+        </p:cTn>
+      </p:par>
+    </p:tnLst>
+    <p:bldLst>
+      <p:bldP spid="6" grpId="0"/>
+    </p:bldLst>
+  </p:timing>
+</p:sld>
+</file>
+
+<file path=ppt/slides/slide21.xml><?xml version="1.0" encoding="utf-8"?>
 <p:sld xmlns:a="http://schemas.openxmlformats.org/drawingml/2006/main" xmlns:r="http://schemas.openxmlformats.org/officeDocument/2006/relationships" xmlns:p="http://schemas.openxmlformats.org/presentationml/2006/main">
   <p:cSld>
     <p:spTree>
@@ -7766,7 +8744,7 @@
 </p:sld>
 </file>
 
-<file path=ppt/slides/slide21.xml><?xml version="1.0" encoding="utf-8"?>
+<file path=ppt/slides/slide22.xml><?xml version="1.0" encoding="utf-8"?>
 <p:sld xmlns:a="http://schemas.openxmlformats.org/drawingml/2006/main" xmlns:r="http://schemas.openxmlformats.org/officeDocument/2006/relationships" xmlns:p="http://schemas.openxmlformats.org/presentationml/2006/main">
   <p:cSld>
     <p:spTree>
@@ -7997,115 +8975,6 @@
 </p:sld>
 </file>
 
-<file path=ppt/slides/slide22.xml><?xml version="1.0" encoding="utf-8"?>
-<p:sld xmlns:a="http://schemas.openxmlformats.org/drawingml/2006/main" xmlns:r="http://schemas.openxmlformats.org/officeDocument/2006/relationships" xmlns:p="http://schemas.openxmlformats.org/presentationml/2006/main">
-  <p:cSld>
-    <p:spTree>
-      <p:nvGrpSpPr>
-        <p:cNvPr id="1" name=""/>
-        <p:cNvGrpSpPr/>
-        <p:nvPr/>
-      </p:nvGrpSpPr>
-      <p:grpSpPr>
-        <a:xfrm>
-          <a:off x="0" y="0"/>
-          <a:ext cx="0" cy="0"/>
-          <a:chOff x="0" y="0"/>
-          <a:chExt cx="0" cy="0"/>
-        </a:xfrm>
-      </p:grpSpPr>
-      <p:sp>
-        <p:nvSpPr>
-          <p:cNvPr id="2" name="Title 1"/>
-          <p:cNvSpPr>
-            <a:spLocks noGrp="1"/>
-          </p:cNvSpPr>
-          <p:nvPr>
-            <p:ph type="title"/>
-          </p:nvPr>
-        </p:nvSpPr>
-        <p:spPr/>
-        <p:txBody>
-          <a:bodyPr/>
-          <a:lstStyle/>
-          <a:p>
-            <a:r>
-              <a:rPr lang="en-US" dirty="0" err="1"/>
-              <a:t>xargs</a:t>
-            </a:r>
-            <a:r>
-              <a:rPr lang="en-US" dirty="0"/>
-              <a:t> and parallelization</a:t>
-            </a:r>
-          </a:p>
-        </p:txBody>
-      </p:sp>
-      <p:sp>
-        <p:nvSpPr>
-          <p:cNvPr id="3" name="Content Placeholder 2"/>
-          <p:cNvSpPr>
-            <a:spLocks noGrp="1"/>
-          </p:cNvSpPr>
-          <p:nvPr>
-            <p:ph idx="1"/>
-          </p:nvPr>
-        </p:nvSpPr>
-        <p:spPr>
-          <a:xfrm>
-            <a:off x="838200" y="1690688"/>
-            <a:ext cx="10515600" cy="4351338"/>
-          </a:xfrm>
-        </p:spPr>
-        <p:txBody>
-          <a:bodyPr/>
-          <a:lstStyle/>
-          <a:p>
-            <a:r>
-              <a:rPr lang="en-US" dirty="0" err="1"/>
-              <a:t>xargs</a:t>
-            </a:r>
-            <a:r>
-              <a:rPr lang="en-US" dirty="0"/>
-              <a:t> allows you to limit the number of background processes running simultaneously</a:t>
-            </a:r>
-          </a:p>
-          <a:p>
-            <a:pPr lvl="1"/>
-            <a:r>
-              <a:rPr lang="en-US" dirty="0"/>
-              <a:t>you cannot do this with a simple for loop</a:t>
-            </a:r>
-          </a:p>
-          <a:p>
-            <a:pPr lvl="1"/>
-            <a:r>
-              <a:rPr lang="en-US" dirty="0"/>
-              <a:t>use the -P &lt;</a:t>
-            </a:r>
-            <a:r>
-              <a:rPr lang="en-US" dirty="0" err="1"/>
-              <a:t>num</a:t>
-            </a:r>
-            <a:r>
-              <a:rPr lang="en-US" dirty="0"/>
-              <a:t>&gt; option</a:t>
-            </a:r>
-          </a:p>
-        </p:txBody>
-      </p:sp>
-    </p:spTree>
-    <p:extLst>
-      <p:ext uri="{BB962C8B-B14F-4D97-AF65-F5344CB8AC3E}">
-        <p14:creationId xmlns:p14="http://schemas.microsoft.com/office/powerpoint/2010/main" val="3146341001"/>
-      </p:ext>
-    </p:extLst>
-  </p:cSld>
-  <p:clrMapOvr>
-    <a:masterClrMapping/>
-  </p:clrMapOvr>
-</p:sld>
-</file>
-
 <file path=ppt/slides/slide23.xml><?xml version="1.0" encoding="utf-8"?>
 <p:sld xmlns:a="http://schemas.openxmlformats.org/drawingml/2006/main" xmlns:r="http://schemas.openxmlformats.org/officeDocument/2006/relationships" xmlns:p="http://schemas.openxmlformats.org/presentationml/2006/main">
   <p:cSld>
@@ -8139,6 +9008,115 @@
           <a:lstStyle/>
           <a:p>
             <a:r>
+              <a:rPr lang="en-US" dirty="0" err="1"/>
+              <a:t>xargs</a:t>
+            </a:r>
+            <a:r>
+              <a:rPr lang="en-US" dirty="0"/>
+              <a:t> and parallelization</a:t>
+            </a:r>
+          </a:p>
+        </p:txBody>
+      </p:sp>
+      <p:sp>
+        <p:nvSpPr>
+          <p:cNvPr id="3" name="Content Placeholder 2"/>
+          <p:cNvSpPr>
+            <a:spLocks noGrp="1"/>
+          </p:cNvSpPr>
+          <p:nvPr>
+            <p:ph idx="1"/>
+          </p:nvPr>
+        </p:nvSpPr>
+        <p:spPr>
+          <a:xfrm>
+            <a:off x="838200" y="1690688"/>
+            <a:ext cx="10515600" cy="4351338"/>
+          </a:xfrm>
+        </p:spPr>
+        <p:txBody>
+          <a:bodyPr/>
+          <a:lstStyle/>
+          <a:p>
+            <a:r>
+              <a:rPr lang="en-US" dirty="0" err="1"/>
+              <a:t>xargs</a:t>
+            </a:r>
+            <a:r>
+              <a:rPr lang="en-US" dirty="0"/>
+              <a:t> allows you to limit the number of background processes running simultaneously</a:t>
+            </a:r>
+          </a:p>
+          <a:p>
+            <a:pPr lvl="1"/>
+            <a:r>
+              <a:rPr lang="en-US" dirty="0"/>
+              <a:t>you cannot do this with a simple for loop</a:t>
+            </a:r>
+          </a:p>
+          <a:p>
+            <a:pPr lvl="1"/>
+            <a:r>
+              <a:rPr lang="en-US" dirty="0"/>
+              <a:t>use the -P &lt;</a:t>
+            </a:r>
+            <a:r>
+              <a:rPr lang="en-US" dirty="0" err="1"/>
+              <a:t>num</a:t>
+            </a:r>
+            <a:r>
+              <a:rPr lang="en-US" dirty="0"/>
+              <a:t>&gt; option</a:t>
+            </a:r>
+          </a:p>
+        </p:txBody>
+      </p:sp>
+    </p:spTree>
+    <p:extLst>
+      <p:ext uri="{BB962C8B-B14F-4D97-AF65-F5344CB8AC3E}">
+        <p14:creationId xmlns:p14="http://schemas.microsoft.com/office/powerpoint/2010/main" val="3146341001"/>
+      </p:ext>
+    </p:extLst>
+  </p:cSld>
+  <p:clrMapOvr>
+    <a:masterClrMapping/>
+  </p:clrMapOvr>
+</p:sld>
+</file>
+
+<file path=ppt/slides/slide24.xml><?xml version="1.0" encoding="utf-8"?>
+<p:sld xmlns:a="http://schemas.openxmlformats.org/drawingml/2006/main" xmlns:r="http://schemas.openxmlformats.org/officeDocument/2006/relationships" xmlns:p="http://schemas.openxmlformats.org/presentationml/2006/main">
+  <p:cSld>
+    <p:spTree>
+      <p:nvGrpSpPr>
+        <p:cNvPr id="1" name=""/>
+        <p:cNvGrpSpPr/>
+        <p:nvPr/>
+      </p:nvGrpSpPr>
+      <p:grpSpPr>
+        <a:xfrm>
+          <a:off x="0" y="0"/>
+          <a:ext cx="0" cy="0"/>
+          <a:chOff x="0" y="0"/>
+          <a:chExt cx="0" cy="0"/>
+        </a:xfrm>
+      </p:grpSpPr>
+      <p:sp>
+        <p:nvSpPr>
+          <p:cNvPr id="2" name="Title 1"/>
+          <p:cNvSpPr>
+            <a:spLocks noGrp="1"/>
+          </p:cNvSpPr>
+          <p:nvPr>
+            <p:ph type="title"/>
+          </p:nvPr>
+        </p:nvSpPr>
+        <p:spPr/>
+        <p:txBody>
+          <a:bodyPr/>
+          <a:lstStyle/>
+          <a:p>
+            <a:r>
               <a:rPr lang="en-US" dirty="0"/>
               <a:t>A quick note about Make</a:t>
             </a:r>
@@ -8228,10 +9206,17 @@
   <p:clrMapOvr>
     <a:masterClrMapping/>
   </p:clrMapOvr>
+  <p:timing>
+    <p:tnLst>
+      <p:par>
+        <p:cTn id="1" dur="indefinite" restart="never" nodeType="tmRoot"/>
+      </p:par>
+    </p:tnLst>
+  </p:timing>
 </p:sld>
 </file>
 
-<file path=ppt/slides/slide24.xml><?xml version="1.0" encoding="utf-8"?>
+<file path=ppt/slides/slide25.xml><?xml version="1.0" encoding="utf-8"?>
 <p:sld xmlns:a="http://schemas.openxmlformats.org/drawingml/2006/main" xmlns:r="http://schemas.openxmlformats.org/officeDocument/2006/relationships" xmlns:p="http://schemas.openxmlformats.org/presentationml/2006/main">
   <p:cSld>
     <p:spTree>
@@ -8547,6 +9532,128 @@
           </p:txBody>
         </p:sp>
       </p:grpSp>
+      <p:sp>
+        <p:nvSpPr>
+          <p:cNvPr id="9" name="Rectangle 8"/>
+          <p:cNvSpPr/>
+          <p:nvPr/>
+        </p:nvSpPr>
+        <p:spPr>
+          <a:xfrm>
+            <a:off x="5858459" y="5834321"/>
+            <a:ext cx="3190297" cy="369332"/>
+          </a:xfrm>
+          <a:prstGeom prst="rect">
+            <a:avLst/>
+          </a:prstGeom>
+        </p:spPr>
+        <p:txBody>
+          <a:bodyPr wrap="none">
+            <a:spAutoFit/>
+          </a:bodyPr>
+          <a:lstStyle>
+            <a:defPPr>
+              <a:defRPr lang="en-US"/>
+            </a:defPPr>
+            <a:lvl1pPr marL="0" algn="l" defTabSz="914400" rtl="0" eaLnBrk="1" latinLnBrk="0" hangingPunct="1">
+              <a:defRPr sz="1800" kern="1200">
+                <a:solidFill>
+                  <a:schemeClr val="tx1"/>
+                </a:solidFill>
+                <a:latin typeface="+mn-lt"/>
+                <a:ea typeface="+mn-ea"/>
+                <a:cs typeface="+mn-cs"/>
+              </a:defRPr>
+            </a:lvl1pPr>
+            <a:lvl2pPr marL="457200" algn="l" defTabSz="914400" rtl="0" eaLnBrk="1" latinLnBrk="0" hangingPunct="1">
+              <a:defRPr sz="1800" kern="1200">
+                <a:solidFill>
+                  <a:schemeClr val="tx1"/>
+                </a:solidFill>
+                <a:latin typeface="+mn-lt"/>
+                <a:ea typeface="+mn-ea"/>
+                <a:cs typeface="+mn-cs"/>
+              </a:defRPr>
+            </a:lvl2pPr>
+            <a:lvl3pPr marL="914400" algn="l" defTabSz="914400" rtl="0" eaLnBrk="1" latinLnBrk="0" hangingPunct="1">
+              <a:defRPr sz="1800" kern="1200">
+                <a:solidFill>
+                  <a:schemeClr val="tx1"/>
+                </a:solidFill>
+                <a:latin typeface="+mn-lt"/>
+                <a:ea typeface="+mn-ea"/>
+                <a:cs typeface="+mn-cs"/>
+              </a:defRPr>
+            </a:lvl3pPr>
+            <a:lvl4pPr marL="1371600" algn="l" defTabSz="914400" rtl="0" eaLnBrk="1" latinLnBrk="0" hangingPunct="1">
+              <a:defRPr sz="1800" kern="1200">
+                <a:solidFill>
+                  <a:schemeClr val="tx1"/>
+                </a:solidFill>
+                <a:latin typeface="+mn-lt"/>
+                <a:ea typeface="+mn-ea"/>
+                <a:cs typeface="+mn-cs"/>
+              </a:defRPr>
+            </a:lvl4pPr>
+            <a:lvl5pPr marL="1828800" algn="l" defTabSz="914400" rtl="0" eaLnBrk="1" latinLnBrk="0" hangingPunct="1">
+              <a:defRPr sz="1800" kern="1200">
+                <a:solidFill>
+                  <a:schemeClr val="tx1"/>
+                </a:solidFill>
+                <a:latin typeface="+mn-lt"/>
+                <a:ea typeface="+mn-ea"/>
+                <a:cs typeface="+mn-cs"/>
+              </a:defRPr>
+            </a:lvl5pPr>
+            <a:lvl6pPr marL="2286000" algn="l" defTabSz="914400" rtl="0" eaLnBrk="1" latinLnBrk="0" hangingPunct="1">
+              <a:defRPr sz="1800" kern="1200">
+                <a:solidFill>
+                  <a:schemeClr val="tx1"/>
+                </a:solidFill>
+                <a:latin typeface="+mn-lt"/>
+                <a:ea typeface="+mn-ea"/>
+                <a:cs typeface="+mn-cs"/>
+              </a:defRPr>
+            </a:lvl6pPr>
+            <a:lvl7pPr marL="2743200" algn="l" defTabSz="914400" rtl="0" eaLnBrk="1" latinLnBrk="0" hangingPunct="1">
+              <a:defRPr sz="1800" kern="1200">
+                <a:solidFill>
+                  <a:schemeClr val="tx1"/>
+                </a:solidFill>
+                <a:latin typeface="+mn-lt"/>
+                <a:ea typeface="+mn-ea"/>
+                <a:cs typeface="+mn-cs"/>
+              </a:defRPr>
+            </a:lvl7pPr>
+            <a:lvl8pPr marL="3200400" algn="l" defTabSz="914400" rtl="0" eaLnBrk="1" latinLnBrk="0" hangingPunct="1">
+              <a:defRPr sz="1800" kern="1200">
+                <a:solidFill>
+                  <a:schemeClr val="tx1"/>
+                </a:solidFill>
+                <a:latin typeface="+mn-lt"/>
+                <a:ea typeface="+mn-ea"/>
+                <a:cs typeface="+mn-cs"/>
+              </a:defRPr>
+            </a:lvl8pPr>
+            <a:lvl9pPr marL="3657600" algn="l" defTabSz="914400" rtl="0" eaLnBrk="1" latinLnBrk="0" hangingPunct="1">
+              <a:defRPr sz="1800" kern="1200">
+                <a:solidFill>
+                  <a:schemeClr val="tx1"/>
+                </a:solidFill>
+                <a:latin typeface="+mn-lt"/>
+                <a:ea typeface="+mn-ea"/>
+                <a:cs typeface="+mn-cs"/>
+              </a:defRPr>
+            </a:lvl9pPr>
+          </a:lstStyle>
+          <a:p>
+            <a:r>
+              <a:rPr lang="en-US" dirty="0"/>
+              <a:t>https://i.imgflip.com/1j1pyb.jpg</a:t>
+            </a:r>
+          </a:p>
+        </p:txBody>
+      </p:sp>
     </p:spTree>
     <p:extLst>
       <p:ext uri="{BB962C8B-B14F-4D97-AF65-F5344CB8AC3E}">
@@ -8655,6 +9762,41 @@
                                   </p:childTnLst>
                                 </p:cTn>
                               </p:par>
+                              <p:par>
+                                <p:cTn id="11" presetID="10" presetClass="entr" presetSubtype="0" fill="hold" grpId="0" nodeType="withEffect">
+                                  <p:stCondLst>
+                                    <p:cond delay="0"/>
+                                  </p:stCondLst>
+                                  <p:childTnLst>
+                                    <p:set>
+                                      <p:cBhvr>
+                                        <p:cTn id="12" dur="1" fill="hold">
+                                          <p:stCondLst>
+                                            <p:cond delay="0"/>
+                                          </p:stCondLst>
+                                        </p:cTn>
+                                        <p:tgtEl>
+                                          <p:spTgt spid="9"/>
+                                        </p:tgtEl>
+                                        <p:attrNameLst>
+                                          <p:attrName>style.visibility</p:attrName>
+                                        </p:attrNameLst>
+                                      </p:cBhvr>
+                                      <p:to>
+                                        <p:strVal val="visible"/>
+                                      </p:to>
+                                    </p:set>
+                                    <p:animEffect transition="in" filter="fade">
+                                      <p:cBhvr>
+                                        <p:cTn id="13" dur="250"/>
+                                        <p:tgtEl>
+                                          <p:spTgt spid="9"/>
+                                        </p:tgtEl>
+                                      </p:cBhvr>
+                                    </p:animEffect>
+                                  </p:childTnLst>
+                                </p:cTn>
+                              </p:par>
                             </p:childTnLst>
                           </p:cTn>
                         </p:par>
@@ -8662,26 +9804,26 @@
                     </p:cTn>
                   </p:par>
                   <p:par>
-                    <p:cTn id="11" fill="hold">
+                    <p:cTn id="14" fill="hold">
                       <p:stCondLst>
                         <p:cond delay="indefinite"/>
                       </p:stCondLst>
                       <p:childTnLst>
                         <p:par>
-                          <p:cTn id="12" fill="hold">
+                          <p:cTn id="15" fill="hold">
                             <p:stCondLst>
                               <p:cond delay="0"/>
                             </p:stCondLst>
                             <p:childTnLst>
                               <p:par>
-                                <p:cTn id="13" presetID="10" presetClass="entr" presetSubtype="0" fill="hold" nodeType="clickEffect">
+                                <p:cTn id="16" presetID="10" presetClass="entr" presetSubtype="0" fill="hold" nodeType="clickEffect">
                                   <p:stCondLst>
                                     <p:cond delay="0"/>
                                   </p:stCondLst>
                                   <p:childTnLst>
                                     <p:set>
                                       <p:cBhvr>
-                                        <p:cTn id="14" dur="1" fill="hold">
+                                        <p:cTn id="17" dur="1" fill="hold">
                                           <p:stCondLst>
                                             <p:cond delay="0"/>
                                           </p:stCondLst>
@@ -8703,7 +9845,7 @@
                                     </p:set>
                                     <p:animEffect transition="in" filter="fade">
                                       <p:cBhvr>
-                                        <p:cTn id="15" dur="250"/>
+                                        <p:cTn id="18" dur="250"/>
                                         <p:tgtEl>
                                           <p:spTgt spid="3">
                                             <p:txEl>
@@ -8723,26 +9865,26 @@
                     </p:cTn>
                   </p:par>
                   <p:par>
-                    <p:cTn id="16" fill="hold">
+                    <p:cTn id="19" fill="hold">
                       <p:stCondLst>
                         <p:cond delay="indefinite"/>
                       </p:stCondLst>
                       <p:childTnLst>
                         <p:par>
-                          <p:cTn id="17" fill="hold">
+                          <p:cTn id="20" fill="hold">
                             <p:stCondLst>
                               <p:cond delay="0"/>
                             </p:stCondLst>
                             <p:childTnLst>
                               <p:par>
-                                <p:cTn id="18" presetID="10" presetClass="entr" presetSubtype="0" fill="hold" nodeType="clickEffect">
+                                <p:cTn id="21" presetID="10" presetClass="entr" presetSubtype="0" fill="hold" nodeType="clickEffect">
                                   <p:stCondLst>
                                     <p:cond delay="0"/>
                                   </p:stCondLst>
                                   <p:childTnLst>
                                     <p:set>
                                       <p:cBhvr>
-                                        <p:cTn id="19" dur="1" fill="hold">
+                                        <p:cTn id="22" dur="1" fill="hold">
                                           <p:stCondLst>
                                             <p:cond delay="0"/>
                                           </p:stCondLst>
@@ -8764,7 +9906,7 @@
                                     </p:set>
                                     <p:animEffect transition="in" filter="fade">
                                       <p:cBhvr>
-                                        <p:cTn id="20" dur="250"/>
+                                        <p:cTn id="23" dur="250"/>
                                         <p:tgtEl>
                                           <p:spTgt spid="3">
                                             <p:txEl>
@@ -8778,14 +9920,14 @@
                                 </p:cTn>
                               </p:par>
                               <p:par>
-                                <p:cTn id="21" presetID="10" presetClass="entr" presetSubtype="0" fill="hold" nodeType="withEffect">
+                                <p:cTn id="24" presetID="10" presetClass="entr" presetSubtype="0" fill="hold" nodeType="withEffect">
                                   <p:stCondLst>
                                     <p:cond delay="0"/>
                                   </p:stCondLst>
                                   <p:childTnLst>
                                     <p:set>
                                       <p:cBhvr>
-                                        <p:cTn id="22" dur="1" fill="hold">
+                                        <p:cTn id="25" dur="1" fill="hold">
                                           <p:stCondLst>
                                             <p:cond delay="0"/>
                                           </p:stCondLst>
@@ -8807,7 +9949,7 @@
                                     </p:set>
                                     <p:animEffect transition="in" filter="fade">
                                       <p:cBhvr>
-                                        <p:cTn id="23" dur="250"/>
+                                        <p:cTn id="26" dur="250"/>
                                         <p:tgtEl>
                                           <p:spTgt spid="3">
                                             <p:txEl>
@@ -8847,6 +9989,9 @@
         </p:cTn>
       </p:par>
     </p:tnLst>
+    <p:bldLst>
+      <p:bldP spid="9" grpId="0"/>
+    </p:bldLst>
   </p:timing>
 </p:sld>
 </file>
@@ -10355,6 +11500,13 @@
   <p:clrMapOvr>
     <a:masterClrMapping/>
   </p:clrMapOvr>
+  <p:timing>
+    <p:tnLst>
+      <p:par>
+        <p:cTn id="1" dur="indefinite" restart="never" nodeType="tmRoot"/>
+      </p:par>
+    </p:tnLst>
+  </p:timing>
 </p:sld>
 </file>
 
@@ -10414,8 +11566,8 @@
         </p:nvSpPr>
         <p:spPr>
           <a:xfrm>
-            <a:off x="838200" y="1176400"/>
-            <a:ext cx="10515600" cy="5379847"/>
+            <a:off x="838200" y="4033900"/>
+            <a:ext cx="10515600" cy="2300225"/>
           </a:xfrm>
         </p:spPr>
         <p:txBody>
@@ -10423,48 +11575,41 @@
           <a:lstStyle/>
           <a:p>
             <a:r>
-              <a:rPr lang="en-US" dirty="0"/>
+              <a:rPr lang="en-US" dirty="0" smtClean="0"/>
               <a:t>Arguments are used to pass information to a script at run-time</a:t>
             </a:r>
           </a:p>
           <a:p>
             <a:r>
-              <a:rPr lang="en-US" dirty="0"/>
+              <a:rPr lang="en-US" dirty="0" smtClean="0"/>
               <a:t>Assigned to a value ($1, $2, $3, etc.)</a:t>
             </a:r>
           </a:p>
           <a:p>
             <a:pPr lvl="1"/>
             <a:r>
-              <a:rPr lang="en-US" dirty="0"/>
+              <a:rPr lang="en-US" dirty="0" smtClean="0"/>
               <a:t>$0 stores the script name</a:t>
             </a:r>
           </a:p>
           <a:p>
             <a:pPr lvl="1"/>
             <a:r>
-              <a:rPr lang="en-US" dirty="0"/>
+              <a:rPr lang="en-US" dirty="0" smtClean="0"/>
               <a:t>The rest are assign based on order</a:t>
             </a:r>
           </a:p>
           <a:p>
             <a:pPr lvl="1"/>
             <a:r>
-              <a:rPr lang="en-US" dirty="0"/>
+              <a:rPr lang="en-US" dirty="0" smtClean="0"/>
               <a:t>$# stores the number of arguments</a:t>
             </a:r>
           </a:p>
           <a:p>
-            <a:pPr lvl="1"/>
-            <a:endParaRPr lang="en-US" dirty="0"/>
-          </a:p>
-          <a:p>
-            <a:r>
-              <a:rPr lang="en-US" dirty="0"/>
-              <a:t>Usage: </a:t>
-            </a:r>
-          </a:p>
-          <a:p>
+            <a:pPr marL="457200" lvl="1" indent="0">
+              <a:buNone/>
+            </a:pPr>
             <a:endParaRPr lang="en-US" dirty="0"/>
           </a:p>
         </p:txBody>
@@ -10485,7 +11630,7 @@
         </p:blipFill>
         <p:spPr>
           <a:xfrm>
-            <a:off x="1066800" y="4586287"/>
+            <a:off x="1095375" y="1870858"/>
             <a:ext cx="3714750" cy="1616157"/>
           </a:xfrm>
           <a:prstGeom prst="rect">
@@ -10509,7 +11654,7 @@
         </p:blipFill>
         <p:spPr>
           <a:xfrm>
-            <a:off x="5395913" y="4586287"/>
+            <a:off x="6015038" y="1870858"/>
             <a:ext cx="4376738" cy="1873678"/>
           </a:xfrm>
           <a:prstGeom prst="rect">
@@ -10517,6 +11662,82 @@
           </a:prstGeom>
         </p:spPr>
       </p:pic>
+      <p:sp>
+        <p:nvSpPr>
+          <p:cNvPr id="6" name="TextBox 5"/>
+          <p:cNvSpPr txBox="1"/>
+          <p:nvPr/>
+        </p:nvSpPr>
+        <p:spPr>
+          <a:xfrm>
+            <a:off x="1076325" y="1308038"/>
+            <a:ext cx="5019675" cy="400110"/>
+          </a:xfrm>
+          <a:prstGeom prst="rect">
+            <a:avLst/>
+          </a:prstGeom>
+          <a:noFill/>
+        </p:spPr>
+        <p:txBody>
+          <a:bodyPr wrap="square" rtlCol="0">
+            <a:spAutoFit/>
+          </a:bodyPr>
+          <a:lstStyle/>
+          <a:p>
+            <a:r>
+              <a:rPr lang="en-US" sz="2000" dirty="0" smtClean="0"/>
+              <a:t>args.sh script is in the repo (Activities folder)</a:t>
+            </a:r>
+            <a:endParaRPr lang="en-US" sz="2000" dirty="0"/>
+          </a:p>
+        </p:txBody>
+      </p:sp>
+      <p:sp>
+        <p:nvSpPr>
+          <p:cNvPr id="7" name="Rectangle 6"/>
+          <p:cNvSpPr/>
+          <p:nvPr/>
+        </p:nvSpPr>
+        <p:spPr>
+          <a:xfrm>
+            <a:off x="6096000" y="2255033"/>
+            <a:ext cx="3643312" cy="1420436"/>
+          </a:xfrm>
+          <a:prstGeom prst="rect">
+            <a:avLst/>
+          </a:prstGeom>
+          <a:solidFill>
+            <a:schemeClr val="bg1"/>
+          </a:solidFill>
+          <a:ln>
+            <a:noFill/>
+          </a:ln>
+        </p:spPr>
+        <p:style>
+          <a:lnRef idx="2">
+            <a:schemeClr val="accent1">
+              <a:shade val="50000"/>
+            </a:schemeClr>
+          </a:lnRef>
+          <a:fillRef idx="1">
+            <a:schemeClr val="accent1"/>
+          </a:fillRef>
+          <a:effectRef idx="0">
+            <a:schemeClr val="accent1"/>
+          </a:effectRef>
+          <a:fontRef idx="minor">
+            <a:schemeClr val="lt1"/>
+          </a:fontRef>
+        </p:style>
+        <p:txBody>
+          <a:bodyPr rtlCol="0" anchor="ctr"/>
+          <a:lstStyle/>
+          <a:p>
+            <a:pPr algn="ctr"/>
+            <a:endParaRPr lang="en-US"/>
+          </a:p>
+        </p:txBody>
+      </p:sp>
     </p:spTree>
     <p:extLst>
       <p:ext uri="{BB962C8B-B14F-4D97-AF65-F5344CB8AC3E}">
@@ -10548,37 +11769,37 @@
                             </p:stCondLst>
                             <p:childTnLst>
                               <p:par>
-                                <p:cTn id="5" presetID="10" presetClass="entr" presetSubtype="0" fill="hold" nodeType="clickEffect">
+                                <p:cTn id="5" presetID="10" presetClass="exit" presetSubtype="0" fill="hold" grpId="0" nodeType="clickEffect">
                                   <p:stCondLst>
                                     <p:cond delay="0"/>
                                   </p:stCondLst>
                                   <p:childTnLst>
+                                    <p:animEffect transition="out" filter="fade">
+                                      <p:cBhvr>
+                                        <p:cTn id="6" dur="250"/>
+                                        <p:tgtEl>
+                                          <p:spTgt spid="7"/>
+                                        </p:tgtEl>
+                                      </p:cBhvr>
+                                    </p:animEffect>
                                     <p:set>
                                       <p:cBhvr>
-                                        <p:cTn id="6" dur="1" fill="hold">
+                                        <p:cTn id="7" dur="1" fill="hold">
                                           <p:stCondLst>
-                                            <p:cond delay="0"/>
+                                            <p:cond delay="249"/>
                                           </p:stCondLst>
                                         </p:cTn>
                                         <p:tgtEl>
-                                          <p:spTgt spid="4"/>
+                                          <p:spTgt spid="7"/>
                                         </p:tgtEl>
                                         <p:attrNameLst>
                                           <p:attrName>style.visibility</p:attrName>
                                         </p:attrNameLst>
                                       </p:cBhvr>
                                       <p:to>
-                                        <p:strVal val="visible"/>
+                                        <p:strVal val="hidden"/>
                                       </p:to>
                                     </p:set>
-                                    <p:animEffect transition="in" filter="fade">
-                                      <p:cBhvr>
-                                        <p:cTn id="7" dur="250"/>
-                                        <p:tgtEl>
-                                          <p:spTgt spid="4"/>
-                                        </p:tgtEl>
-                                      </p:cBhvr>
-                                    </p:animEffect>
                                   </p:childTnLst>
                                 </p:cTn>
                               </p:par>
@@ -10601,7 +11822,7 @@
                             </p:stCondLst>
                             <p:childTnLst>
                               <p:par>
-                                <p:cTn id="10" presetID="10" presetClass="entr" presetSubtype="0" fill="hold" nodeType="clickEffect">
+                                <p:cTn id="10" presetID="10" presetClass="entr" presetSubtype="0" fill="hold" grpId="0" nodeType="clickEffect">
                                   <p:stCondLst>
                                     <p:cond delay="0"/>
                                   </p:stCondLst>
@@ -10614,7 +11835,7 @@
                                           </p:stCondLst>
                                         </p:cTn>
                                         <p:tgtEl>
-                                          <p:spTgt spid="5"/>
+                                          <p:spTgt spid="3"/>
                                         </p:tgtEl>
                                         <p:attrNameLst>
                                           <p:attrName>style.visibility</p:attrName>
@@ -10628,7 +11849,7 @@
                                       <p:cBhvr>
                                         <p:cTn id="12" dur="250"/>
                                         <p:tgtEl>
-                                          <p:spTgt spid="5"/>
+                                          <p:spTgt spid="3"/>
                                         </p:tgtEl>
                                       </p:cBhvr>
                                     </p:animEffect>
@@ -10662,6 +11883,10 @@
         </p:cTn>
       </p:par>
     </p:tnLst>
+    <p:bldLst>
+      <p:bldP spid="3" grpId="0" uiExpand="1"/>
+      <p:bldP spid="7" grpId="0" animBg="1"/>
+    </p:bldLst>
   </p:timing>
 </p:sld>
 </file>
@@ -11125,7 +12350,7 @@
         <p:spPr>
           <a:xfrm>
             <a:off x="285750" y="0"/>
-            <a:ext cx="10515600" cy="1325563"/>
+            <a:ext cx="3600450" cy="1325563"/>
           </a:xfrm>
         </p:spPr>
         <p:txBody>
@@ -11157,7 +12382,7 @@
         </p:nvSpPr>
         <p:spPr>
           <a:xfrm>
-            <a:off x="771525" y="1130300"/>
+            <a:off x="771525" y="2987675"/>
             <a:ext cx="3603171" cy="4351338"/>
           </a:xfrm>
         </p:spPr>
@@ -11245,7 +12470,7 @@
         </p:nvSpPr>
         <p:spPr>
           <a:xfrm>
-            <a:off x="771525" y="4857085"/>
+            <a:off x="803307" y="1055171"/>
             <a:ext cx="6851586" cy="2369880"/>
           </a:xfrm>
           <a:prstGeom prst="rect">
@@ -11307,7 +12532,7 @@
         </p:nvCxnSpPr>
         <p:spPr>
           <a:xfrm>
-            <a:off x="3193596" y="1885950"/>
+            <a:off x="3193596" y="3743325"/>
             <a:ext cx="2540454" cy="0"/>
           </a:xfrm>
           <a:prstGeom prst="straightConnector1">
@@ -11343,7 +12568,7 @@
         </p:nvCxnSpPr>
         <p:spPr>
           <a:xfrm>
-            <a:off x="4069896" y="2886075"/>
+            <a:off x="4069896" y="4743450"/>
             <a:ext cx="1664154" cy="0"/>
           </a:xfrm>
           <a:prstGeom prst="straightConnector1">
@@ -11379,7 +12604,7 @@
         </p:nvCxnSpPr>
         <p:spPr>
           <a:xfrm>
-            <a:off x="4069896" y="3924300"/>
+            <a:off x="4069896" y="5781675"/>
             <a:ext cx="1664154" cy="0"/>
           </a:xfrm>
           <a:prstGeom prst="straightConnector1">
@@ -11415,7 +12640,7 @@
         </p:nvSpPr>
         <p:spPr>
           <a:xfrm>
-            <a:off x="6076950" y="1562784"/>
+            <a:off x="6076950" y="3420159"/>
             <a:ext cx="2828925" cy="646331"/>
           </a:xfrm>
           <a:prstGeom prst="rect">
@@ -11444,7 +12669,7 @@
         </p:nvSpPr>
         <p:spPr>
           <a:xfrm>
-            <a:off x="6076949" y="2562909"/>
+            <a:off x="6076949" y="4420284"/>
             <a:ext cx="2828925" cy="923330"/>
           </a:xfrm>
           <a:prstGeom prst="rect">
@@ -11473,7 +12698,7 @@
         </p:nvSpPr>
         <p:spPr>
           <a:xfrm>
-            <a:off x="6076948" y="3568015"/>
+            <a:off x="6076948" y="5425390"/>
             <a:ext cx="2828925" cy="1200329"/>
           </a:xfrm>
           <a:prstGeom prst="rect">
@@ -11508,8 +12733,8 @@
         </p:nvSpPr>
         <p:spPr>
           <a:xfrm>
-            <a:off x="7096125" y="5364181"/>
-            <a:ext cx="3705225" cy="646331"/>
+            <a:off x="9391651" y="5580360"/>
+            <a:ext cx="2552700" cy="923330"/>
           </a:xfrm>
           <a:prstGeom prst="rect">
             <a:avLst/>
@@ -11560,7 +12785,7 @@
                             </p:stCondLst>
                             <p:childTnLst>
                               <p:par>
-                                <p:cTn id="5" presetID="10" presetClass="entr" presetSubtype="0" fill="hold" nodeType="clickEffect">
+                                <p:cTn id="5" presetID="10" presetClass="entr" presetSubtype="0" fill="hold" grpId="0" nodeType="clickEffect">
                                   <p:stCondLst>
                                     <p:cond delay="0"/>
                                   </p:stCondLst>
@@ -11568,6 +12793,59 @@
                                     <p:set>
                                       <p:cBhvr>
                                         <p:cTn id="6" dur="1" fill="hold">
+                                          <p:stCondLst>
+                                            <p:cond delay="0"/>
+                                          </p:stCondLst>
+                                        </p:cTn>
+                                        <p:tgtEl>
+                                          <p:spTgt spid="3"/>
+                                        </p:tgtEl>
+                                        <p:attrNameLst>
+                                          <p:attrName>style.visibility</p:attrName>
+                                        </p:attrNameLst>
+                                      </p:cBhvr>
+                                      <p:to>
+                                        <p:strVal val="visible"/>
+                                      </p:to>
+                                    </p:set>
+                                    <p:animEffect transition="in" filter="fade">
+                                      <p:cBhvr>
+                                        <p:cTn id="7" dur="250"/>
+                                        <p:tgtEl>
+                                          <p:spTgt spid="3"/>
+                                        </p:tgtEl>
+                                      </p:cBhvr>
+                                    </p:animEffect>
+                                  </p:childTnLst>
+                                </p:cTn>
+                              </p:par>
+                            </p:childTnLst>
+                          </p:cTn>
+                        </p:par>
+                      </p:childTnLst>
+                    </p:cTn>
+                  </p:par>
+                  <p:par>
+                    <p:cTn id="8" fill="hold">
+                      <p:stCondLst>
+                        <p:cond delay="indefinite"/>
+                      </p:stCondLst>
+                      <p:childTnLst>
+                        <p:par>
+                          <p:cTn id="9" fill="hold">
+                            <p:stCondLst>
+                              <p:cond delay="0"/>
+                            </p:stCondLst>
+                            <p:childTnLst>
+                              <p:par>
+                                <p:cTn id="10" presetID="10" presetClass="entr" presetSubtype="0" fill="hold" nodeType="clickEffect">
+                                  <p:stCondLst>
+                                    <p:cond delay="0"/>
+                                  </p:stCondLst>
+                                  <p:childTnLst>
+                                    <p:set>
+                                      <p:cBhvr>
+                                        <p:cTn id="11" dur="1" fill="hold">
                                           <p:stCondLst>
                                             <p:cond delay="0"/>
                                           </p:stCondLst>
@@ -11585,7 +12863,7 @@
                                     </p:set>
                                     <p:animEffect transition="in" filter="fade">
                                       <p:cBhvr>
-                                        <p:cTn id="7" dur="250"/>
+                                        <p:cTn id="12" dur="250"/>
                                         <p:tgtEl>
                                           <p:spTgt spid="6"/>
                                         </p:tgtEl>
@@ -11595,14 +12873,14 @@
                                 </p:cTn>
                               </p:par>
                               <p:par>
-                                <p:cTn id="8" presetID="10" presetClass="entr" presetSubtype="0" fill="hold" grpId="0" nodeType="withEffect">
+                                <p:cTn id="13" presetID="10" presetClass="entr" presetSubtype="0" fill="hold" grpId="0" nodeType="withEffect">
                                   <p:stCondLst>
                                     <p:cond delay="0"/>
                                   </p:stCondLst>
                                   <p:childTnLst>
                                     <p:set>
                                       <p:cBhvr>
-                                        <p:cTn id="9" dur="1" fill="hold">
+                                        <p:cTn id="14" dur="1" fill="hold">
                                           <p:stCondLst>
                                             <p:cond delay="0"/>
                                           </p:stCondLst>
@@ -11620,7 +12898,7 @@
                                     </p:set>
                                     <p:animEffect transition="in" filter="fade">
                                       <p:cBhvr>
-                                        <p:cTn id="10" dur="250"/>
+                                        <p:cTn id="15" dur="250"/>
                                         <p:tgtEl>
                                           <p:spTgt spid="12"/>
                                         </p:tgtEl>
@@ -11636,26 +12914,26 @@
                     </p:cTn>
                   </p:par>
                   <p:par>
-                    <p:cTn id="11" fill="hold">
+                    <p:cTn id="16" fill="hold">
                       <p:stCondLst>
                         <p:cond delay="indefinite"/>
                       </p:stCondLst>
                       <p:childTnLst>
                         <p:par>
-                          <p:cTn id="12" fill="hold">
+                          <p:cTn id="17" fill="hold">
                             <p:stCondLst>
                               <p:cond delay="0"/>
                             </p:stCondLst>
                             <p:childTnLst>
                               <p:par>
-                                <p:cTn id="13" presetID="10" presetClass="entr" presetSubtype="0" fill="hold" nodeType="clickEffect">
+                                <p:cTn id="18" presetID="10" presetClass="entr" presetSubtype="0" fill="hold" nodeType="clickEffect">
                                   <p:stCondLst>
                                     <p:cond delay="0"/>
                                   </p:stCondLst>
                                   <p:childTnLst>
                                     <p:set>
                                       <p:cBhvr>
-                                        <p:cTn id="14" dur="1" fill="hold">
+                                        <p:cTn id="19" dur="1" fill="hold">
                                           <p:stCondLst>
                                             <p:cond delay="0"/>
                                           </p:stCondLst>
@@ -11673,7 +12951,7 @@
                                     </p:set>
                                     <p:animEffect transition="in" filter="fade">
                                       <p:cBhvr>
-                                        <p:cTn id="15" dur="250"/>
+                                        <p:cTn id="20" dur="250"/>
                                         <p:tgtEl>
                                           <p:spTgt spid="9"/>
                                         </p:tgtEl>
@@ -11683,14 +12961,14 @@
                                 </p:cTn>
                               </p:par>
                               <p:par>
-                                <p:cTn id="16" presetID="10" presetClass="entr" presetSubtype="0" fill="hold" grpId="0" nodeType="withEffect">
+                                <p:cTn id="21" presetID="10" presetClass="entr" presetSubtype="0" fill="hold" grpId="0" nodeType="withEffect">
                                   <p:stCondLst>
                                     <p:cond delay="0"/>
                                   </p:stCondLst>
                                   <p:childTnLst>
                                     <p:set>
                                       <p:cBhvr>
-                                        <p:cTn id="17" dur="1" fill="hold">
+                                        <p:cTn id="22" dur="1" fill="hold">
                                           <p:stCondLst>
                                             <p:cond delay="0"/>
                                           </p:stCondLst>
@@ -11708,7 +12986,7 @@
                                     </p:set>
                                     <p:animEffect transition="in" filter="fade">
                                       <p:cBhvr>
-                                        <p:cTn id="18" dur="250"/>
+                                        <p:cTn id="23" dur="250"/>
                                         <p:tgtEl>
                                           <p:spTgt spid="13"/>
                                         </p:tgtEl>
@@ -11724,26 +13002,26 @@
                     </p:cTn>
                   </p:par>
                   <p:par>
-                    <p:cTn id="19" fill="hold">
+                    <p:cTn id="24" fill="hold">
                       <p:stCondLst>
                         <p:cond delay="indefinite"/>
                       </p:stCondLst>
                       <p:childTnLst>
                         <p:par>
-                          <p:cTn id="20" fill="hold">
+                          <p:cTn id="25" fill="hold">
                             <p:stCondLst>
                               <p:cond delay="0"/>
                             </p:stCondLst>
                             <p:childTnLst>
                               <p:par>
-                                <p:cTn id="21" presetID="10" presetClass="entr" presetSubtype="0" fill="hold" nodeType="clickEffect">
+                                <p:cTn id="26" presetID="10" presetClass="entr" presetSubtype="0" fill="hold" nodeType="clickEffect">
                                   <p:stCondLst>
                                     <p:cond delay="0"/>
                                   </p:stCondLst>
                                   <p:childTnLst>
                                     <p:set>
                                       <p:cBhvr>
-                                        <p:cTn id="22" dur="1" fill="hold">
+                                        <p:cTn id="27" dur="1" fill="hold">
                                           <p:stCondLst>
                                             <p:cond delay="0"/>
                                           </p:stCondLst>
@@ -11761,7 +13039,7 @@
                                     </p:set>
                                     <p:animEffect transition="in" filter="fade">
                                       <p:cBhvr>
-                                        <p:cTn id="23" dur="250"/>
+                                        <p:cTn id="28" dur="250"/>
                                         <p:tgtEl>
                                           <p:spTgt spid="11"/>
                                         </p:tgtEl>
@@ -11771,14 +13049,14 @@
                                 </p:cTn>
                               </p:par>
                               <p:par>
-                                <p:cTn id="24" presetID="10" presetClass="entr" presetSubtype="0" fill="hold" grpId="0" nodeType="withEffect">
+                                <p:cTn id="29" presetID="10" presetClass="entr" presetSubtype="0" fill="hold" grpId="0" nodeType="withEffect">
                                   <p:stCondLst>
                                     <p:cond delay="0"/>
                                   </p:stCondLst>
                                   <p:childTnLst>
                                     <p:set>
                                       <p:cBhvr>
-                                        <p:cTn id="25" dur="1" fill="hold">
+                                        <p:cTn id="30" dur="1" fill="hold">
                                           <p:stCondLst>
                                             <p:cond delay="0"/>
                                           </p:stCondLst>
@@ -11796,62 +13074,9 @@
                                     </p:set>
                                     <p:animEffect transition="in" filter="fade">
                                       <p:cBhvr>
-                                        <p:cTn id="26" dur="250"/>
+                                        <p:cTn id="31" dur="250"/>
                                         <p:tgtEl>
                                           <p:spTgt spid="14"/>
-                                        </p:tgtEl>
-                                      </p:cBhvr>
-                                    </p:animEffect>
-                                  </p:childTnLst>
-                                </p:cTn>
-                              </p:par>
-                            </p:childTnLst>
-                          </p:cTn>
-                        </p:par>
-                      </p:childTnLst>
-                    </p:cTn>
-                  </p:par>
-                  <p:par>
-                    <p:cTn id="27" fill="hold">
-                      <p:stCondLst>
-                        <p:cond delay="indefinite"/>
-                      </p:stCondLst>
-                      <p:childTnLst>
-                        <p:par>
-                          <p:cTn id="28" fill="hold">
-                            <p:stCondLst>
-                              <p:cond delay="0"/>
-                            </p:stCondLst>
-                            <p:childTnLst>
-                              <p:par>
-                                <p:cTn id="29" presetID="10" presetClass="entr" presetSubtype="0" fill="hold" grpId="0" nodeType="clickEffect">
-                                  <p:stCondLst>
-                                    <p:cond delay="0"/>
-                                  </p:stCondLst>
-                                  <p:childTnLst>
-                                    <p:set>
-                                      <p:cBhvr>
-                                        <p:cTn id="30" dur="1" fill="hold">
-                                          <p:stCondLst>
-                                            <p:cond delay="0"/>
-                                          </p:stCondLst>
-                                        </p:cTn>
-                                        <p:tgtEl>
-                                          <p:spTgt spid="4"/>
-                                        </p:tgtEl>
-                                        <p:attrNameLst>
-                                          <p:attrName>style.visibility</p:attrName>
-                                        </p:attrNameLst>
-                                      </p:cBhvr>
-                                      <p:to>
-                                        <p:strVal val="visible"/>
-                                      </p:to>
-                                    </p:set>
-                                    <p:animEffect transition="in" filter="fade">
-                                      <p:cBhvr>
-                                        <p:cTn id="31" dur="250"/>
-                                        <p:tgtEl>
-                                          <p:spTgt spid="4"/>
                                         </p:tgtEl>
                                       </p:cBhvr>
                                     </p:animEffect>
@@ -11939,7 +13164,7 @@
       </p:par>
     </p:tnLst>
     <p:bldLst>
-      <p:bldP spid="4" grpId="0"/>
+      <p:bldP spid="3" grpId="0"/>
       <p:bldP spid="12" grpId="0"/>
       <p:bldP spid="13" grpId="0"/>
       <p:bldP spid="14" grpId="0"/>
@@ -12035,7 +13260,23 @@
           <a:p>
             <a:r>
               <a:rPr lang="en-US" dirty="0"/>
-              <a:t>Most common use is to check whether input is a file or a directory or whether something exists.</a:t>
+              <a:t>C</a:t>
+            </a:r>
+            <a:r>
+              <a:rPr lang="en-US" dirty="0" smtClean="0"/>
+              <a:t>ommon uses </a:t>
+            </a:r>
+            <a:r>
+              <a:rPr lang="en-US" dirty="0" smtClean="0"/>
+              <a:t>include</a:t>
+            </a:r>
+            <a:r>
+              <a:rPr lang="en-US" dirty="0" smtClean="0"/>
+              <a:t> checking </a:t>
+            </a:r>
+            <a:r>
+              <a:rPr lang="en-US" dirty="0"/>
+              <a:t>whether input is a file or a directory or whether something exists.</a:t>
             </a:r>
           </a:p>
           <a:p>
@@ -12126,6 +13367,13 @@
   <p:clrMapOvr>
     <a:masterClrMapping/>
   </p:clrMapOvr>
+  <p:timing>
+    <p:tnLst>
+      <p:par>
+        <p:cTn id="1" dur="indefinite" restart="never" nodeType="tmRoot"/>
+      </p:par>
+    </p:tnLst>
+  </p:timing>
 </p:sld>
 </file>
 

</xml_diff>